<commit_message>
Updated the code so it matches the latest Stan conventions.
</commit_message>
<xml_diff>
--- a/Session_02b_Probabilistic_programming/Probabilistic_programming.pptx
+++ b/Session_02b_Probabilistic_programming/Probabilistic_programming.pptx
@@ -1756,7 +1756,7 @@
           <a:p>
             <a:fld id="{43E8DC33-9320-4328-B019-E0163181A3C7}" type="datetimeFigureOut">
               <a:rPr lang="LID4096" smtClean="0"/>
-              <a:t>10/21/21</a:t>
+              <a:t>10/11/2022</a:t>
             </a:fld>
             <a:endParaRPr lang="LID4096"/>
           </a:p>
@@ -2753,7 +2753,7 @@
           <a:p>
             <a:fld id="{DF77F8B7-67C5-4A34-9D89-4D3855478B38}" type="datetime1">
               <a:rPr lang="LID4096" smtClean="0"/>
-              <a:t>10/21/21</a:t>
+              <a:t>10/11/2022</a:t>
             </a:fld>
             <a:endParaRPr lang="LID4096"/>
           </a:p>
@@ -2923,7 +2923,7 @@
           <a:p>
             <a:fld id="{2E01C644-7963-4809-9FF7-F9DF3305E547}" type="datetime1">
               <a:rPr lang="LID4096" smtClean="0"/>
-              <a:t>10/21/21</a:t>
+              <a:t>10/11/2022</a:t>
             </a:fld>
             <a:endParaRPr lang="LID4096"/>
           </a:p>
@@ -3103,7 +3103,7 @@
           <a:p>
             <a:fld id="{B04ECBB3-0644-4928-A7BE-41D4F8638333}" type="datetime1">
               <a:rPr lang="LID4096" smtClean="0"/>
-              <a:t>10/21/21</a:t>
+              <a:t>10/11/2022</a:t>
             </a:fld>
             <a:endParaRPr lang="LID4096"/>
           </a:p>
@@ -3273,7 +3273,7 @@
           <a:p>
             <a:fld id="{1E35827A-731F-4B00-B107-0A188EC60DAC}" type="datetime1">
               <a:rPr lang="LID4096" smtClean="0"/>
-              <a:t>10/21/21</a:t>
+              <a:t>10/11/2022</a:t>
             </a:fld>
             <a:endParaRPr lang="LID4096"/>
           </a:p>
@@ -3519,7 +3519,7 @@
           <a:p>
             <a:fld id="{D8E46D72-F593-4B40-B106-3EC660BC654E}" type="datetime1">
               <a:rPr lang="LID4096" smtClean="0"/>
-              <a:t>10/21/21</a:t>
+              <a:t>10/11/2022</a:t>
             </a:fld>
             <a:endParaRPr lang="LID4096"/>
           </a:p>
@@ -3751,7 +3751,7 @@
           <a:p>
             <a:fld id="{5D9F6076-8E4C-42D8-AF17-F97426B5A340}" type="datetime1">
               <a:rPr lang="LID4096" smtClean="0"/>
-              <a:t>10/21/21</a:t>
+              <a:t>10/11/2022</a:t>
             </a:fld>
             <a:endParaRPr lang="LID4096"/>
           </a:p>
@@ -4118,7 +4118,7 @@
           <a:p>
             <a:fld id="{CD567D47-60FF-4C64-862B-023FFBAD268A}" type="datetime1">
               <a:rPr lang="LID4096" smtClean="0"/>
-              <a:t>10/21/21</a:t>
+              <a:t>10/11/2022</a:t>
             </a:fld>
             <a:endParaRPr lang="LID4096"/>
           </a:p>
@@ -4236,7 +4236,7 @@
           <a:p>
             <a:fld id="{EFEF1EEE-FEBE-4D06-A0A4-D3C86B39934D}" type="datetime1">
               <a:rPr lang="LID4096" smtClean="0"/>
-              <a:t>10/21/21</a:t>
+              <a:t>10/11/2022</a:t>
             </a:fld>
             <a:endParaRPr lang="LID4096"/>
           </a:p>
@@ -4331,7 +4331,7 @@
           <a:p>
             <a:fld id="{EACC84AE-54D1-4B7D-8A6B-EF7CB9635BE3}" type="datetime1">
               <a:rPr lang="LID4096" smtClean="0"/>
-              <a:t>10/21/21</a:t>
+              <a:t>10/11/2022</a:t>
             </a:fld>
             <a:endParaRPr lang="LID4096"/>
           </a:p>
@@ -4608,7 +4608,7 @@
           <a:p>
             <a:fld id="{B227948E-2D54-4984-8A4B-70C1CA7F957B}" type="datetime1">
               <a:rPr lang="LID4096" smtClean="0"/>
-              <a:t>10/21/21</a:t>
+              <a:t>10/11/2022</a:t>
             </a:fld>
             <a:endParaRPr lang="LID4096"/>
           </a:p>
@@ -4865,7 +4865,7 @@
           <a:p>
             <a:fld id="{378B6861-8171-4936-A2D2-42381F04264D}" type="datetime1">
               <a:rPr lang="LID4096" smtClean="0"/>
-              <a:t>10/21/21</a:t>
+              <a:t>10/11/2022</a:t>
             </a:fld>
             <a:endParaRPr lang="LID4096"/>
           </a:p>
@@ -5078,7 +5078,7 @@
           <a:p>
             <a:fld id="{6D1357CB-971F-4825-B9C7-A50F10DC2193}" type="datetime1">
               <a:rPr lang="LID4096" smtClean="0"/>
-              <a:t>10/21/21</a:t>
+              <a:t>10/11/2022</a:t>
             </a:fld>
             <a:endParaRPr lang="LID4096"/>
           </a:p>
@@ -5720,12 +5720,12 @@
           <a:graphicData uri="http://schemas.openxmlformats.org/presentationml/2006/ole">
             <mc:AlternateContent xmlns:mc="http://schemas.openxmlformats.org/markup-compatibility/2006">
               <mc:Choice xmlns:v="urn:schemas-microsoft-com:vml" Requires="v">
-                <p:oleObj spid="_x0000_s1042" r:id="rId3" imgW="6984000" imgH="6323760" progId="">
+                <p:oleObj r:id="rId2" imgW="6984000" imgH="6323760" progId="">
                   <p:embed/>
                 </p:oleObj>
               </mc:Choice>
               <mc:Fallback>
-                <p:oleObj r:id="rId3" imgW="6984000" imgH="6323760" progId="">
+                <p:oleObj r:id="rId2" imgW="6984000" imgH="6323760" progId="">
                   <p:embed/>
                   <p:pic>
                     <p:nvPicPr>
@@ -5740,7 +5740,7 @@
                       <p:nvPr/>
                     </p:nvPicPr>
                     <p:blipFill>
-                      <a:blip r:embed="rId4"/>
+                      <a:blip r:embed="rId3"/>
                       <a:stretch>
                         <a:fillRect/>
                       </a:stretch>
@@ -5789,12 +5789,12 @@
           <a:graphicData uri="http://schemas.openxmlformats.org/presentationml/2006/ole">
             <mc:AlternateContent xmlns:mc="http://schemas.openxmlformats.org/markup-compatibility/2006">
               <mc:Choice xmlns:v="urn:schemas-microsoft-com:vml" Requires="v">
-                <p:oleObj spid="_x0000_s1043" r:id="rId5" imgW="6984000" imgH="6323760" progId="">
+                <p:oleObj r:id="rId4" imgW="6984000" imgH="6323760" progId="">
                   <p:embed/>
                 </p:oleObj>
               </mc:Choice>
               <mc:Fallback>
-                <p:oleObj r:id="rId5" imgW="6984000" imgH="6323760" progId="">
+                <p:oleObj r:id="rId4" imgW="6984000" imgH="6323760" progId="">
                   <p:embed/>
                   <p:pic>
                     <p:nvPicPr>
@@ -5809,7 +5809,7 @@
                       <p:nvPr/>
                     </p:nvPicPr>
                     <p:blipFill>
-                      <a:blip r:embed="rId6"/>
+                      <a:blip r:embed="rId5"/>
                       <a:stretch>
                         <a:fillRect/>
                       </a:stretch>
@@ -5982,7 +5982,7 @@
                 <a:latin typeface="Source Sans Pro Light" panose="020B0403030403020204" pitchFamily="34" charset="0"/>
                 <a:ea typeface="Source Sans Pro Light" panose="020B0403030403020204" pitchFamily="34" charset="0"/>
               </a:rPr>
-              <a:t>It is one of the most popular probabilistic programming languages as thousands of users rely on it for statistical modelling in many domains. It has an excellent support forum and great documentation. </a:t>
+              <a:t>It is probably the most popular probabilistic programming language as thousands of users rely on it for statistical modelling in many domains. It has an excellent support forum and great documentation. </a:t>
             </a:r>
           </a:p>
           <a:p>
@@ -6418,7 +6418,7 @@
                 <a:latin typeface="Consolas" panose="020B0609020204030204" pitchFamily="49" charset="0"/>
                 <a:ea typeface="Source Sans Pro Light" panose="020B0403030403020204" pitchFamily="34" charset="0"/>
               </a:rPr>
-              <a:t>int a[n];</a:t>
+              <a:t>array[n] int a;</a:t>
             </a:r>
           </a:p>
           <a:p>
@@ -6430,7 +6430,7 @@
                 <a:latin typeface="Consolas" panose="020B0609020204030204" pitchFamily="49" charset="0"/>
                 <a:ea typeface="Source Sans Pro Light" panose="020B0403030403020204" pitchFamily="34" charset="0"/>
               </a:rPr>
-              <a:t>real b[n];</a:t>
+              <a:t>array[n] real b;</a:t>
             </a:r>
           </a:p>
           <a:p>
@@ -6668,7 +6668,7 @@
                 <a:latin typeface="Consolas" panose="020B0609020204030204" pitchFamily="49" charset="0"/>
                 <a:ea typeface="Source Sans Pro Light" panose="020B0403030403020204" pitchFamily="34" charset="0"/>
               </a:rPr>
-              <a:t>int A[n, n];</a:t>
+              <a:t>array[n, n] int A;</a:t>
             </a:r>
           </a:p>
           <a:p>
@@ -8767,7 +8767,7 @@
                 <a:latin typeface="Source Sans Pro" panose="020B0503030403020204" pitchFamily="34" charset="0"/>
                 <a:ea typeface="Source Sans Pro" panose="020B0503030403020204" pitchFamily="34" charset="0"/>
               </a:rPr>
-              <a:t>Problems of the two approaches</a:t>
+              <a:t>Problems of the two basic approaches</a:t>
             </a:r>
             <a:endParaRPr lang="LID4096" sz="2800" b="1" dirty="0">
               <a:latin typeface="Source Sans Pro" panose="020B0503030403020204" pitchFamily="34" charset="0"/>
@@ -8808,7 +8808,7 @@
                 <a:latin typeface="Source Sans Pro Light" panose="020B0403030403020204" pitchFamily="34" charset="0"/>
                 <a:ea typeface="Source Sans Pro Light" panose="020B0403030403020204" pitchFamily="34" charset="0"/>
               </a:rPr>
-              <a:t>The two approaches (analytical, brute force) do not scale!</a:t>
+              <a:t>The two basic approaches (analytical, brute force) do not scale!</a:t>
             </a:r>
           </a:p>
           <a:p>
@@ -10631,7 +10631,7 @@
                 <a:latin typeface="Consolas" panose="020B0609020204030204" pitchFamily="49" charset="0"/>
                 <a:ea typeface="Source Sans Pro Light" panose="020B0403030403020204" pitchFamily="34" charset="0"/>
               </a:rPr>
-              <a:t>real array[2, 3];</a:t>
+              <a:t>array[2, 3] int A;</a:t>
             </a:r>
           </a:p>
           <a:p>
@@ -10657,7 +10657,7 @@
                 <a:latin typeface="Consolas" panose="020B0609020204030204" pitchFamily="49" charset="0"/>
                 <a:ea typeface="Source Sans Pro Light" panose="020B0403030403020204" pitchFamily="34" charset="0"/>
               </a:rPr>
-              <a:t> in array)</a:t>
+              <a:t> in A)</a:t>
             </a:r>
           </a:p>
           <a:p>
@@ -12265,7 +12265,7 @@
                 <a:latin typeface="Source Sans Pro Light" panose="020B0403030403020204" pitchFamily="34" charset="0"/>
                 <a:ea typeface="Source Sans Pro Light" panose="020B0403030403020204" pitchFamily="34" charset="0"/>
               </a:rPr>
-              <a:t>, python, R ...).</a:t>
+              <a:t>, python, R, Rust ...).</a:t>
             </a:r>
           </a:p>
           <a:p>
@@ -13228,82 +13228,30 @@
         </p:nvSpPr>
         <p:spPr>
           <a:xfrm>
-            <a:off x="1143000" y="2252715"/>
-            <a:ext cx="6858000" cy="1209569"/>
+            <a:off x="1143000" y="997770"/>
+            <a:ext cx="6858000" cy="3719460"/>
           </a:xfrm>
         </p:spPr>
         <p:txBody>
           <a:bodyPr>
-            <a:normAutofit fontScale="90000"/>
+            <a:noAutofit/>
           </a:bodyPr>
           <a:lstStyle/>
           <a:p>
             <a:r>
-              <a:rPr lang="en-US" sz="3200" b="1" dirty="0">
+              <a:rPr lang="en-US" sz="25600" b="1" dirty="0">
                 <a:latin typeface="Source Sans Pro" panose="020B0503030403020204" pitchFamily="34" charset="0"/>
                 <a:ea typeface="Source Sans Pro" panose="020B0503030403020204" pitchFamily="34" charset="0"/>
               </a:rPr>
-              <a:t>Questions, problems …</a:t>
-            </a:r>
-            <a:br>
-              <a:rPr lang="en-US" sz="3200" b="1" dirty="0">
-                <a:latin typeface="Source Sans Pro" panose="020B0503030403020204" pitchFamily="34" charset="0"/>
-                <a:ea typeface="Source Sans Pro" panose="020B0503030403020204" pitchFamily="34" charset="0"/>
-              </a:rPr>
-            </a:br>
-            <a:br>
-              <a:rPr lang="en-US" sz="3200" b="1" dirty="0">
-                <a:latin typeface="Source Sans Pro" panose="020B0503030403020204" pitchFamily="34" charset="0"/>
-                <a:ea typeface="Source Sans Pro" panose="020B0503030403020204" pitchFamily="34" charset="0"/>
-              </a:rPr>
-            </a:br>
-            <a:r>
-              <a:rPr lang="en-US" sz="2000" dirty="0">
-                <a:latin typeface="Source Sans Pro Light" panose="020B0403030403020204" pitchFamily="34" charset="0"/>
-                <a:ea typeface="Source Sans Pro Light" panose="020B0403030403020204" pitchFamily="34" charset="0"/>
-                <a:hlinkClick r:id="rId3"/>
-              </a:rPr>
-              <a:t>jure.demsar@fri.uni-lj.si</a:t>
-            </a:r>
-            <a:endParaRPr lang="LID4096" sz="5400" b="1" dirty="0">
+              <a:t>?</a:t>
+            </a:r>
+            <a:endParaRPr lang="LID4096" sz="25600" b="1" dirty="0">
               <a:latin typeface="Source Sans Pro" panose="020B0503030403020204" pitchFamily="34" charset="0"/>
               <a:ea typeface="Source Sans Pro" panose="020B0503030403020204" pitchFamily="34" charset="0"/>
             </a:endParaRPr>
           </a:p>
         </p:txBody>
       </p:sp>
-      <p:pic>
-        <p:nvPicPr>
-          <p:cNvPr id="7" name="Picture Placeholder 3" descr="A close up of a black background&#10;&#10;Description automatically generated">
-            <a:extLst>
-              <a:ext uri="{FF2B5EF4-FFF2-40B4-BE49-F238E27FC236}">
-                <a16:creationId xmlns:a16="http://schemas.microsoft.com/office/drawing/2014/main" id="{A09B267A-D8D3-46C2-9786-7155E1DB9256}"/>
-              </a:ext>
-            </a:extLst>
-          </p:cNvPr>
-          <p:cNvPicPr>
-            <a:picLocks noChangeAspect="1"/>
-          </p:cNvPicPr>
-          <p:nvPr/>
-        </p:nvPicPr>
-        <p:blipFill>
-          <a:blip r:embed="rId4">
-            <a:alphaModFix amt="5000"/>
-          </a:blip>
-          <a:stretch>
-            <a:fillRect/>
-          </a:stretch>
-        </p:blipFill>
-        <p:spPr>
-          <a:xfrm>
-            <a:off x="3019858" y="423402"/>
-            <a:ext cx="3104282" cy="4991544"/>
-          </a:xfrm>
-          <a:prstGeom prst="rect">
-            <a:avLst/>
-          </a:prstGeom>
-        </p:spPr>
-      </p:pic>
     </p:spTree>
     <p:extLst>
       <p:ext uri="{BB962C8B-B14F-4D97-AF65-F5344CB8AC3E}">

</xml_diff>

<commit_message>
Minor stylistics fixes to the second lecture.
</commit_message>
<xml_diff>
--- a/Session_02b_Probabilistic_programming/Probabilistic_programming.pptx
+++ b/Session_02b_Probabilistic_programming/Probabilistic_programming.pptx
@@ -5,7 +5,7 @@
     <p:sldMasterId id="2147483660" r:id="rId1"/>
   </p:sldMasterIdLst>
   <p:notesMasterIdLst>
-    <p:notesMasterId r:id="rId36"/>
+    <p:notesMasterId r:id="rId37"/>
   </p:notesMasterIdLst>
   <p:sldIdLst>
     <p:sldId id="295" r:id="rId2"/>
@@ -26,22 +26,23 @@
     <p:sldId id="310" r:id="rId17"/>
     <p:sldId id="311" r:id="rId18"/>
     <p:sldId id="312" r:id="rId19"/>
-    <p:sldId id="314" r:id="rId20"/>
-    <p:sldId id="315" r:id="rId21"/>
-    <p:sldId id="316" r:id="rId22"/>
-    <p:sldId id="317" r:id="rId23"/>
-    <p:sldId id="318" r:id="rId24"/>
-    <p:sldId id="319" r:id="rId25"/>
-    <p:sldId id="322" r:id="rId26"/>
-    <p:sldId id="323" r:id="rId27"/>
-    <p:sldId id="324" r:id="rId28"/>
-    <p:sldId id="325" r:id="rId29"/>
-    <p:sldId id="326" r:id="rId30"/>
-    <p:sldId id="327" r:id="rId31"/>
-    <p:sldId id="328" r:id="rId32"/>
-    <p:sldId id="329" r:id="rId33"/>
-    <p:sldId id="330" r:id="rId34"/>
-    <p:sldId id="331" r:id="rId35"/>
+    <p:sldId id="328" r:id="rId20"/>
+    <p:sldId id="314" r:id="rId21"/>
+    <p:sldId id="315" r:id="rId22"/>
+    <p:sldId id="316" r:id="rId23"/>
+    <p:sldId id="317" r:id="rId24"/>
+    <p:sldId id="318" r:id="rId25"/>
+    <p:sldId id="319" r:id="rId26"/>
+    <p:sldId id="322" r:id="rId27"/>
+    <p:sldId id="323" r:id="rId28"/>
+    <p:sldId id="324" r:id="rId29"/>
+    <p:sldId id="325" r:id="rId30"/>
+    <p:sldId id="326" r:id="rId31"/>
+    <p:sldId id="327" r:id="rId32"/>
+    <p:sldId id="332" r:id="rId33"/>
+    <p:sldId id="329" r:id="rId34"/>
+    <p:sldId id="330" r:id="rId35"/>
+    <p:sldId id="331" r:id="rId36"/>
   </p:sldIdLst>
   <p:sldSz cx="9144000" cy="5715000" type="screen16x10"/>
   <p:notesSz cx="6858000" cy="9144000"/>
@@ -1756,7 +1757,7 @@
           <a:p>
             <a:fld id="{43E8DC33-9320-4328-B019-E0163181A3C7}" type="datetimeFigureOut">
               <a:rPr lang="LID4096" smtClean="0"/>
-              <a:t>10/11/2022</a:t>
+              <a:t>10/12/22</a:t>
             </a:fld>
             <a:endParaRPr lang="LID4096"/>
           </a:p>
@@ -2262,7 +2263,7 @@
           <a:p>
             <a:fld id="{445B5041-6ABE-482D-8014-87CF18E72B1E}" type="slidenum">
               <a:rPr lang="LID4096" smtClean="0"/>
-              <a:t>30</a:t>
+              <a:t>19</a:t>
             </a:fld>
             <a:endParaRPr lang="LID4096"/>
           </a:p>
@@ -2271,7 +2272,7 @@
     </p:spTree>
     <p:extLst>
       <p:ext uri="{BB962C8B-B14F-4D97-AF65-F5344CB8AC3E}">
-        <p14:creationId xmlns:p14="http://schemas.microsoft.com/office/powerpoint/2010/main" val="1919024623"/>
+        <p14:creationId xmlns:p14="http://schemas.microsoft.com/office/powerpoint/2010/main" val="2379275323"/>
       </p:ext>
     </p:extLst>
   </p:cSld>
@@ -2355,7 +2356,7 @@
     </p:spTree>
     <p:extLst>
       <p:ext uri="{BB962C8B-B14F-4D97-AF65-F5344CB8AC3E}">
-        <p14:creationId xmlns:p14="http://schemas.microsoft.com/office/powerpoint/2010/main" val="2379275323"/>
+        <p14:creationId xmlns:p14="http://schemas.microsoft.com/office/powerpoint/2010/main" val="1919024623"/>
       </p:ext>
     </p:extLst>
   </p:cSld>
@@ -2439,7 +2440,7 @@
     </p:spTree>
     <p:extLst>
       <p:ext uri="{BB962C8B-B14F-4D97-AF65-F5344CB8AC3E}">
-        <p14:creationId xmlns:p14="http://schemas.microsoft.com/office/powerpoint/2010/main" val="89697770"/>
+        <p14:creationId xmlns:p14="http://schemas.microsoft.com/office/powerpoint/2010/main" val="4186951682"/>
       </p:ext>
     </p:extLst>
   </p:cSld>
@@ -2523,7 +2524,7 @@
     </p:spTree>
     <p:extLst>
       <p:ext uri="{BB962C8B-B14F-4D97-AF65-F5344CB8AC3E}">
-        <p14:creationId xmlns:p14="http://schemas.microsoft.com/office/powerpoint/2010/main" val="101558186"/>
+        <p14:creationId xmlns:p14="http://schemas.microsoft.com/office/powerpoint/2010/main" val="89697770"/>
       </p:ext>
     </p:extLst>
   </p:cSld>
@@ -2560,6 +2561,90 @@
             <p:ph type="sldImg"/>
           </p:nvPr>
         </p:nvSpPr>
+        <p:spPr/>
+      </p:sp>
+      <p:sp>
+        <p:nvSpPr>
+          <p:cNvPr id="3" name="Notes Placeholder 2"/>
+          <p:cNvSpPr>
+            <a:spLocks noGrp="1"/>
+          </p:cNvSpPr>
+          <p:nvPr>
+            <p:ph type="body" idx="1"/>
+          </p:nvPr>
+        </p:nvSpPr>
+        <p:spPr/>
+        <p:txBody>
+          <a:bodyPr/>
+          <a:lstStyle/>
+          <a:p>
+            <a:endParaRPr lang="LID4096" dirty="0"/>
+          </a:p>
+        </p:txBody>
+      </p:sp>
+      <p:sp>
+        <p:nvSpPr>
+          <p:cNvPr id="4" name="Slide Number Placeholder 3"/>
+          <p:cNvSpPr>
+            <a:spLocks noGrp="1"/>
+          </p:cNvSpPr>
+          <p:nvPr>
+            <p:ph type="sldNum" sz="quarter" idx="5"/>
+          </p:nvPr>
+        </p:nvSpPr>
+        <p:spPr/>
+        <p:txBody>
+          <a:bodyPr/>
+          <a:lstStyle/>
+          <a:p>
+            <a:fld id="{445B5041-6ABE-482D-8014-87CF18E72B1E}" type="slidenum">
+              <a:rPr lang="LID4096" smtClean="0"/>
+              <a:t>34</a:t>
+            </a:fld>
+            <a:endParaRPr lang="LID4096"/>
+          </a:p>
+        </p:txBody>
+      </p:sp>
+    </p:spTree>
+    <p:extLst>
+      <p:ext uri="{BB962C8B-B14F-4D97-AF65-F5344CB8AC3E}">
+        <p14:creationId xmlns:p14="http://schemas.microsoft.com/office/powerpoint/2010/main" val="101558186"/>
+      </p:ext>
+    </p:extLst>
+  </p:cSld>
+  <p:clrMapOvr>
+    <a:masterClrMapping/>
+  </p:clrMapOvr>
+</p:notes>
+</file>
+
+<file path=ppt/notesSlides/notesSlide8.xml><?xml version="1.0" encoding="utf-8"?>
+<p:notes xmlns:a="http://schemas.openxmlformats.org/drawingml/2006/main" xmlns:r="http://schemas.openxmlformats.org/officeDocument/2006/relationships" xmlns:p="http://schemas.openxmlformats.org/presentationml/2006/main">
+  <p:cSld>
+    <p:spTree>
+      <p:nvGrpSpPr>
+        <p:cNvPr id="1" name=""/>
+        <p:cNvGrpSpPr/>
+        <p:nvPr/>
+      </p:nvGrpSpPr>
+      <p:grpSpPr>
+        <a:xfrm>
+          <a:off x="0" y="0"/>
+          <a:ext cx="0" cy="0"/>
+          <a:chOff x="0" y="0"/>
+          <a:chExt cx="0" cy="0"/>
+        </a:xfrm>
+      </p:grpSpPr>
+      <p:sp>
+        <p:nvSpPr>
+          <p:cNvPr id="2" name="Slide Image Placeholder 1"/>
+          <p:cNvSpPr>
+            <a:spLocks noGrp="1" noRot="1" noChangeAspect="1"/>
+          </p:cNvSpPr>
+          <p:nvPr>
+            <p:ph type="sldImg"/>
+          </p:nvPr>
+        </p:nvSpPr>
         <p:spPr>
           <a:xfrm>
             <a:off x="960438" y="1143000"/>
@@ -2603,7 +2688,7 @@
           <a:p>
             <a:fld id="{445B5041-6ABE-482D-8014-87CF18E72B1E}" type="slidenum">
               <a:rPr lang="LID4096" smtClean="0"/>
-              <a:t>34</a:t>
+              <a:t>35</a:t>
             </a:fld>
             <a:endParaRPr lang="LID4096"/>
           </a:p>
@@ -2753,7 +2838,7 @@
           <a:p>
             <a:fld id="{DF77F8B7-67C5-4A34-9D89-4D3855478B38}" type="datetime1">
               <a:rPr lang="LID4096" smtClean="0"/>
-              <a:t>10/11/2022</a:t>
+              <a:t>10/12/22</a:t>
             </a:fld>
             <a:endParaRPr lang="LID4096"/>
           </a:p>
@@ -2923,7 +3008,7 @@
           <a:p>
             <a:fld id="{2E01C644-7963-4809-9FF7-F9DF3305E547}" type="datetime1">
               <a:rPr lang="LID4096" smtClean="0"/>
-              <a:t>10/11/2022</a:t>
+              <a:t>10/12/22</a:t>
             </a:fld>
             <a:endParaRPr lang="LID4096"/>
           </a:p>
@@ -3103,7 +3188,7 @@
           <a:p>
             <a:fld id="{B04ECBB3-0644-4928-A7BE-41D4F8638333}" type="datetime1">
               <a:rPr lang="LID4096" smtClean="0"/>
-              <a:t>10/11/2022</a:t>
+              <a:t>10/12/22</a:t>
             </a:fld>
             <a:endParaRPr lang="LID4096"/>
           </a:p>
@@ -3273,7 +3358,7 @@
           <a:p>
             <a:fld id="{1E35827A-731F-4B00-B107-0A188EC60DAC}" type="datetime1">
               <a:rPr lang="LID4096" smtClean="0"/>
-              <a:t>10/11/2022</a:t>
+              <a:t>10/12/22</a:t>
             </a:fld>
             <a:endParaRPr lang="LID4096"/>
           </a:p>
@@ -3519,7 +3604,7 @@
           <a:p>
             <a:fld id="{D8E46D72-F593-4B40-B106-3EC660BC654E}" type="datetime1">
               <a:rPr lang="LID4096" smtClean="0"/>
-              <a:t>10/11/2022</a:t>
+              <a:t>10/12/22</a:t>
             </a:fld>
             <a:endParaRPr lang="LID4096"/>
           </a:p>
@@ -3751,7 +3836,7 @@
           <a:p>
             <a:fld id="{5D9F6076-8E4C-42D8-AF17-F97426B5A340}" type="datetime1">
               <a:rPr lang="LID4096" smtClean="0"/>
-              <a:t>10/11/2022</a:t>
+              <a:t>10/12/22</a:t>
             </a:fld>
             <a:endParaRPr lang="LID4096"/>
           </a:p>
@@ -4118,7 +4203,7 @@
           <a:p>
             <a:fld id="{CD567D47-60FF-4C64-862B-023FFBAD268A}" type="datetime1">
               <a:rPr lang="LID4096" smtClean="0"/>
-              <a:t>10/11/2022</a:t>
+              <a:t>10/12/22</a:t>
             </a:fld>
             <a:endParaRPr lang="LID4096"/>
           </a:p>
@@ -4236,7 +4321,7 @@
           <a:p>
             <a:fld id="{EFEF1EEE-FEBE-4D06-A0A4-D3C86B39934D}" type="datetime1">
               <a:rPr lang="LID4096" smtClean="0"/>
-              <a:t>10/11/2022</a:t>
+              <a:t>10/12/22</a:t>
             </a:fld>
             <a:endParaRPr lang="LID4096"/>
           </a:p>
@@ -4331,7 +4416,7 @@
           <a:p>
             <a:fld id="{EACC84AE-54D1-4B7D-8A6B-EF7CB9635BE3}" type="datetime1">
               <a:rPr lang="LID4096" smtClean="0"/>
-              <a:t>10/11/2022</a:t>
+              <a:t>10/12/22</a:t>
             </a:fld>
             <a:endParaRPr lang="LID4096"/>
           </a:p>
@@ -4608,7 +4693,7 @@
           <a:p>
             <a:fld id="{B227948E-2D54-4984-8A4B-70C1CA7F957B}" type="datetime1">
               <a:rPr lang="LID4096" smtClean="0"/>
-              <a:t>10/11/2022</a:t>
+              <a:t>10/12/22</a:t>
             </a:fld>
             <a:endParaRPr lang="LID4096"/>
           </a:p>
@@ -4865,7 +4950,7 @@
           <a:p>
             <a:fld id="{378B6861-8171-4936-A2D2-42381F04264D}" type="datetime1">
               <a:rPr lang="LID4096" smtClean="0"/>
-              <a:t>10/11/2022</a:t>
+              <a:t>10/12/22</a:t>
             </a:fld>
             <a:endParaRPr lang="LID4096"/>
           </a:p>
@@ -5078,7 +5163,7 @@
           <a:p>
             <a:fld id="{6D1357CB-971F-4825-B9C7-A50F10DC2193}" type="datetime1">
               <a:rPr lang="LID4096" smtClean="0"/>
-              <a:t>10/11/2022</a:t>
+              <a:t>10/12/22</a:t>
             </a:fld>
             <a:endParaRPr lang="LID4096"/>
           </a:p>
@@ -6632,31 +6717,7 @@
                 <a:latin typeface="Consolas" panose="020B0609020204030204" pitchFamily="49" charset="0"/>
                 <a:ea typeface="Source Sans Pro Light" panose="020B0403030403020204" pitchFamily="34" charset="0"/>
               </a:rPr>
-              <a:t>// </a:t>
-            </a:r>
-            <a:r>
-              <a:rPr lang="en-US" sz="1600" dirty="0" err="1">
-                <a:solidFill>
-                  <a:schemeClr val="bg1">
-                    <a:lumMod val="65000"/>
-                  </a:schemeClr>
-                </a:solidFill>
-                <a:latin typeface="Consolas" panose="020B0609020204030204" pitchFamily="49" charset="0"/>
-                <a:ea typeface="Source Sans Pro Light" panose="020B0403030403020204" pitchFamily="34" charset="0"/>
-              </a:rPr>
-              <a:t>2D</a:t>
-            </a:r>
-            <a:r>
-              <a:rPr lang="en-US" sz="1600" dirty="0">
-                <a:solidFill>
-                  <a:schemeClr val="bg1">
-                    <a:lumMod val="65000"/>
-                  </a:schemeClr>
-                </a:solidFill>
-                <a:latin typeface="Consolas" panose="020B0609020204030204" pitchFamily="49" charset="0"/>
-                <a:ea typeface="Source Sans Pro Light" panose="020B0403030403020204" pitchFamily="34" charset="0"/>
-              </a:rPr>
-              <a:t> array matrix [rows, columns]</a:t>
+              <a:t>// 2D array [rows, columns]</a:t>
             </a:r>
           </a:p>
           <a:p>
@@ -8366,7 +8427,7 @@
           <p:nvPr/>
         </p:nvPicPr>
         <p:blipFill>
-          <a:blip r:embed="rId2">
+          <a:blip r:embed="rId3">
             <a:alphaModFix amt="5000"/>
             <a:extLst>
               <a:ext uri="{28A0092B-C50C-407E-A947-70E740481C1C}">
@@ -8390,43 +8451,6 @@
       </p:pic>
       <p:sp>
         <p:nvSpPr>
-          <p:cNvPr id="2" name="Title 1">
-            <a:extLst>
-              <a:ext uri="{FF2B5EF4-FFF2-40B4-BE49-F238E27FC236}">
-                <a16:creationId xmlns:a16="http://schemas.microsoft.com/office/drawing/2014/main" id="{5488FAB6-27FF-4F6E-B6A3-2E4E1E84283E}"/>
-              </a:ext>
-            </a:extLst>
-          </p:cNvPr>
-          <p:cNvSpPr>
-            <a:spLocks noGrp="1"/>
-          </p:cNvSpPr>
-          <p:nvPr>
-            <p:ph type="title"/>
-          </p:nvPr>
-        </p:nvSpPr>
-        <p:spPr/>
-        <p:txBody>
-          <a:bodyPr>
-            <a:normAutofit/>
-          </a:bodyPr>
-          <a:lstStyle/>
-          <a:p>
-            <a:r>
-              <a:rPr lang="en-US" sz="2800" b="1" dirty="0">
-                <a:latin typeface="Source Sans Pro" panose="020B0503030403020204" pitchFamily="34" charset="0"/>
-                <a:ea typeface="Source Sans Pro" panose="020B0503030403020204" pitchFamily="34" charset="0"/>
-              </a:rPr>
-              <a:t>Additional variable types in Stan</a:t>
-            </a:r>
-            <a:endParaRPr lang="LID4096" sz="2800" b="1" dirty="0">
-              <a:latin typeface="Source Sans Pro" panose="020B0503030403020204" pitchFamily="34" charset="0"/>
-              <a:ea typeface="Source Sans Pro" panose="020B0503030403020204" pitchFamily="34" charset="0"/>
-            </a:endParaRPr>
-          </a:p>
-        </p:txBody>
-      </p:sp>
-      <p:sp>
-        <p:nvSpPr>
           <p:cNvPr id="5" name="Slide Number Placeholder 4">
             <a:extLst>
               <a:ext uri="{FF2B5EF4-FFF2-40B4-BE49-F238E27FC236}">
@@ -8475,204 +8499,61 @@
       </p:sp>
       <p:sp>
         <p:nvSpPr>
-          <p:cNvPr id="7" name="Content Placeholder 6">
+          <p:cNvPr id="10" name="Title 1">
             <a:extLst>
               <a:ext uri="{FF2B5EF4-FFF2-40B4-BE49-F238E27FC236}">
-                <a16:creationId xmlns:a16="http://schemas.microsoft.com/office/drawing/2014/main" id="{831C9922-9DC3-4CEF-9A97-4C65415BF300}"/>
+                <a16:creationId xmlns:a16="http://schemas.microsoft.com/office/drawing/2014/main" id="{3B37C8E1-518D-4B8F-8EA7-56BAD539FFF7}"/>
               </a:ext>
             </a:extLst>
           </p:cNvPr>
-          <p:cNvSpPr>
-            <a:spLocks noGrp="1"/>
-          </p:cNvSpPr>
-          <p:nvPr>
-            <p:ph idx="1"/>
-          </p:nvPr>
-        </p:nvSpPr>
-        <p:spPr/>
-        <p:txBody>
-          <a:bodyPr>
-            <a:noAutofit/>
+          <p:cNvSpPr txBox="1">
+            <a:spLocks/>
+          </p:cNvSpPr>
+          <p:nvPr/>
+        </p:nvSpPr>
+        <p:spPr>
+          <a:xfrm>
+            <a:off x="3134497" y="2307070"/>
+            <a:ext cx="2875004" cy="1100859"/>
+          </a:xfrm>
+          <a:prstGeom prst="rect">
+            <a:avLst/>
+          </a:prstGeom>
+        </p:spPr>
+        <p:txBody>
+          <a:bodyPr vert="horz" lIns="91440" tIns="45720" rIns="91440" bIns="45720" rtlCol="0" anchor="ctr">
+            <a:normAutofit fontScale="97500"/>
           </a:bodyPr>
-          <a:lstStyle/>
-          <a:p>
-            <a:pPr marL="0" indent="0">
-              <a:buNone/>
-            </a:pPr>
-            <a:r>
-              <a:rPr lang="en-US" sz="1600" dirty="0">
+          <a:lstStyle>
+            <a:lvl1pPr algn="l" defTabSz="685800" rtl="0" eaLnBrk="1" latinLnBrk="0" hangingPunct="1">
+              <a:lnSpc>
+                <a:spcPct val="90000"/>
+              </a:lnSpc>
+              <a:spcBef>
+                <a:spcPct val="0"/>
+              </a:spcBef>
+              <a:buNone/>
+              <a:defRPr sz="3300" kern="1200">
                 <a:solidFill>
-                  <a:schemeClr val="bg1">
-                    <a:lumMod val="65000"/>
-                  </a:schemeClr>
+                  <a:schemeClr val="tx1"/>
                 </a:solidFill>
-                <a:latin typeface="Consolas" panose="020B0609020204030204" pitchFamily="49" charset="0"/>
-                <a:ea typeface="Source Sans Pro Light" panose="020B0403030403020204" pitchFamily="34" charset="0"/>
-              </a:rPr>
-              <a:t>// simplex is a vector of positive real numbers that sum up to 1</a:t>
-            </a:r>
-          </a:p>
-          <a:p>
-            <a:pPr marL="0" indent="0">
-              <a:buNone/>
-            </a:pPr>
-            <a:r>
-              <a:rPr lang="en-US" sz="1600" dirty="0">
-                <a:latin typeface="Consolas" panose="020B0609020204030204" pitchFamily="49" charset="0"/>
-                <a:ea typeface="Source Sans Pro Light" panose="020B0403030403020204" pitchFamily="34" charset="0"/>
-              </a:rPr>
-              <a:t>simplex[n] s;</a:t>
-            </a:r>
-          </a:p>
-          <a:p>
-            <a:pPr marL="0" indent="0">
-              <a:buNone/>
-            </a:pPr>
-            <a:endParaRPr lang="en-US" sz="1600" dirty="0">
-              <a:latin typeface="Consolas" panose="020B0609020204030204" pitchFamily="49" charset="0"/>
-              <a:ea typeface="Source Sans Pro Light" panose="020B0403030403020204" pitchFamily="34" charset="0"/>
-            </a:endParaRPr>
-          </a:p>
-          <a:p>
-            <a:pPr marL="0" indent="0">
-              <a:buNone/>
-            </a:pPr>
-            <a:r>
-              <a:rPr lang="en-US" sz="1600" dirty="0">
-                <a:solidFill>
-                  <a:schemeClr val="bg1">
-                    <a:lumMod val="65000"/>
-                  </a:schemeClr>
-                </a:solidFill>
-                <a:latin typeface="Consolas" panose="020B0609020204030204" pitchFamily="49" charset="0"/>
-                <a:ea typeface="Source Sans Pro Light" panose="020B0403030403020204" pitchFamily="34" charset="0"/>
-              </a:rPr>
-              <a:t>// unit vector - a vector of real values with Euclidian length of one</a:t>
-            </a:r>
-          </a:p>
-          <a:p>
-            <a:pPr marL="0" indent="0">
-              <a:buNone/>
-            </a:pPr>
-            <a:r>
-              <a:rPr lang="en-US" sz="1600" dirty="0" err="1">
-                <a:latin typeface="Consolas" panose="020B0609020204030204" pitchFamily="49" charset="0"/>
-                <a:ea typeface="Source Sans Pro Light" panose="020B0403030403020204" pitchFamily="34" charset="0"/>
-              </a:rPr>
-              <a:t>unit_vector</a:t>
-            </a:r>
-            <a:r>
-              <a:rPr lang="en-US" sz="1600" dirty="0">
-                <a:latin typeface="Consolas" panose="020B0609020204030204" pitchFamily="49" charset="0"/>
-                <a:ea typeface="Source Sans Pro Light" panose="020B0403030403020204" pitchFamily="34" charset="0"/>
-              </a:rPr>
-              <a:t>[n] </a:t>
-            </a:r>
-            <a:r>
-              <a:rPr lang="en-US" sz="1600" dirty="0" err="1">
-                <a:latin typeface="Consolas" panose="020B0609020204030204" pitchFamily="49" charset="0"/>
-                <a:ea typeface="Source Sans Pro Light" panose="020B0403030403020204" pitchFamily="34" charset="0"/>
-              </a:rPr>
-              <a:t>uv</a:t>
-            </a:r>
-            <a:r>
-              <a:rPr lang="en-US" sz="1600" dirty="0">
-                <a:latin typeface="Consolas" panose="020B0609020204030204" pitchFamily="49" charset="0"/>
-                <a:ea typeface="Source Sans Pro Light" panose="020B0403030403020204" pitchFamily="34" charset="0"/>
-              </a:rPr>
-              <a:t>;</a:t>
-            </a:r>
-          </a:p>
-          <a:p>
-            <a:pPr marL="0" indent="0">
-              <a:buNone/>
-            </a:pPr>
-            <a:endParaRPr lang="en-US" sz="1600" dirty="0">
-              <a:latin typeface="Consolas" panose="020B0609020204030204" pitchFamily="49" charset="0"/>
-              <a:ea typeface="Source Sans Pro Light" panose="020B0403030403020204" pitchFamily="34" charset="0"/>
-            </a:endParaRPr>
-          </a:p>
-          <a:p>
-            <a:pPr marL="0" indent="0">
-              <a:buNone/>
-            </a:pPr>
-            <a:r>
-              <a:rPr lang="en-US" sz="1600" dirty="0">
-                <a:solidFill>
-                  <a:schemeClr val="bg1">
-                    <a:lumMod val="65000"/>
-                  </a:schemeClr>
-                </a:solidFill>
-                <a:latin typeface="Consolas" panose="020B0609020204030204" pitchFamily="49" charset="0"/>
-                <a:ea typeface="Source Sans Pro Light" panose="020B0403030403020204" pitchFamily="34" charset="0"/>
-              </a:rPr>
-              <a:t>// ordered vectors contains ascendingly ordered real numbers</a:t>
-            </a:r>
-          </a:p>
-          <a:p>
-            <a:pPr marL="0" indent="0">
-              <a:buNone/>
-            </a:pPr>
-            <a:r>
-              <a:rPr lang="en-US" sz="1600" dirty="0">
-                <a:latin typeface="Consolas" panose="020B0609020204030204" pitchFamily="49" charset="0"/>
-                <a:ea typeface="Source Sans Pro Light" panose="020B0403030403020204" pitchFamily="34" charset="0"/>
-              </a:rPr>
-              <a:t>ordered[n] o;</a:t>
-            </a:r>
-          </a:p>
-          <a:p>
-            <a:pPr marL="0" indent="0">
-              <a:buNone/>
-            </a:pPr>
-            <a:endParaRPr lang="en-US" sz="1600" dirty="0">
-              <a:latin typeface="Consolas" panose="020B0609020204030204" pitchFamily="49" charset="0"/>
-              <a:ea typeface="Source Sans Pro Light" panose="020B0403030403020204" pitchFamily="34" charset="0"/>
-            </a:endParaRPr>
-          </a:p>
-          <a:p>
-            <a:pPr marL="0" indent="0">
-              <a:buNone/>
-            </a:pPr>
-            <a:r>
-              <a:rPr lang="en-US" sz="1600" dirty="0">
-                <a:solidFill>
-                  <a:schemeClr val="bg1">
-                    <a:lumMod val="65000"/>
-                  </a:schemeClr>
-                </a:solidFill>
-                <a:latin typeface="Consolas" panose="020B0609020204030204" pitchFamily="49" charset="0"/>
-                <a:ea typeface="Source Sans Pro Light" panose="020B0403030403020204" pitchFamily="34" charset="0"/>
-              </a:rPr>
-              <a:t>// positive ordered vector contains ordered positive real numbers</a:t>
-            </a:r>
-          </a:p>
-          <a:p>
-            <a:pPr marL="0" indent="0">
-              <a:buNone/>
-            </a:pPr>
-            <a:r>
-              <a:rPr lang="en-US" sz="1600" dirty="0" err="1">
-                <a:latin typeface="Consolas" panose="020B0609020204030204" pitchFamily="49" charset="0"/>
-                <a:ea typeface="Source Sans Pro Light" panose="020B0403030403020204" pitchFamily="34" charset="0"/>
-              </a:rPr>
-              <a:t>positive_ordered</a:t>
-            </a:r>
-            <a:r>
-              <a:rPr lang="en-US" sz="1600" dirty="0">
-                <a:latin typeface="Consolas" panose="020B0609020204030204" pitchFamily="49" charset="0"/>
-                <a:ea typeface="Source Sans Pro Light" panose="020B0403030403020204" pitchFamily="34" charset="0"/>
-              </a:rPr>
-              <a:t>[n] po;</a:t>
-            </a:r>
-          </a:p>
-          <a:p>
-            <a:pPr marL="0" indent="0">
-              <a:buNone/>
-            </a:pPr>
-            <a:endParaRPr lang="en-US" sz="1600" dirty="0">
-              <a:latin typeface="Consolas" panose="020B0609020204030204" pitchFamily="49" charset="0"/>
-              <a:ea typeface="Source Sans Pro Light" panose="020B0403030403020204" pitchFamily="34" charset="0"/>
+                <a:latin typeface="+mj-lt"/>
+                <a:ea typeface="+mj-ea"/>
+                <a:cs typeface="+mj-cs"/>
+              </a:defRPr>
+            </a:lvl1pPr>
+          </a:lstStyle>
+          <a:p>
+            <a:r>
+              <a:rPr lang="en-US" sz="3200" b="1" dirty="0">
+                <a:latin typeface="Source Sans Pro" panose="020B0503030403020204" pitchFamily="34" charset="0"/>
+                <a:ea typeface="Source Sans Pro" panose="020B0503030403020204" pitchFamily="34" charset="0"/>
+              </a:rPr>
+              <a:t>Coin-flip model</a:t>
+            </a:r>
+            <a:endParaRPr lang="LID4096" sz="5400" b="1" dirty="0">
+              <a:latin typeface="Source Sans Pro" panose="020B0503030403020204" pitchFamily="34" charset="0"/>
+              <a:ea typeface="Source Sans Pro" panose="020B0503030403020204" pitchFamily="34" charset="0"/>
             </a:endParaRPr>
           </a:p>
         </p:txBody>
@@ -8680,7 +8561,7 @@
     </p:spTree>
     <p:extLst>
       <p:ext uri="{BB962C8B-B14F-4D97-AF65-F5344CB8AC3E}">
-        <p14:creationId xmlns:p14="http://schemas.microsoft.com/office/powerpoint/2010/main" val="2932952615"/>
+        <p14:creationId xmlns:p14="http://schemas.microsoft.com/office/powerpoint/2010/main" val="1894891606"/>
       </p:ext>
     </p:extLst>
   </p:cSld>
@@ -9149,7 +9030,7 @@
                 <a:latin typeface="Consolas" panose="020B0609020204030204" pitchFamily="49" charset="0"/>
                 <a:ea typeface="Source Sans Pro Light" panose="020B0403030403020204" pitchFamily="34" charset="0"/>
               </a:rPr>
-              <a:t>// row vector</a:t>
+              <a:t>// simplex is a vector of positive real numbers that sum up to 1</a:t>
             </a:r>
           </a:p>
           <a:p>
@@ -9157,32 +9038,11 @@
               <a:buNone/>
             </a:pPr>
             <a:r>
-              <a:rPr lang="en-US" sz="1600" dirty="0" err="1">
-                <a:latin typeface="Consolas" panose="020B0609020204030204" pitchFamily="49" charset="0"/>
-                <a:ea typeface="Source Sans Pro Light" panose="020B0403030403020204" pitchFamily="34" charset="0"/>
-              </a:rPr>
-              <a:t>row_vector</a:t>
-            </a:r>
-            <a:r>
               <a:rPr lang="en-US" sz="1600" dirty="0">
                 <a:latin typeface="Consolas" panose="020B0609020204030204" pitchFamily="49" charset="0"/>
                 <a:ea typeface="Source Sans Pro Light" panose="020B0403030403020204" pitchFamily="34" charset="0"/>
               </a:rPr>
-              <a:t>[n] </a:t>
-            </a:r>
-            <a:r>
-              <a:rPr lang="en-US" sz="1600" dirty="0" err="1">
-                <a:latin typeface="Consolas" panose="020B0609020204030204" pitchFamily="49" charset="0"/>
-                <a:ea typeface="Source Sans Pro Light" panose="020B0403030403020204" pitchFamily="34" charset="0"/>
-              </a:rPr>
-              <a:t>rv</a:t>
-            </a:r>
-            <a:r>
-              <a:rPr lang="en-US" sz="1600" dirty="0">
-                <a:latin typeface="Consolas" panose="020B0609020204030204" pitchFamily="49" charset="0"/>
-                <a:ea typeface="Source Sans Pro Light" panose="020B0403030403020204" pitchFamily="34" charset="0"/>
-              </a:rPr>
-              <a:t>;</a:t>
+              <a:t>simplex[n] s;</a:t>
             </a:r>
           </a:p>
           <a:p>
@@ -9190,11 +9050,6 @@
               <a:buNone/>
             </a:pPr>
             <a:endParaRPr lang="en-US" sz="1600" dirty="0">
-              <a:solidFill>
-                <a:schemeClr val="bg1">
-                  <a:lumMod val="65000"/>
-                </a:schemeClr>
-              </a:solidFill>
               <a:latin typeface="Consolas" panose="020B0609020204030204" pitchFamily="49" charset="0"/>
               <a:ea typeface="Source Sans Pro Light" panose="020B0403030403020204" pitchFamily="34" charset="0"/>
             </a:endParaRPr>
@@ -9213,7 +9068,7 @@
                 <a:latin typeface="Consolas" panose="020B0609020204030204" pitchFamily="49" charset="0"/>
                 <a:ea typeface="Source Sans Pro Light" panose="020B0403030403020204" pitchFamily="34" charset="0"/>
               </a:rPr>
-              <a:t>// covariance matrices - symmetric and positive definite</a:t>
+              <a:t>// unit vector - a vector of real values with Euclidian length of one</a:t>
             </a:r>
           </a:p>
           <a:p>
@@ -9225,14 +9080,28 @@
                 <a:latin typeface="Consolas" panose="020B0609020204030204" pitchFamily="49" charset="0"/>
                 <a:ea typeface="Source Sans Pro Light" panose="020B0403030403020204" pitchFamily="34" charset="0"/>
               </a:rPr>
-              <a:t>cov_matrix</a:t>
+              <a:t>unit_vector</a:t>
             </a:r>
             <a:r>
               <a:rPr lang="en-US" sz="1600" dirty="0">
                 <a:latin typeface="Consolas" panose="020B0609020204030204" pitchFamily="49" charset="0"/>
                 <a:ea typeface="Source Sans Pro Light" panose="020B0403030403020204" pitchFamily="34" charset="0"/>
               </a:rPr>
-              <a:t>[K] Omega;</a:t>
+              <a:t>[n] </a:t>
+            </a:r>
+            <a:r>
+              <a:rPr lang="en-US" sz="1600" dirty="0" err="1">
+                <a:latin typeface="Consolas" panose="020B0609020204030204" pitchFamily="49" charset="0"/>
+                <a:ea typeface="Source Sans Pro Light" panose="020B0403030403020204" pitchFamily="34" charset="0"/>
+              </a:rPr>
+              <a:t>uv</a:t>
+            </a:r>
+            <a:r>
+              <a:rPr lang="en-US" sz="1600" dirty="0">
+                <a:latin typeface="Consolas" panose="020B0609020204030204" pitchFamily="49" charset="0"/>
+                <a:ea typeface="Source Sans Pro Light" panose="020B0403030403020204" pitchFamily="34" charset="0"/>
+              </a:rPr>
+              <a:t>;</a:t>
             </a:r>
           </a:p>
           <a:p>
@@ -9240,11 +9109,6 @@
               <a:buNone/>
             </a:pPr>
             <a:endParaRPr lang="en-US" sz="1600" dirty="0">
-              <a:solidFill>
-                <a:schemeClr val="bg1">
-                  <a:lumMod val="65000"/>
-                </a:schemeClr>
-              </a:solidFill>
               <a:latin typeface="Consolas" panose="020B0609020204030204" pitchFamily="49" charset="0"/>
               <a:ea typeface="Source Sans Pro Light" panose="020B0403030403020204" pitchFamily="34" charset="0"/>
             </a:endParaRPr>
@@ -9263,8 +9127,29 @@
                 <a:latin typeface="Consolas" panose="020B0609020204030204" pitchFamily="49" charset="0"/>
                 <a:ea typeface="Source Sans Pro Light" panose="020B0403030403020204" pitchFamily="34" charset="0"/>
               </a:rPr>
-              <a:t>// correlation matrices - symmetric and positive definite</a:t>
-            </a:r>
+              <a:t>// ordered vectors contains ascendingly ordered real numbers</a:t>
+            </a:r>
+          </a:p>
+          <a:p>
+            <a:pPr marL="0" indent="0">
+              <a:buNone/>
+            </a:pPr>
+            <a:r>
+              <a:rPr lang="en-US" sz="1600" dirty="0">
+                <a:latin typeface="Consolas" panose="020B0609020204030204" pitchFamily="49" charset="0"/>
+                <a:ea typeface="Source Sans Pro Light" panose="020B0403030403020204" pitchFamily="34" charset="0"/>
+              </a:rPr>
+              <a:t>ordered[n] o;</a:t>
+            </a:r>
+          </a:p>
+          <a:p>
+            <a:pPr marL="0" indent="0">
+              <a:buNone/>
+            </a:pPr>
+            <a:endParaRPr lang="en-US" sz="1600" dirty="0">
+              <a:latin typeface="Consolas" panose="020B0609020204030204" pitchFamily="49" charset="0"/>
+              <a:ea typeface="Source Sans Pro Light" panose="020B0403030403020204" pitchFamily="34" charset="0"/>
+            </a:endParaRPr>
           </a:p>
           <a:p>
             <a:pPr marL="0" indent="0">
@@ -9280,7 +9165,7 @@
                 <a:latin typeface="Consolas" panose="020B0609020204030204" pitchFamily="49" charset="0"/>
                 <a:ea typeface="Source Sans Pro Light" panose="020B0403030403020204" pitchFamily="34" charset="0"/>
               </a:rPr>
-              <a:t>// has entries between −1 and 1 and has a unit diagonal</a:t>
+              <a:t>// positive ordered vector contains ordered positive real numbers</a:t>
             </a:r>
           </a:p>
           <a:p>
@@ -9292,22 +9177,31 @@
                 <a:latin typeface="Consolas" panose="020B0609020204030204" pitchFamily="49" charset="0"/>
                 <a:ea typeface="Source Sans Pro Light" panose="020B0403030403020204" pitchFamily="34" charset="0"/>
               </a:rPr>
-              <a:t>corr_matrix</a:t>
+              <a:t>positive_ordered</a:t>
             </a:r>
             <a:r>
               <a:rPr lang="en-US" sz="1600" dirty="0">
                 <a:latin typeface="Consolas" panose="020B0609020204030204" pitchFamily="49" charset="0"/>
                 <a:ea typeface="Source Sans Pro Light" panose="020B0403030403020204" pitchFamily="34" charset="0"/>
               </a:rPr>
-              <a:t>[K] Sigma;</a:t>
-            </a:r>
+              <a:t>[n] po;</a:t>
+            </a:r>
+          </a:p>
+          <a:p>
+            <a:pPr marL="0" indent="0">
+              <a:buNone/>
+            </a:pPr>
+            <a:endParaRPr lang="en-US" sz="1600" dirty="0">
+              <a:latin typeface="Consolas" panose="020B0609020204030204" pitchFamily="49" charset="0"/>
+              <a:ea typeface="Source Sans Pro Light" panose="020B0403030403020204" pitchFamily="34" charset="0"/>
+            </a:endParaRPr>
           </a:p>
         </p:txBody>
       </p:sp>
     </p:spTree>
     <p:extLst>
       <p:ext uri="{BB962C8B-B14F-4D97-AF65-F5344CB8AC3E}">
-        <p14:creationId xmlns:p14="http://schemas.microsoft.com/office/powerpoint/2010/main" val="1503925251"/>
+        <p14:creationId xmlns:p14="http://schemas.microsoft.com/office/powerpoint/2010/main" val="2932952615"/>
       </p:ext>
     </p:extLst>
   </p:cSld>
@@ -9492,7 +9386,7 @@
                 <a:latin typeface="Consolas" panose="020B0609020204030204" pitchFamily="49" charset="0"/>
                 <a:ea typeface="Source Sans Pro Light" panose="020B0403030403020204" pitchFamily="34" charset="0"/>
               </a:rPr>
-              <a:t>// Cholesky factors of covariance matrices</a:t>
+              <a:t>// row vector</a:t>
             </a:r>
           </a:p>
           <a:p>
@@ -9504,14 +9398,28 @@
                 <a:latin typeface="Consolas" panose="020B0609020204030204" pitchFamily="49" charset="0"/>
                 <a:ea typeface="Source Sans Pro Light" panose="020B0403030403020204" pitchFamily="34" charset="0"/>
               </a:rPr>
-              <a:t>cholesky_factor_cov</a:t>
+              <a:t>row_vector</a:t>
             </a:r>
             <a:r>
               <a:rPr lang="en-US" sz="1600" dirty="0">
                 <a:latin typeface="Consolas" panose="020B0609020204030204" pitchFamily="49" charset="0"/>
                 <a:ea typeface="Source Sans Pro Light" panose="020B0403030403020204" pitchFamily="34" charset="0"/>
               </a:rPr>
-              <a:t>[K] L;</a:t>
+              <a:t>[n] </a:t>
+            </a:r>
+            <a:r>
+              <a:rPr lang="en-US" sz="1600" dirty="0" err="1">
+                <a:latin typeface="Consolas" panose="020B0609020204030204" pitchFamily="49" charset="0"/>
+                <a:ea typeface="Source Sans Pro Light" panose="020B0403030403020204" pitchFamily="34" charset="0"/>
+              </a:rPr>
+              <a:t>rv</a:t>
+            </a:r>
+            <a:r>
+              <a:rPr lang="en-US" sz="1600" dirty="0">
+                <a:latin typeface="Consolas" panose="020B0609020204030204" pitchFamily="49" charset="0"/>
+                <a:ea typeface="Source Sans Pro Light" panose="020B0403030403020204" pitchFamily="34" charset="0"/>
+              </a:rPr>
+              <a:t>;</a:t>
             </a:r>
           </a:p>
           <a:p>
@@ -9542,7 +9450,7 @@
                 <a:latin typeface="Consolas" panose="020B0609020204030204" pitchFamily="49" charset="0"/>
                 <a:ea typeface="Source Sans Pro Light" panose="020B0403030403020204" pitchFamily="34" charset="0"/>
               </a:rPr>
-              <a:t>// Cholesky factors of correlation matrices</a:t>
+              <a:t>// covariance matrices - symmetric and positive definite</a:t>
             </a:r>
           </a:p>
           <a:p>
@@ -9554,14 +9462,81 @@
                 <a:latin typeface="Consolas" panose="020B0609020204030204" pitchFamily="49" charset="0"/>
                 <a:ea typeface="Source Sans Pro Light" panose="020B0403030403020204" pitchFamily="34" charset="0"/>
               </a:rPr>
-              <a:t>cholesky_factor_corr</a:t>
+              <a:t>cov_matrix</a:t>
             </a:r>
             <a:r>
               <a:rPr lang="en-US" sz="1600" dirty="0">
                 <a:latin typeface="Consolas" panose="020B0609020204030204" pitchFamily="49" charset="0"/>
                 <a:ea typeface="Source Sans Pro Light" panose="020B0403030403020204" pitchFamily="34" charset="0"/>
               </a:rPr>
-              <a:t>[K] L;</a:t>
+              <a:t>[K] Omega;</a:t>
+            </a:r>
+          </a:p>
+          <a:p>
+            <a:pPr marL="0" indent="0">
+              <a:buNone/>
+            </a:pPr>
+            <a:endParaRPr lang="en-US" sz="1600" dirty="0">
+              <a:solidFill>
+                <a:schemeClr val="bg1">
+                  <a:lumMod val="65000"/>
+                </a:schemeClr>
+              </a:solidFill>
+              <a:latin typeface="Consolas" panose="020B0609020204030204" pitchFamily="49" charset="0"/>
+              <a:ea typeface="Source Sans Pro Light" panose="020B0403030403020204" pitchFamily="34" charset="0"/>
+            </a:endParaRPr>
+          </a:p>
+          <a:p>
+            <a:pPr marL="0" indent="0">
+              <a:buNone/>
+            </a:pPr>
+            <a:r>
+              <a:rPr lang="en-US" sz="1600" dirty="0">
+                <a:solidFill>
+                  <a:schemeClr val="bg1">
+                    <a:lumMod val="65000"/>
+                  </a:schemeClr>
+                </a:solidFill>
+                <a:latin typeface="Consolas" panose="020B0609020204030204" pitchFamily="49" charset="0"/>
+                <a:ea typeface="Source Sans Pro Light" panose="020B0403030403020204" pitchFamily="34" charset="0"/>
+              </a:rPr>
+              <a:t>// correlation matrices - symmetric and positive definite</a:t>
+            </a:r>
+          </a:p>
+          <a:p>
+            <a:pPr marL="0" indent="0">
+              <a:buNone/>
+            </a:pPr>
+            <a:r>
+              <a:rPr lang="en-US" sz="1600" dirty="0">
+                <a:solidFill>
+                  <a:schemeClr val="bg1">
+                    <a:lumMod val="65000"/>
+                  </a:schemeClr>
+                </a:solidFill>
+                <a:latin typeface="Consolas" panose="020B0609020204030204" pitchFamily="49" charset="0"/>
+                <a:ea typeface="Source Sans Pro Light" panose="020B0403030403020204" pitchFamily="34" charset="0"/>
+              </a:rPr>
+              <a:t>// has entries between −1 and 1 and has a unit diagonal</a:t>
+            </a:r>
+          </a:p>
+          <a:p>
+            <a:pPr marL="0" indent="0">
+              <a:buNone/>
+            </a:pPr>
+            <a:r>
+              <a:rPr lang="en-US" sz="1600" dirty="0" err="1">
+                <a:latin typeface="Consolas" panose="020B0609020204030204" pitchFamily="49" charset="0"/>
+                <a:ea typeface="Source Sans Pro Light" panose="020B0403030403020204" pitchFamily="34" charset="0"/>
+              </a:rPr>
+              <a:t>corr_matrix</a:t>
+            </a:r>
+            <a:r>
+              <a:rPr lang="en-US" sz="1600" dirty="0">
+                <a:latin typeface="Consolas" panose="020B0609020204030204" pitchFamily="49" charset="0"/>
+                <a:ea typeface="Source Sans Pro Light" panose="020B0403030403020204" pitchFamily="34" charset="0"/>
+              </a:rPr>
+              <a:t>[K] Sigma;</a:t>
             </a:r>
           </a:p>
         </p:txBody>
@@ -9569,7 +9544,7 @@
     </p:spTree>
     <p:extLst>
       <p:ext uri="{BB962C8B-B14F-4D97-AF65-F5344CB8AC3E}">
-        <p14:creationId xmlns:p14="http://schemas.microsoft.com/office/powerpoint/2010/main" val="716028375"/>
+        <p14:creationId xmlns:p14="http://schemas.microsoft.com/office/powerpoint/2010/main" val="1503925251"/>
       </p:ext>
     </p:extLst>
   </p:cSld>
@@ -9661,7 +9636,7 @@
                 <a:latin typeface="Source Sans Pro" panose="020B0503030403020204" pitchFamily="34" charset="0"/>
                 <a:ea typeface="Source Sans Pro" panose="020B0503030403020204" pitchFamily="34" charset="0"/>
               </a:rPr>
-              <a:t>Conditional statements</a:t>
+              <a:t>Additional variable types in Stan</a:t>
             </a:r>
             <a:endParaRPr lang="LID4096" sz="2800" b="1" dirty="0">
               <a:latin typeface="Source Sans Pro" panose="020B0503030403020204" pitchFamily="34" charset="0"/>
@@ -9746,10 +9721,15 @@
             </a:pPr>
             <a:r>
               <a:rPr lang="en-US" sz="1600" dirty="0">
-                <a:latin typeface="Consolas" panose="020B0609020204030204" pitchFamily="49" charset="0"/>
-                <a:ea typeface="Source Sans Pro Light" panose="020B0403030403020204" pitchFamily="34" charset="0"/>
-              </a:rPr>
-              <a:t>if (condition1) {</a:t>
+                <a:solidFill>
+                  <a:schemeClr val="bg1">
+                    <a:lumMod val="65000"/>
+                  </a:schemeClr>
+                </a:solidFill>
+                <a:latin typeface="Consolas" panose="020B0609020204030204" pitchFamily="49" charset="0"/>
+                <a:ea typeface="Source Sans Pro Light" panose="020B0403030403020204" pitchFamily="34" charset="0"/>
+              </a:rPr>
+              <a:t>// Cholesky factors of covariance matrices</a:t>
             </a:r>
           </a:p>
           <a:p>
@@ -9757,24 +9737,33 @@
               <a:buNone/>
             </a:pPr>
             <a:r>
+              <a:rPr lang="en-US" sz="1600" dirty="0" err="1">
+                <a:latin typeface="Consolas" panose="020B0609020204030204" pitchFamily="49" charset="0"/>
+                <a:ea typeface="Source Sans Pro Light" panose="020B0403030403020204" pitchFamily="34" charset="0"/>
+              </a:rPr>
+              <a:t>cholesky_factor_cov</a:t>
+            </a:r>
+            <a:r>
               <a:rPr lang="en-US" sz="1600" dirty="0">
                 <a:latin typeface="Consolas" panose="020B0609020204030204" pitchFamily="49" charset="0"/>
                 <a:ea typeface="Source Sans Pro Light" panose="020B0403030403020204" pitchFamily="34" charset="0"/>
               </a:rPr>
-              <a:t>  statements</a:t>
+              <a:t>[K] L;</a:t>
             </a:r>
           </a:p>
           <a:p>
             <a:pPr marL="0" indent="0">
               <a:buNone/>
             </a:pPr>
-            <a:r>
-              <a:rPr lang="en-US" sz="1600" dirty="0">
-                <a:latin typeface="Consolas" panose="020B0609020204030204" pitchFamily="49" charset="0"/>
-                <a:ea typeface="Source Sans Pro Light" panose="020B0403030403020204" pitchFamily="34" charset="0"/>
-              </a:rPr>
-              <a:t>}</a:t>
-            </a:r>
+            <a:endParaRPr lang="en-US" sz="1600" dirty="0">
+              <a:solidFill>
+                <a:schemeClr val="bg1">
+                  <a:lumMod val="65000"/>
+                </a:schemeClr>
+              </a:solidFill>
+              <a:latin typeface="Consolas" panose="020B0609020204030204" pitchFamily="49" charset="0"/>
+              <a:ea typeface="Source Sans Pro Light" panose="020B0403030403020204" pitchFamily="34" charset="0"/>
+            </a:endParaRPr>
           </a:p>
           <a:p>
             <a:pPr marL="0" indent="0">
@@ -9790,147 +9779,26 @@
                 <a:latin typeface="Consolas" panose="020B0609020204030204" pitchFamily="49" charset="0"/>
                 <a:ea typeface="Source Sans Pro Light" panose="020B0403030403020204" pitchFamily="34" charset="0"/>
               </a:rPr>
-              <a:t>// a comment</a:t>
-            </a:r>
-            <a:endParaRPr lang="en-US" sz="1600" dirty="0">
-              <a:latin typeface="Consolas" panose="020B0609020204030204" pitchFamily="49" charset="0"/>
-              <a:ea typeface="Source Sans Pro Light" panose="020B0403030403020204" pitchFamily="34" charset="0"/>
-            </a:endParaRPr>
+              <a:t>// Cholesky factors of correlation matrices</a:t>
+            </a:r>
           </a:p>
           <a:p>
             <a:pPr marL="0" indent="0">
               <a:buNone/>
             </a:pPr>
             <a:r>
+              <a:rPr lang="en-US" sz="1600" dirty="0" err="1">
+                <a:latin typeface="Consolas" panose="020B0609020204030204" pitchFamily="49" charset="0"/>
+                <a:ea typeface="Source Sans Pro Light" panose="020B0403030403020204" pitchFamily="34" charset="0"/>
+              </a:rPr>
+              <a:t>cholesky_factor_corr</a:t>
+            </a:r>
+            <a:r>
               <a:rPr lang="en-US" sz="1600" dirty="0">
                 <a:latin typeface="Consolas" panose="020B0609020204030204" pitchFamily="49" charset="0"/>
                 <a:ea typeface="Source Sans Pro Light" panose="020B0403030403020204" pitchFamily="34" charset="0"/>
               </a:rPr>
-              <a:t>else if (</a:t>
-            </a:r>
-            <a:r>
-              <a:rPr lang="en-US" sz="1600" dirty="0" err="1">
-                <a:latin typeface="Consolas" panose="020B0609020204030204" pitchFamily="49" charset="0"/>
-                <a:ea typeface="Source Sans Pro Light" panose="020B0403030403020204" pitchFamily="34" charset="0"/>
-              </a:rPr>
-              <a:t>condition2</a:t>
-            </a:r>
-            <a:r>
-              <a:rPr lang="en-US" sz="1600" dirty="0">
-                <a:latin typeface="Consolas" panose="020B0609020204030204" pitchFamily="49" charset="0"/>
-                <a:ea typeface="Source Sans Pro Light" panose="020B0403030403020204" pitchFamily="34" charset="0"/>
-              </a:rPr>
-              <a:t>)</a:t>
-            </a:r>
-          </a:p>
-          <a:p>
-            <a:pPr marL="0" indent="0">
-              <a:buNone/>
-            </a:pPr>
-            <a:r>
-              <a:rPr lang="en-US" sz="1600" dirty="0">
-                <a:latin typeface="Consolas" panose="020B0609020204030204" pitchFamily="49" charset="0"/>
-                <a:ea typeface="Source Sans Pro Light" panose="020B0403030403020204" pitchFamily="34" charset="0"/>
-              </a:rPr>
-              <a:t>  </a:t>
-            </a:r>
-            <a:r>
-              <a:rPr lang="en-US" sz="1600" dirty="0" err="1">
-                <a:latin typeface="Consolas" panose="020B0609020204030204" pitchFamily="49" charset="0"/>
-                <a:ea typeface="Source Sans Pro Light" panose="020B0403030403020204" pitchFamily="34" charset="0"/>
-              </a:rPr>
-              <a:t>statement2</a:t>
-            </a:r>
-            <a:endParaRPr lang="en-US" sz="1600" dirty="0">
-              <a:latin typeface="Consolas" panose="020B0609020204030204" pitchFamily="49" charset="0"/>
-              <a:ea typeface="Source Sans Pro Light" panose="020B0403030403020204" pitchFamily="34" charset="0"/>
-            </a:endParaRPr>
-          </a:p>
-          <a:p>
-            <a:pPr marL="0" indent="0">
-              <a:buNone/>
-            </a:pPr>
-            <a:r>
-              <a:rPr lang="en-US" sz="1600" dirty="0">
-                <a:solidFill>
-                  <a:schemeClr val="bg1">
-                    <a:lumMod val="65000"/>
-                  </a:schemeClr>
-                </a:solidFill>
-                <a:latin typeface="Consolas" panose="020B0609020204030204" pitchFamily="49" charset="0"/>
-                <a:ea typeface="Source Sans Pro Light" panose="020B0403030403020204" pitchFamily="34" charset="0"/>
-              </a:rPr>
-              <a:t>/*</a:t>
-            </a:r>
-          </a:p>
-          <a:p>
-            <a:pPr marL="0" indent="0">
-              <a:buNone/>
-            </a:pPr>
-            <a:r>
-              <a:rPr lang="en-US" sz="1600" dirty="0">
-                <a:solidFill>
-                  <a:schemeClr val="bg1">
-                    <a:lumMod val="65000"/>
-                  </a:schemeClr>
-                </a:solidFill>
-                <a:latin typeface="Consolas" panose="020B0609020204030204" pitchFamily="49" charset="0"/>
-                <a:ea typeface="Source Sans Pro Light" panose="020B0403030403020204" pitchFamily="34" charset="0"/>
-              </a:rPr>
-              <a:t>a comment block</a:t>
-            </a:r>
-          </a:p>
-          <a:p>
-            <a:pPr marL="0" indent="0">
-              <a:buNone/>
-            </a:pPr>
-            <a:r>
-              <a:rPr lang="en-US" sz="1600" dirty="0">
-                <a:solidFill>
-                  <a:schemeClr val="bg1">
-                    <a:lumMod val="65000"/>
-                  </a:schemeClr>
-                </a:solidFill>
-                <a:latin typeface="Consolas" panose="020B0609020204030204" pitchFamily="49" charset="0"/>
-                <a:ea typeface="Source Sans Pro Light" panose="020B0403030403020204" pitchFamily="34" charset="0"/>
-              </a:rPr>
-              <a:t>*/</a:t>
-            </a:r>
-          </a:p>
-          <a:p>
-            <a:pPr marL="0" indent="0">
-              <a:buNone/>
-            </a:pPr>
-            <a:r>
-              <a:rPr lang="en-US" sz="1600" dirty="0">
-                <a:latin typeface="Consolas" panose="020B0609020204030204" pitchFamily="49" charset="0"/>
-                <a:ea typeface="Source Sans Pro Light" panose="020B0403030403020204" pitchFamily="34" charset="0"/>
-              </a:rPr>
-              <a:t>else {</a:t>
-            </a:r>
-          </a:p>
-          <a:p>
-            <a:pPr marL="0" indent="0">
-              <a:buNone/>
-            </a:pPr>
-            <a:r>
-              <a:rPr lang="en-US" sz="1600" dirty="0">
-                <a:latin typeface="Consolas" panose="020B0609020204030204" pitchFamily="49" charset="0"/>
-                <a:ea typeface="Source Sans Pro Light" panose="020B0403030403020204" pitchFamily="34" charset="0"/>
-              </a:rPr>
-              <a:t>  statements</a:t>
-            </a:r>
-          </a:p>
-          <a:p>
-            <a:pPr marL="0" indent="0">
-              <a:buNone/>
-            </a:pPr>
-            <a:r>
-              <a:rPr lang="en-US" sz="1600" dirty="0">
-                <a:latin typeface="Consolas" panose="020B0609020204030204" pitchFamily="49" charset="0"/>
-                <a:ea typeface="Source Sans Pro Light" panose="020B0403030403020204" pitchFamily="34" charset="0"/>
-              </a:rPr>
-              <a:t>}</a:t>
+              <a:t>[K] L;</a:t>
             </a:r>
           </a:p>
         </p:txBody>
@@ -9938,7 +9806,7 @@
     </p:spTree>
     <p:extLst>
       <p:ext uri="{BB962C8B-B14F-4D97-AF65-F5344CB8AC3E}">
-        <p14:creationId xmlns:p14="http://schemas.microsoft.com/office/powerpoint/2010/main" val="470333862"/>
+        <p14:creationId xmlns:p14="http://schemas.microsoft.com/office/powerpoint/2010/main" val="716028375"/>
       </p:ext>
     </p:extLst>
   </p:cSld>
@@ -10030,7 +9898,7 @@
                 <a:latin typeface="Source Sans Pro" panose="020B0503030403020204" pitchFamily="34" charset="0"/>
                 <a:ea typeface="Source Sans Pro" panose="020B0503030403020204" pitchFamily="34" charset="0"/>
               </a:rPr>
-              <a:t>For loops</a:t>
+              <a:t>Conditional statements</a:t>
             </a:r>
             <a:endParaRPr lang="LID4096" sz="2800" b="1" dirty="0">
               <a:latin typeface="Source Sans Pro" panose="020B0503030403020204" pitchFamily="34" charset="0"/>
@@ -10113,15 +9981,37 @@
             <a:pPr marL="0" indent="0">
               <a:buNone/>
             </a:pPr>
-            <a:endParaRPr lang="en-US" sz="1600" dirty="0">
-              <a:solidFill>
-                <a:schemeClr val="bg1">
-                  <a:lumMod val="65000"/>
-                </a:schemeClr>
-              </a:solidFill>
-              <a:latin typeface="Consolas" panose="020B0609020204030204" pitchFamily="49" charset="0"/>
-              <a:ea typeface="Source Sans Pro Light" panose="020B0403030403020204" pitchFamily="34" charset="0"/>
-            </a:endParaRPr>
+            <a:r>
+              <a:rPr lang="en-US" sz="1600" dirty="0">
+                <a:latin typeface="Consolas" panose="020B0609020204030204" pitchFamily="49" charset="0"/>
+                <a:ea typeface="Source Sans Pro Light" panose="020B0403030403020204" pitchFamily="34" charset="0"/>
+              </a:rPr>
+              <a:t>if (condition1) {</a:t>
+            </a:r>
+          </a:p>
+          <a:p>
+            <a:pPr marL="0" indent="0">
+              <a:buNone/>
+            </a:pPr>
+            <a:r>
+              <a:rPr lang="en-US" sz="1600" dirty="0">
+                <a:latin typeface="Consolas" panose="020B0609020204030204" pitchFamily="49" charset="0"/>
+                <a:ea typeface="Source Sans Pro Light" panose="020B0403030403020204" pitchFamily="34" charset="0"/>
+              </a:rPr>
+              <a:t>  statements</a:t>
+            </a:r>
+          </a:p>
+          <a:p>
+            <a:pPr marL="0" indent="0">
+              <a:buNone/>
+            </a:pPr>
+            <a:r>
+              <a:rPr lang="en-US" sz="1600" dirty="0">
+                <a:latin typeface="Consolas" panose="020B0609020204030204" pitchFamily="49" charset="0"/>
+                <a:ea typeface="Source Sans Pro Light" panose="020B0403030403020204" pitchFamily="34" charset="0"/>
+              </a:rPr>
+              <a:t>}</a:t>
+            </a:r>
           </a:p>
           <a:p>
             <a:pPr marL="0" indent="0">
@@ -10137,7 +10027,7 @@
                 <a:latin typeface="Consolas" panose="020B0609020204030204" pitchFamily="49" charset="0"/>
                 <a:ea typeface="Source Sans Pro Light" panose="020B0403030403020204" pitchFamily="34" charset="0"/>
               </a:rPr>
-              <a:t>// this is a for loop</a:t>
+              <a:t>// a comment</a:t>
             </a:r>
             <a:endParaRPr lang="en-US" sz="1600" dirty="0">
               <a:latin typeface="Consolas" panose="020B0609020204030204" pitchFamily="49" charset="0"/>
@@ -10153,21 +10043,21 @@
                 <a:latin typeface="Consolas" panose="020B0609020204030204" pitchFamily="49" charset="0"/>
                 <a:ea typeface="Source Sans Pro Light" panose="020B0403030403020204" pitchFamily="34" charset="0"/>
               </a:rPr>
-              <a:t>for (n in </a:t>
+              <a:t>else if (</a:t>
             </a:r>
             <a:r>
               <a:rPr lang="en-US" sz="1600" dirty="0" err="1">
                 <a:latin typeface="Consolas" panose="020B0609020204030204" pitchFamily="49" charset="0"/>
                 <a:ea typeface="Source Sans Pro Light" panose="020B0403030403020204" pitchFamily="34" charset="0"/>
               </a:rPr>
-              <a:t>1:N</a:t>
+              <a:t>condition2</a:t>
             </a:r>
             <a:r>
               <a:rPr lang="en-US" sz="1600" dirty="0">
                 <a:latin typeface="Consolas" panose="020B0609020204030204" pitchFamily="49" charset="0"/>
                 <a:ea typeface="Source Sans Pro Light" panose="020B0403030403020204" pitchFamily="34" charset="0"/>
               </a:rPr>
-              <a:t>) {</a:t>
+              <a:t>)</a:t>
             </a:r>
           </a:p>
           <a:p>
@@ -10179,39 +10069,15 @@
                 <a:latin typeface="Consolas" panose="020B0609020204030204" pitchFamily="49" charset="0"/>
                 <a:ea typeface="Source Sans Pro Light" panose="020B0403030403020204" pitchFamily="34" charset="0"/>
               </a:rPr>
-              <a:t>  y[n] ~ </a:t>
+              <a:t>  </a:t>
             </a:r>
             <a:r>
               <a:rPr lang="en-US" sz="1600" dirty="0" err="1">
                 <a:latin typeface="Consolas" panose="020B0609020204030204" pitchFamily="49" charset="0"/>
                 <a:ea typeface="Source Sans Pro Light" panose="020B0403030403020204" pitchFamily="34" charset="0"/>
               </a:rPr>
-              <a:t>bernoulli</a:t>
-            </a:r>
-            <a:r>
-              <a:rPr lang="en-US" sz="1600" dirty="0">
-                <a:latin typeface="Consolas" panose="020B0609020204030204" pitchFamily="49" charset="0"/>
-                <a:ea typeface="Source Sans Pro Light" panose="020B0403030403020204" pitchFamily="34" charset="0"/>
-              </a:rPr>
-              <a:t>(theta);</a:t>
-            </a:r>
-          </a:p>
-          <a:p>
-            <a:pPr marL="0" indent="0">
-              <a:buNone/>
-            </a:pPr>
-            <a:r>
-              <a:rPr lang="en-US" sz="1600" dirty="0">
-                <a:latin typeface="Consolas" panose="020B0609020204030204" pitchFamily="49" charset="0"/>
-                <a:ea typeface="Source Sans Pro Light" panose="020B0403030403020204" pitchFamily="34" charset="0"/>
-              </a:rPr>
-              <a:t>} </a:t>
-            </a:r>
-          </a:p>
-          <a:p>
-            <a:pPr marL="0" indent="0">
-              <a:buNone/>
-            </a:pPr>
+              <a:t>statement2</a:t>
+            </a:r>
             <a:endParaRPr lang="en-US" sz="1600" dirty="0">
               <a:latin typeface="Consolas" panose="020B0609020204030204" pitchFamily="49" charset="0"/>
               <a:ea typeface="Source Sans Pro Light" panose="020B0403030403020204" pitchFamily="34" charset="0"/>
@@ -10231,7 +10097,7 @@
                 <a:latin typeface="Consolas" panose="020B0609020204030204" pitchFamily="49" charset="0"/>
                 <a:ea typeface="Source Sans Pro Light" panose="020B0403030403020204" pitchFamily="34" charset="0"/>
               </a:rPr>
-              <a:t>// Stan is quite smart, as you saw in our first example</a:t>
+              <a:t>/*</a:t>
             </a:r>
           </a:p>
           <a:p>
@@ -10248,12 +10114,8 @@
                 <a:latin typeface="Consolas" panose="020B0609020204030204" pitchFamily="49" charset="0"/>
                 <a:ea typeface="Source Sans Pro Light" panose="020B0403030403020204" pitchFamily="34" charset="0"/>
               </a:rPr>
-              <a:t>// the above can be simplified (presuming y is a vector or an array)</a:t>
-            </a:r>
-            <a:endParaRPr lang="en-US" sz="1600" dirty="0">
-              <a:latin typeface="Consolas" panose="020B0609020204030204" pitchFamily="49" charset="0"/>
-              <a:ea typeface="Source Sans Pro Light" panose="020B0403030403020204" pitchFamily="34" charset="0"/>
-            </a:endParaRPr>
+              <a:t>a comment block</a:t>
+            </a:r>
           </a:p>
           <a:p>
             <a:pPr marL="0" indent="0">
@@ -10261,24 +10123,51 @@
             </a:pPr>
             <a:r>
               <a:rPr lang="en-US" sz="1600" dirty="0">
-                <a:latin typeface="Consolas" panose="020B0609020204030204" pitchFamily="49" charset="0"/>
-                <a:ea typeface="Source Sans Pro Light" panose="020B0403030403020204" pitchFamily="34" charset="0"/>
-              </a:rPr>
-              <a:t>y ~ </a:t>
-            </a:r>
-            <a:r>
-              <a:rPr lang="en-US" sz="1600" dirty="0" err="1">
-                <a:latin typeface="Consolas" panose="020B0609020204030204" pitchFamily="49" charset="0"/>
-                <a:ea typeface="Source Sans Pro Light" panose="020B0403030403020204" pitchFamily="34" charset="0"/>
-              </a:rPr>
-              <a:t>bernoulli</a:t>
-            </a:r>
+                <a:solidFill>
+                  <a:schemeClr val="bg1">
+                    <a:lumMod val="65000"/>
+                  </a:schemeClr>
+                </a:solidFill>
+                <a:latin typeface="Consolas" panose="020B0609020204030204" pitchFamily="49" charset="0"/>
+                <a:ea typeface="Source Sans Pro Light" panose="020B0403030403020204" pitchFamily="34" charset="0"/>
+              </a:rPr>
+              <a:t>*/</a:t>
+            </a:r>
+          </a:p>
+          <a:p>
+            <a:pPr marL="0" indent="0">
+              <a:buNone/>
+            </a:pPr>
             <a:r>
               <a:rPr lang="en-US" sz="1600" dirty="0">
                 <a:latin typeface="Consolas" panose="020B0609020204030204" pitchFamily="49" charset="0"/>
                 <a:ea typeface="Source Sans Pro Light" panose="020B0403030403020204" pitchFamily="34" charset="0"/>
               </a:rPr>
-              <a:t>(theta);</a:t>
+              <a:t>else {</a:t>
+            </a:r>
+          </a:p>
+          <a:p>
+            <a:pPr marL="0" indent="0">
+              <a:buNone/>
+            </a:pPr>
+            <a:r>
+              <a:rPr lang="en-US" sz="1600" dirty="0">
+                <a:latin typeface="Consolas" panose="020B0609020204030204" pitchFamily="49" charset="0"/>
+                <a:ea typeface="Source Sans Pro Light" panose="020B0403030403020204" pitchFamily="34" charset="0"/>
+              </a:rPr>
+              <a:t>  statements</a:t>
+            </a:r>
+          </a:p>
+          <a:p>
+            <a:pPr marL="0" indent="0">
+              <a:buNone/>
+            </a:pPr>
+            <a:r>
+              <a:rPr lang="en-US" sz="1600" dirty="0">
+                <a:latin typeface="Consolas" panose="020B0609020204030204" pitchFamily="49" charset="0"/>
+                <a:ea typeface="Source Sans Pro Light" panose="020B0403030403020204" pitchFamily="34" charset="0"/>
+              </a:rPr>
+              <a:t>}</a:t>
             </a:r>
           </a:p>
         </p:txBody>
@@ -10286,7 +10175,7 @@
     </p:spTree>
     <p:extLst>
       <p:ext uri="{BB962C8B-B14F-4D97-AF65-F5344CB8AC3E}">
-        <p14:creationId xmlns:p14="http://schemas.microsoft.com/office/powerpoint/2010/main" val="391985812"/>
+        <p14:creationId xmlns:p14="http://schemas.microsoft.com/office/powerpoint/2010/main" val="470333862"/>
       </p:ext>
     </p:extLst>
   </p:cSld>
@@ -10378,7 +10267,7 @@
                 <a:latin typeface="Source Sans Pro" panose="020B0503030403020204" pitchFamily="34" charset="0"/>
                 <a:ea typeface="Source Sans Pro" panose="020B0503030403020204" pitchFamily="34" charset="0"/>
               </a:rPr>
-              <a:t>“Foreach” loops</a:t>
+              <a:t>For loops</a:t>
             </a:r>
             <a:endParaRPr lang="LID4096" sz="2800" b="1" dirty="0">
               <a:latin typeface="Source Sans Pro" panose="020B0503030403020204" pitchFamily="34" charset="0"/>
@@ -10461,6 +10350,20 @@
             <a:pPr marL="0" indent="0">
               <a:buNone/>
             </a:pPr>
+            <a:endParaRPr lang="en-US" sz="1600" dirty="0">
+              <a:solidFill>
+                <a:schemeClr val="bg1">
+                  <a:lumMod val="65000"/>
+                </a:schemeClr>
+              </a:solidFill>
+              <a:latin typeface="Consolas" panose="020B0609020204030204" pitchFamily="49" charset="0"/>
+              <a:ea typeface="Source Sans Pro Light" panose="020B0403030403020204" pitchFamily="34" charset="0"/>
+            </a:endParaRPr>
+          </a:p>
+          <a:p>
+            <a:pPr marL="0" indent="0">
+              <a:buNone/>
+            </a:pPr>
             <a:r>
               <a:rPr lang="en-US" sz="1600" dirty="0">
                 <a:solidFill>
@@ -10471,8 +10374,12 @@
                 <a:latin typeface="Consolas" panose="020B0609020204030204" pitchFamily="49" charset="0"/>
                 <a:ea typeface="Source Sans Pro Light" panose="020B0403030403020204" pitchFamily="34" charset="0"/>
               </a:rPr>
-              <a:t>// if items is a container (vector, row vector, matrix, or array)</a:t>
-            </a:r>
+              <a:t>// this is a for loop</a:t>
+            </a:r>
+            <a:endParaRPr lang="en-US" sz="1600" dirty="0">
+              <a:latin typeface="Consolas" panose="020B0609020204030204" pitchFamily="49" charset="0"/>
+              <a:ea typeface="Source Sans Pro Light" panose="020B0403030403020204" pitchFamily="34" charset="0"/>
+            </a:endParaRPr>
           </a:p>
           <a:p>
             <a:pPr marL="0" indent="0">
@@ -10483,21 +10390,21 @@
                 <a:latin typeface="Consolas" panose="020B0609020204030204" pitchFamily="49" charset="0"/>
                 <a:ea typeface="Source Sans Pro Light" panose="020B0403030403020204" pitchFamily="34" charset="0"/>
               </a:rPr>
-              <a:t>for (</a:t>
+              <a:t>for (n in </a:t>
             </a:r>
             <a:r>
               <a:rPr lang="en-US" sz="1600" dirty="0" err="1">
                 <a:latin typeface="Consolas" panose="020B0609020204030204" pitchFamily="49" charset="0"/>
                 <a:ea typeface="Source Sans Pro Light" panose="020B0403030403020204" pitchFamily="34" charset="0"/>
               </a:rPr>
-              <a:t>i</a:t>
+              <a:t>1:N</a:t>
             </a:r>
             <a:r>
               <a:rPr lang="en-US" sz="1600" dirty="0">
                 <a:latin typeface="Consolas" panose="020B0609020204030204" pitchFamily="49" charset="0"/>
                 <a:ea typeface="Source Sans Pro Light" panose="020B0403030403020204" pitchFamily="34" charset="0"/>
               </a:rPr>
-              <a:t> in items) {</a:t>
+              <a:t>) {</a:t>
             </a:r>
           </a:p>
           <a:p>
@@ -10509,21 +10416,21 @@
                 <a:latin typeface="Consolas" panose="020B0609020204030204" pitchFamily="49" charset="0"/>
                 <a:ea typeface="Source Sans Pro Light" panose="020B0403030403020204" pitchFamily="34" charset="0"/>
               </a:rPr>
-              <a:t>  ... do something with </a:t>
+              <a:t>  y[n] ~ </a:t>
             </a:r>
             <a:r>
               <a:rPr lang="en-US" sz="1600" dirty="0" err="1">
                 <a:latin typeface="Consolas" panose="020B0609020204030204" pitchFamily="49" charset="0"/>
                 <a:ea typeface="Source Sans Pro Light" panose="020B0403030403020204" pitchFamily="34" charset="0"/>
               </a:rPr>
-              <a:t>i</a:t>
+              <a:t>bernoulli</a:t>
             </a:r>
             <a:r>
               <a:rPr lang="en-US" sz="1600" dirty="0">
                 <a:latin typeface="Consolas" panose="020B0609020204030204" pitchFamily="49" charset="0"/>
                 <a:ea typeface="Source Sans Pro Light" panose="020B0403030403020204" pitchFamily="34" charset="0"/>
               </a:rPr>
-              <a:t> ...</a:t>
+              <a:t>(theta);</a:t>
             </a:r>
           </a:p>
           <a:p>
@@ -10535,7 +10442,7 @@
                 <a:latin typeface="Consolas" panose="020B0609020204030204" pitchFamily="49" charset="0"/>
                 <a:ea typeface="Source Sans Pro Light" panose="020B0403030403020204" pitchFamily="34" charset="0"/>
               </a:rPr>
-              <a:t>}</a:t>
+              <a:t>} </a:t>
             </a:r>
           </a:p>
           <a:p>
@@ -10561,20 +10468,13 @@
                 <a:latin typeface="Consolas" panose="020B0609020204030204" pitchFamily="49" charset="0"/>
                 <a:ea typeface="Source Sans Pro Light" panose="020B0403030403020204" pitchFamily="34" charset="0"/>
               </a:rPr>
-              <a:t>// for </a:t>
-            </a:r>
-            <a:r>
-              <a:rPr lang="en-US" sz="1600" dirty="0" err="1">
-                <a:solidFill>
-                  <a:schemeClr val="bg1">
-                    <a:lumMod val="65000"/>
-                  </a:schemeClr>
-                </a:solidFill>
-                <a:latin typeface="Consolas" panose="020B0609020204030204" pitchFamily="49" charset="0"/>
-                <a:ea typeface="Source Sans Pro Light" panose="020B0403030403020204" pitchFamily="34" charset="0"/>
-              </a:rPr>
-              <a:t>2D</a:t>
-            </a:r>
+              <a:t>// Stan is quite smart, as you saw in our first example</a:t>
+            </a:r>
+          </a:p>
+          <a:p>
+            <a:pPr marL="0" indent="0">
+              <a:buNone/>
+            </a:pPr>
             <a:r>
               <a:rPr lang="en-US" sz="1600" dirty="0">
                 <a:solidFill>
@@ -10585,134 +10485,45 @@
                 <a:latin typeface="Consolas" panose="020B0609020204030204" pitchFamily="49" charset="0"/>
                 <a:ea typeface="Source Sans Pro Light" panose="020B0403030403020204" pitchFamily="34" charset="0"/>
               </a:rPr>
-              <a:t> arrays we require a double loop</a:t>
-            </a:r>
-          </a:p>
-          <a:p>
-            <a:pPr marL="0" indent="0">
-              <a:buNone/>
-            </a:pPr>
-            <a:r>
-              <a:rPr lang="en-US" sz="1600" dirty="0">
-                <a:solidFill>
-                  <a:schemeClr val="bg1">
-                    <a:lumMod val="65000"/>
-                  </a:schemeClr>
-                </a:solidFill>
-                <a:latin typeface="Consolas" panose="020B0609020204030204" pitchFamily="49" charset="0"/>
-                <a:ea typeface="Source Sans Pro Light" panose="020B0403030403020204" pitchFamily="34" charset="0"/>
-              </a:rPr>
-              <a:t>// we can traverse matrices in a single “foreach” loop</a:t>
-            </a:r>
-          </a:p>
-          <a:p>
-            <a:pPr marL="0" indent="0">
-              <a:buNone/>
-            </a:pPr>
-            <a:r>
-              <a:rPr lang="en-US" sz="1600" dirty="0">
-                <a:solidFill>
-                  <a:schemeClr val="bg1">
-                    <a:lumMod val="65000"/>
-                  </a:schemeClr>
-                </a:solidFill>
-                <a:latin typeface="Consolas" panose="020B0609020204030204" pitchFamily="49" charset="0"/>
-                <a:ea typeface="Source Sans Pro Light" panose="020B0403030403020204" pitchFamily="34" charset="0"/>
-              </a:rPr>
-              <a:t>// elements in a matrix are visited in a column-major order</a:t>
-            </a:r>
-          </a:p>
-          <a:p>
-            <a:pPr marL="0" indent="0">
-              <a:buNone/>
-            </a:pPr>
-            <a:r>
-              <a:rPr lang="en-US" sz="1600" dirty="0">
-                <a:latin typeface="Consolas" panose="020B0609020204030204" pitchFamily="49" charset="0"/>
-                <a:ea typeface="Source Sans Pro Light" panose="020B0403030403020204" pitchFamily="34" charset="0"/>
-              </a:rPr>
-              <a:t>array[2, 3] int A;</a:t>
-            </a:r>
-          </a:p>
-          <a:p>
-            <a:pPr marL="0" indent="0">
-              <a:buNone/>
-            </a:pPr>
-            <a:r>
-              <a:rPr lang="en-US" sz="1600" dirty="0">
-                <a:latin typeface="Consolas" panose="020B0609020204030204" pitchFamily="49" charset="0"/>
-                <a:ea typeface="Source Sans Pro Light" panose="020B0403030403020204" pitchFamily="34" charset="0"/>
-              </a:rPr>
-              <a:t>for (</a:t>
-            </a:r>
-            <a:r>
-              <a:rPr lang="en-US" sz="1600" dirty="0" err="1">
-                <a:latin typeface="Consolas" panose="020B0609020204030204" pitchFamily="49" charset="0"/>
-                <a:ea typeface="Source Sans Pro Light" panose="020B0403030403020204" pitchFamily="34" charset="0"/>
-              </a:rPr>
-              <a:t>i</a:t>
-            </a:r>
-            <a:r>
-              <a:rPr lang="en-US" sz="1600" dirty="0">
-                <a:latin typeface="Consolas" panose="020B0609020204030204" pitchFamily="49" charset="0"/>
-                <a:ea typeface="Source Sans Pro Light" panose="020B0403030403020204" pitchFamily="34" charset="0"/>
-              </a:rPr>
-              <a:t> in A)</a:t>
-            </a:r>
-          </a:p>
-          <a:p>
-            <a:pPr marL="0" indent="0">
-              <a:buNone/>
-            </a:pPr>
-            <a:r>
-              <a:rPr lang="en-US" sz="1600" dirty="0">
-                <a:latin typeface="Consolas" panose="020B0609020204030204" pitchFamily="49" charset="0"/>
-                <a:ea typeface="Source Sans Pro Light" panose="020B0403030403020204" pitchFamily="34" charset="0"/>
-              </a:rPr>
-              <a:t>  for (j in </a:t>
-            </a:r>
-            <a:r>
-              <a:rPr lang="en-US" sz="1600" dirty="0" err="1">
-                <a:latin typeface="Consolas" panose="020B0609020204030204" pitchFamily="49" charset="0"/>
-                <a:ea typeface="Source Sans Pro Light" panose="020B0403030403020204" pitchFamily="34" charset="0"/>
-              </a:rPr>
-              <a:t>i</a:t>
-            </a:r>
-            <a:r>
-              <a:rPr lang="en-US" sz="1600" dirty="0">
-                <a:latin typeface="Consolas" panose="020B0609020204030204" pitchFamily="49" charset="0"/>
-                <a:ea typeface="Source Sans Pro Light" panose="020B0403030403020204" pitchFamily="34" charset="0"/>
-              </a:rPr>
-              <a:t>)</a:t>
-            </a:r>
-          </a:p>
-          <a:p>
-            <a:pPr marL="0" indent="0">
-              <a:buNone/>
-            </a:pPr>
-            <a:r>
-              <a:rPr lang="en-US" sz="1600" dirty="0">
-                <a:latin typeface="Consolas" panose="020B0609020204030204" pitchFamily="49" charset="0"/>
-                <a:ea typeface="Source Sans Pro Light" panose="020B0403030403020204" pitchFamily="34" charset="0"/>
-              </a:rPr>
-              <a:t>    ... do something with y ...</a:t>
-            </a:r>
-          </a:p>
-          <a:p>
-            <a:pPr marL="0" indent="0">
-              <a:buNone/>
-            </a:pPr>
+              <a:t>// the above can be simplified (presuming y is a vector or an array)</a:t>
+            </a:r>
             <a:endParaRPr lang="en-US" sz="1600" dirty="0">
               <a:latin typeface="Consolas" panose="020B0609020204030204" pitchFamily="49" charset="0"/>
               <a:ea typeface="Source Sans Pro Light" panose="020B0403030403020204" pitchFamily="34" charset="0"/>
             </a:endParaRPr>
           </a:p>
+          <a:p>
+            <a:pPr marL="0" indent="0">
+              <a:buNone/>
+            </a:pPr>
+            <a:r>
+              <a:rPr lang="en-US" sz="1600" dirty="0">
+                <a:latin typeface="Consolas" panose="020B0609020204030204" pitchFamily="49" charset="0"/>
+                <a:ea typeface="Source Sans Pro Light" panose="020B0403030403020204" pitchFamily="34" charset="0"/>
+              </a:rPr>
+              <a:t>y ~ </a:t>
+            </a:r>
+            <a:r>
+              <a:rPr lang="en-US" sz="1600" dirty="0" err="1">
+                <a:latin typeface="Consolas" panose="020B0609020204030204" pitchFamily="49" charset="0"/>
+                <a:ea typeface="Source Sans Pro Light" panose="020B0403030403020204" pitchFamily="34" charset="0"/>
+              </a:rPr>
+              <a:t>bernoulli</a:t>
+            </a:r>
+            <a:r>
+              <a:rPr lang="en-US" sz="1600" dirty="0">
+                <a:latin typeface="Consolas" panose="020B0609020204030204" pitchFamily="49" charset="0"/>
+                <a:ea typeface="Source Sans Pro Light" panose="020B0403030403020204" pitchFamily="34" charset="0"/>
+              </a:rPr>
+              <a:t>(theta);</a:t>
+            </a:r>
+          </a:p>
         </p:txBody>
       </p:sp>
     </p:spTree>
     <p:extLst>
       <p:ext uri="{BB962C8B-B14F-4D97-AF65-F5344CB8AC3E}">
-        <p14:creationId xmlns:p14="http://schemas.microsoft.com/office/powerpoint/2010/main" val="177338152"/>
+        <p14:creationId xmlns:p14="http://schemas.microsoft.com/office/powerpoint/2010/main" val="391985812"/>
       </p:ext>
     </p:extLst>
   </p:cSld>
@@ -10768,7 +10579,7 @@
         </p:blipFill>
         <p:spPr>
           <a:xfrm>
-            <a:off x="2030642" y="314459"/>
+            <a:off x="2030642" y="309365"/>
             <a:ext cx="5082715" cy="5096270"/>
           </a:xfrm>
           <a:prstGeom prst="rect">
@@ -10804,7 +10615,7 @@
                 <a:latin typeface="Source Sans Pro" panose="020B0503030403020204" pitchFamily="34" charset="0"/>
                 <a:ea typeface="Source Sans Pro" panose="020B0503030403020204" pitchFamily="34" charset="0"/>
               </a:rPr>
-              <a:t>While statements, break and continue</a:t>
+              <a:t>“Foreach” loops</a:t>
             </a:r>
             <a:endParaRPr lang="LID4096" sz="2800" b="1" dirty="0">
               <a:latin typeface="Source Sans Pro" panose="020B0503030403020204" pitchFamily="34" charset="0"/>
@@ -10889,10 +10700,15 @@
             </a:pPr>
             <a:r>
               <a:rPr lang="en-US" sz="1600" dirty="0">
-                <a:latin typeface="Consolas" panose="020B0609020204030204" pitchFamily="49" charset="0"/>
-                <a:ea typeface="Source Sans Pro Light" panose="020B0403030403020204" pitchFamily="34" charset="0"/>
-              </a:rPr>
-              <a:t>while (condition) {</a:t>
+                <a:solidFill>
+                  <a:schemeClr val="bg1">
+                    <a:lumMod val="65000"/>
+                  </a:schemeClr>
+                </a:solidFill>
+                <a:latin typeface="Consolas" panose="020B0609020204030204" pitchFamily="49" charset="0"/>
+                <a:ea typeface="Source Sans Pro Light" panose="020B0403030403020204" pitchFamily="34" charset="0"/>
+              </a:rPr>
+              <a:t>// if items is a container (vector, row vector, matrix, or array)</a:t>
             </a:r>
           </a:p>
           <a:p>
@@ -10904,7 +10720,21 @@
                 <a:latin typeface="Consolas" panose="020B0609020204030204" pitchFamily="49" charset="0"/>
                 <a:ea typeface="Source Sans Pro Light" panose="020B0403030403020204" pitchFamily="34" charset="0"/>
               </a:rPr>
-              <a:t>  if (x[n] &gt;= 0) continue;</a:t>
+              <a:t>for (</a:t>
+            </a:r>
+            <a:r>
+              <a:rPr lang="en-US" sz="1600" dirty="0" err="1">
+                <a:latin typeface="Consolas" panose="020B0609020204030204" pitchFamily="49" charset="0"/>
+                <a:ea typeface="Source Sans Pro Light" panose="020B0403030403020204" pitchFamily="34" charset="0"/>
+              </a:rPr>
+              <a:t>i</a:t>
+            </a:r>
+            <a:r>
+              <a:rPr lang="en-US" sz="1600" dirty="0">
+                <a:latin typeface="Consolas" panose="020B0609020204030204" pitchFamily="49" charset="0"/>
+                <a:ea typeface="Source Sans Pro Light" panose="020B0403030403020204" pitchFamily="34" charset="0"/>
+              </a:rPr>
+              <a:t> in items) {</a:t>
             </a:r>
           </a:p>
           <a:p>
@@ -10916,8 +10746,48 @@
                 <a:latin typeface="Consolas" panose="020B0609020204030204" pitchFamily="49" charset="0"/>
                 <a:ea typeface="Source Sans Pro Light" panose="020B0403030403020204" pitchFamily="34" charset="0"/>
               </a:rPr>
-              <a:t>  </a:t>
-            </a:r>
+              <a:t>  ... do something with </a:t>
+            </a:r>
+            <a:r>
+              <a:rPr lang="en-US" sz="1600" dirty="0" err="1">
+                <a:latin typeface="Consolas" panose="020B0609020204030204" pitchFamily="49" charset="0"/>
+                <a:ea typeface="Source Sans Pro Light" panose="020B0403030403020204" pitchFamily="34" charset="0"/>
+              </a:rPr>
+              <a:t>i</a:t>
+            </a:r>
+            <a:r>
+              <a:rPr lang="en-US" sz="1600" dirty="0">
+                <a:latin typeface="Consolas" panose="020B0609020204030204" pitchFamily="49" charset="0"/>
+                <a:ea typeface="Source Sans Pro Light" panose="020B0403030403020204" pitchFamily="34" charset="0"/>
+              </a:rPr>
+              <a:t> ...</a:t>
+            </a:r>
+          </a:p>
+          <a:p>
+            <a:pPr marL="0" indent="0">
+              <a:buNone/>
+            </a:pPr>
+            <a:r>
+              <a:rPr lang="en-US" sz="1600" dirty="0">
+                <a:latin typeface="Consolas" panose="020B0609020204030204" pitchFamily="49" charset="0"/>
+                <a:ea typeface="Source Sans Pro Light" panose="020B0403030403020204" pitchFamily="34" charset="0"/>
+              </a:rPr>
+              <a:t>}</a:t>
+            </a:r>
+          </a:p>
+          <a:p>
+            <a:pPr marL="0" indent="0">
+              <a:buNone/>
+            </a:pPr>
+            <a:endParaRPr lang="en-US" sz="1600" dirty="0">
+              <a:latin typeface="Consolas" panose="020B0609020204030204" pitchFamily="49" charset="0"/>
+              <a:ea typeface="Source Sans Pro Light" panose="020B0403030403020204" pitchFamily="34" charset="0"/>
+            </a:endParaRPr>
+          </a:p>
+          <a:p>
+            <a:pPr marL="0" indent="0">
+              <a:buNone/>
+            </a:pPr>
             <a:r>
               <a:rPr lang="en-US" sz="1600" dirty="0">
                 <a:solidFill>
@@ -10928,80 +10798,19 @@
                 <a:latin typeface="Consolas" panose="020B0609020204030204" pitchFamily="49" charset="0"/>
                 <a:ea typeface="Source Sans Pro Light" panose="020B0403030403020204" pitchFamily="34" charset="0"/>
               </a:rPr>
-              <a:t>// if above holds the line below will be skipped due to continue</a:t>
-            </a:r>
-            <a:endParaRPr lang="en-US" sz="1600" dirty="0">
-              <a:latin typeface="Consolas" panose="020B0609020204030204" pitchFamily="49" charset="0"/>
-              <a:ea typeface="Source Sans Pro Light" panose="020B0403030403020204" pitchFamily="34" charset="0"/>
-            </a:endParaRPr>
-          </a:p>
-          <a:p>
-            <a:pPr marL="0" indent="0">
-              <a:buNone/>
-            </a:pPr>
-            <a:r>
-              <a:rPr lang="en-US" sz="1600" dirty="0">
-                <a:latin typeface="Consolas" panose="020B0609020204030204" pitchFamily="49" charset="0"/>
-                <a:ea typeface="Source Sans Pro Light" panose="020B0403030403020204" pitchFamily="34" charset="0"/>
-              </a:rPr>
-              <a:t>  sum += x[n];</a:t>
-            </a:r>
-          </a:p>
-          <a:p>
-            <a:pPr marL="0" indent="0">
-              <a:buNone/>
-            </a:pPr>
-            <a:r>
-              <a:rPr lang="en-US" sz="1600" dirty="0">
-                <a:latin typeface="Consolas" panose="020B0609020204030204" pitchFamily="49" charset="0"/>
-                <a:ea typeface="Source Sans Pro Light" panose="020B0403030403020204" pitchFamily="34" charset="0"/>
-              </a:rPr>
-              <a:t>}</a:t>
-            </a:r>
-          </a:p>
-          <a:p>
-            <a:pPr marL="0" indent="0">
-              <a:buNone/>
-            </a:pPr>
-            <a:endParaRPr lang="en-US" sz="1600" dirty="0">
-              <a:latin typeface="Consolas" panose="020B0609020204030204" pitchFamily="49" charset="0"/>
-              <a:ea typeface="Source Sans Pro Light" panose="020B0403030403020204" pitchFamily="34" charset="0"/>
-            </a:endParaRPr>
-          </a:p>
-          <a:p>
-            <a:pPr marL="0" indent="0">
-              <a:buNone/>
-            </a:pPr>
-            <a:r>
-              <a:rPr lang="en-US" sz="1600" dirty="0">
-                <a:latin typeface="Consolas" panose="020B0609020204030204" pitchFamily="49" charset="0"/>
-                <a:ea typeface="Source Sans Pro Light" panose="020B0403030403020204" pitchFamily="34" charset="0"/>
-              </a:rPr>
-              <a:t>while (condition) {</a:t>
-            </a:r>
-          </a:p>
-          <a:p>
-            <a:pPr marL="0" indent="0">
-              <a:buNone/>
-            </a:pPr>
-            <a:r>
-              <a:rPr lang="en-US" sz="1600" dirty="0">
-                <a:latin typeface="Consolas" panose="020B0609020204030204" pitchFamily="49" charset="0"/>
-                <a:ea typeface="Source Sans Pro Light" panose="020B0403030403020204" pitchFamily="34" charset="0"/>
-              </a:rPr>
-              <a:t>  if (x[n] &gt;= 0) break;</a:t>
-            </a:r>
-          </a:p>
-          <a:p>
-            <a:pPr marL="0" indent="0">
-              <a:buNone/>
-            </a:pPr>
-            <a:r>
-              <a:rPr lang="en-US" sz="1600" dirty="0">
-                <a:latin typeface="Consolas" panose="020B0609020204030204" pitchFamily="49" charset="0"/>
-                <a:ea typeface="Source Sans Pro Light" panose="020B0403030403020204" pitchFamily="34" charset="0"/>
-              </a:rPr>
-              <a:t>  </a:t>
+              <a:t>// for </a:t>
+            </a:r>
+            <a:r>
+              <a:rPr lang="en-US" sz="1600" dirty="0" err="1">
+                <a:solidFill>
+                  <a:schemeClr val="bg1">
+                    <a:lumMod val="65000"/>
+                  </a:schemeClr>
+                </a:solidFill>
+                <a:latin typeface="Consolas" panose="020B0609020204030204" pitchFamily="49" charset="0"/>
+                <a:ea typeface="Source Sans Pro Light" panose="020B0403030403020204" pitchFamily="34" charset="0"/>
+              </a:rPr>
+              <a:t>2D</a:t>
             </a:r>
             <a:r>
               <a:rPr lang="en-US" sz="1600" dirty="0">
@@ -11013,12 +10822,8 @@
                 <a:latin typeface="Consolas" panose="020B0609020204030204" pitchFamily="49" charset="0"/>
                 <a:ea typeface="Source Sans Pro Light" panose="020B0403030403020204" pitchFamily="34" charset="0"/>
               </a:rPr>
-              <a:t>// if above is true, while loop will exit</a:t>
-            </a:r>
-            <a:endParaRPr lang="en-US" sz="1600" dirty="0">
-              <a:latin typeface="Consolas" panose="020B0609020204030204" pitchFamily="49" charset="0"/>
-              <a:ea typeface="Source Sans Pro Light" panose="020B0403030403020204" pitchFamily="34" charset="0"/>
-            </a:endParaRPr>
+              <a:t> arrays we require a double loop</a:t>
+            </a:r>
           </a:p>
           <a:p>
             <a:pPr marL="0" indent="0">
@@ -11026,10 +10831,15 @@
             </a:pPr>
             <a:r>
               <a:rPr lang="en-US" sz="1600" dirty="0">
-                <a:latin typeface="Consolas" panose="020B0609020204030204" pitchFamily="49" charset="0"/>
-                <a:ea typeface="Source Sans Pro Light" panose="020B0403030403020204" pitchFamily="34" charset="0"/>
-              </a:rPr>
-              <a:t>  sum += x[n];</a:t>
+                <a:solidFill>
+                  <a:schemeClr val="bg1">
+                    <a:lumMod val="65000"/>
+                  </a:schemeClr>
+                </a:solidFill>
+                <a:latin typeface="Consolas" panose="020B0609020204030204" pitchFamily="49" charset="0"/>
+                <a:ea typeface="Source Sans Pro Light" panose="020B0403030403020204" pitchFamily="34" charset="0"/>
+              </a:rPr>
+              <a:t>// we can traverse matrices in a single “foreach” loop</a:t>
             </a:r>
           </a:p>
           <a:p>
@@ -11038,10 +10848,91 @@
             </a:pPr>
             <a:r>
               <a:rPr lang="en-US" sz="1600" dirty="0">
-                <a:latin typeface="Consolas" panose="020B0609020204030204" pitchFamily="49" charset="0"/>
-                <a:ea typeface="Source Sans Pro Light" panose="020B0403030403020204" pitchFamily="34" charset="0"/>
-              </a:rPr>
-              <a:t>}</a:t>
+                <a:solidFill>
+                  <a:schemeClr val="bg1">
+                    <a:lumMod val="65000"/>
+                  </a:schemeClr>
+                </a:solidFill>
+                <a:latin typeface="Consolas" panose="020B0609020204030204" pitchFamily="49" charset="0"/>
+                <a:ea typeface="Source Sans Pro Light" panose="020B0403030403020204" pitchFamily="34" charset="0"/>
+              </a:rPr>
+              <a:t>// elements in a matrix are visited in a column-major order</a:t>
+            </a:r>
+          </a:p>
+          <a:p>
+            <a:pPr marL="0" indent="0">
+              <a:buNone/>
+            </a:pPr>
+            <a:r>
+              <a:rPr lang="en-US" sz="1600" dirty="0">
+                <a:latin typeface="Consolas" panose="020B0609020204030204" pitchFamily="49" charset="0"/>
+                <a:ea typeface="Source Sans Pro Light" panose="020B0403030403020204" pitchFamily="34" charset="0"/>
+              </a:rPr>
+              <a:t>array[2, 3] int A;</a:t>
+            </a:r>
+          </a:p>
+          <a:p>
+            <a:pPr marL="0" indent="0">
+              <a:buNone/>
+            </a:pPr>
+            <a:r>
+              <a:rPr lang="en-US" sz="1600" dirty="0">
+                <a:latin typeface="Consolas" panose="020B0609020204030204" pitchFamily="49" charset="0"/>
+                <a:ea typeface="Source Sans Pro Light" panose="020B0403030403020204" pitchFamily="34" charset="0"/>
+              </a:rPr>
+              <a:t>for (</a:t>
+            </a:r>
+            <a:r>
+              <a:rPr lang="en-US" sz="1600" dirty="0" err="1">
+                <a:latin typeface="Consolas" panose="020B0609020204030204" pitchFamily="49" charset="0"/>
+                <a:ea typeface="Source Sans Pro Light" panose="020B0403030403020204" pitchFamily="34" charset="0"/>
+              </a:rPr>
+              <a:t>i</a:t>
+            </a:r>
+            <a:r>
+              <a:rPr lang="en-US" sz="1600" dirty="0">
+                <a:latin typeface="Consolas" panose="020B0609020204030204" pitchFamily="49" charset="0"/>
+                <a:ea typeface="Source Sans Pro Light" panose="020B0403030403020204" pitchFamily="34" charset="0"/>
+              </a:rPr>
+              <a:t> in A)</a:t>
+            </a:r>
+          </a:p>
+          <a:p>
+            <a:pPr marL="0" indent="0">
+              <a:buNone/>
+            </a:pPr>
+            <a:r>
+              <a:rPr lang="en-US" sz="1600" dirty="0">
+                <a:latin typeface="Consolas" panose="020B0609020204030204" pitchFamily="49" charset="0"/>
+                <a:ea typeface="Source Sans Pro Light" panose="020B0403030403020204" pitchFamily="34" charset="0"/>
+              </a:rPr>
+              <a:t>  for (j in </a:t>
+            </a:r>
+            <a:r>
+              <a:rPr lang="en-US" sz="1600" dirty="0" err="1">
+                <a:latin typeface="Consolas" panose="020B0609020204030204" pitchFamily="49" charset="0"/>
+                <a:ea typeface="Source Sans Pro Light" panose="020B0403030403020204" pitchFamily="34" charset="0"/>
+              </a:rPr>
+              <a:t>i</a:t>
+            </a:r>
+            <a:r>
+              <a:rPr lang="en-US" sz="1600" dirty="0">
+                <a:latin typeface="Consolas" panose="020B0609020204030204" pitchFamily="49" charset="0"/>
+                <a:ea typeface="Source Sans Pro Light" panose="020B0403030403020204" pitchFamily="34" charset="0"/>
+              </a:rPr>
+              <a:t>)</a:t>
+            </a:r>
+          </a:p>
+          <a:p>
+            <a:pPr marL="0" indent="0">
+              <a:buNone/>
+            </a:pPr>
+            <a:r>
+              <a:rPr lang="en-US" sz="1600" dirty="0">
+                <a:latin typeface="Consolas" panose="020B0609020204030204" pitchFamily="49" charset="0"/>
+                <a:ea typeface="Source Sans Pro Light" panose="020B0403030403020204" pitchFamily="34" charset="0"/>
+              </a:rPr>
+              <a:t>    ... do something with y ...</a:t>
             </a:r>
           </a:p>
           <a:p>
@@ -11053,39 +10944,12 @@
               <a:ea typeface="Source Sans Pro Light" panose="020B0403030403020204" pitchFamily="34" charset="0"/>
             </a:endParaRPr>
           </a:p>
-          <a:p>
-            <a:pPr marL="0" indent="0">
-              <a:buNone/>
-            </a:pPr>
-            <a:endParaRPr lang="en-US" sz="1600" dirty="0">
-              <a:latin typeface="Consolas" panose="020B0609020204030204" pitchFamily="49" charset="0"/>
-              <a:ea typeface="Source Sans Pro Light" panose="020B0403030403020204" pitchFamily="34" charset="0"/>
-            </a:endParaRPr>
-          </a:p>
-          <a:p>
-            <a:pPr marL="0" indent="0">
-              <a:buNone/>
-            </a:pPr>
-            <a:endParaRPr lang="en-US" sz="1600" dirty="0">
-              <a:latin typeface="Consolas" panose="020B0609020204030204" pitchFamily="49" charset="0"/>
-              <a:ea typeface="Source Sans Pro Light" panose="020B0403030403020204" pitchFamily="34" charset="0"/>
-            </a:endParaRPr>
-          </a:p>
-          <a:p>
-            <a:pPr marL="0" indent="0">
-              <a:buNone/>
-            </a:pPr>
-            <a:endParaRPr lang="en-US" sz="1600" dirty="0">
-              <a:latin typeface="Consolas" panose="020B0609020204030204" pitchFamily="49" charset="0"/>
-              <a:ea typeface="Source Sans Pro Light" panose="020B0403030403020204" pitchFamily="34" charset="0"/>
-            </a:endParaRPr>
-          </a:p>
         </p:txBody>
       </p:sp>
     </p:spTree>
     <p:extLst>
       <p:ext uri="{BB962C8B-B14F-4D97-AF65-F5344CB8AC3E}">
-        <p14:creationId xmlns:p14="http://schemas.microsoft.com/office/powerpoint/2010/main" val="2003124061"/>
+        <p14:creationId xmlns:p14="http://schemas.microsoft.com/office/powerpoint/2010/main" val="177338152"/>
       </p:ext>
     </p:extLst>
   </p:cSld>
@@ -11112,6 +10976,43 @@
           <a:chExt cx="0" cy="0"/>
         </a:xfrm>
       </p:grpSpPr>
+      <p:pic>
+        <p:nvPicPr>
+          <p:cNvPr id="4" name="Picture 3" descr="Logo, company name&#10;&#10;Description automatically generated">
+            <a:extLst>
+              <a:ext uri="{FF2B5EF4-FFF2-40B4-BE49-F238E27FC236}">
+                <a16:creationId xmlns:a16="http://schemas.microsoft.com/office/drawing/2014/main" id="{B843C928-BA92-4E3B-A771-AAED350D87B3}"/>
+              </a:ext>
+            </a:extLst>
+          </p:cNvPr>
+          <p:cNvPicPr>
+            <a:picLocks noChangeAspect="1"/>
+          </p:cNvPicPr>
+          <p:nvPr/>
+        </p:nvPicPr>
+        <p:blipFill>
+          <a:blip r:embed="rId2">
+            <a:alphaModFix amt="5000"/>
+            <a:extLst>
+              <a:ext uri="{28A0092B-C50C-407E-A947-70E740481C1C}">
+                <a14:useLocalDpi xmlns:a14="http://schemas.microsoft.com/office/drawing/2010/main" val="0"/>
+              </a:ext>
+            </a:extLst>
+          </a:blip>
+          <a:stretch>
+            <a:fillRect/>
+          </a:stretch>
+        </p:blipFill>
+        <p:spPr>
+          <a:xfrm>
+            <a:off x="2030642" y="314459"/>
+            <a:ext cx="5082715" cy="5096270"/>
+          </a:xfrm>
+          <a:prstGeom prst="rect">
+            <a:avLst/>
+          </a:prstGeom>
+        </p:spPr>
+      </p:pic>
       <p:sp>
         <p:nvSpPr>
           <p:cNvPr id="2" name="Title 1">
@@ -11140,143 +11041,11 @@
                 <a:latin typeface="Source Sans Pro" panose="020B0503030403020204" pitchFamily="34" charset="0"/>
                 <a:ea typeface="Source Sans Pro" panose="020B0503030403020204" pitchFamily="34" charset="0"/>
               </a:rPr>
-              <a:t>The functions block</a:t>
+              <a:t>While statements, break and continue</a:t>
             </a:r>
             <a:endParaRPr lang="LID4096" sz="2800" b="1" dirty="0">
               <a:latin typeface="Source Sans Pro" panose="020B0503030403020204" pitchFamily="34" charset="0"/>
               <a:ea typeface="Source Sans Pro" panose="020B0503030403020204" pitchFamily="34" charset="0"/>
-            </a:endParaRPr>
-          </a:p>
-        </p:txBody>
-      </p:sp>
-      <p:sp>
-        <p:nvSpPr>
-          <p:cNvPr id="3" name="Content Placeholder 2">
-            <a:extLst>
-              <a:ext uri="{FF2B5EF4-FFF2-40B4-BE49-F238E27FC236}">
-                <a16:creationId xmlns:a16="http://schemas.microsoft.com/office/drawing/2014/main" id="{02774E1B-7E41-4FBF-B60A-597EA771BF83}"/>
-              </a:ext>
-            </a:extLst>
-          </p:cNvPr>
-          <p:cNvSpPr>
-            <a:spLocks noGrp="1"/>
-          </p:cNvSpPr>
-          <p:nvPr>
-            <p:ph idx="1"/>
-          </p:nvPr>
-        </p:nvSpPr>
-        <p:spPr>
-          <a:xfrm>
-            <a:off x="628649" y="1521354"/>
-            <a:ext cx="7886699" cy="3626115"/>
-          </a:xfrm>
-        </p:spPr>
-        <p:txBody>
-          <a:bodyPr/>
-          <a:lstStyle/>
-          <a:p>
-            <a:pPr marL="0" indent="0">
-              <a:buNone/>
-            </a:pPr>
-            <a:r>
-              <a:rPr lang="en-US" sz="2000" dirty="0">
-                <a:latin typeface="Consolas" panose="020B0609020204030204" pitchFamily="49" charset="0"/>
-                <a:ea typeface="Source Sans Pro Light" panose="020B0403030403020204" pitchFamily="34" charset="0"/>
-              </a:rPr>
-              <a:t>functions {</a:t>
-            </a:r>
-          </a:p>
-          <a:p>
-            <a:pPr marL="0" indent="0">
-              <a:buNone/>
-            </a:pPr>
-            <a:r>
-              <a:rPr lang="en-US" sz="2000" dirty="0">
-                <a:latin typeface="Consolas" panose="020B0609020204030204" pitchFamily="49" charset="0"/>
-                <a:ea typeface="Source Sans Pro Light" panose="020B0403030403020204" pitchFamily="34" charset="0"/>
-              </a:rPr>
-              <a:t>  </a:t>
-            </a:r>
-            <a:r>
-              <a:rPr lang="en-US" sz="2000" dirty="0">
-                <a:solidFill>
-                  <a:schemeClr val="bg1">
-                    <a:lumMod val="65000"/>
-                  </a:schemeClr>
-                </a:solidFill>
-                <a:latin typeface="Consolas" panose="020B0609020204030204" pitchFamily="49" charset="0"/>
-                <a:ea typeface="Source Sans Pro Light" panose="020B0403030403020204" pitchFamily="34" charset="0"/>
-              </a:rPr>
-              <a:t>// custom user-defined functions</a:t>
-            </a:r>
-          </a:p>
-          <a:p>
-            <a:pPr marL="0" indent="0">
-              <a:buNone/>
-            </a:pPr>
-            <a:r>
-              <a:rPr lang="en-US" sz="2000" dirty="0">
-                <a:latin typeface="Consolas" panose="020B0609020204030204" pitchFamily="49" charset="0"/>
-                <a:ea typeface="Source Sans Pro Light" panose="020B0403030403020204" pitchFamily="34" charset="0"/>
-              </a:rPr>
-              <a:t>  ... function declarations and definitions ...</a:t>
-            </a:r>
-          </a:p>
-          <a:p>
-            <a:pPr marL="0" indent="0">
-              <a:buNone/>
-            </a:pPr>
-            <a:r>
-              <a:rPr lang="en-US" sz="2000" dirty="0">
-                <a:latin typeface="Consolas" panose="020B0609020204030204" pitchFamily="49" charset="0"/>
-                <a:ea typeface="Source Sans Pro Light" panose="020B0403030403020204" pitchFamily="34" charset="0"/>
-              </a:rPr>
-              <a:t>}</a:t>
-            </a:r>
-          </a:p>
-          <a:p>
-            <a:pPr marL="0" indent="0">
-              <a:buNone/>
-            </a:pPr>
-            <a:endParaRPr lang="en-US" sz="2000" dirty="0">
-              <a:latin typeface="Consolas" panose="020B0609020204030204" pitchFamily="49" charset="0"/>
-              <a:ea typeface="Source Sans Pro Light" panose="020B0403030403020204" pitchFamily="34" charset="0"/>
-            </a:endParaRPr>
-          </a:p>
-          <a:p>
-            <a:r>
-              <a:rPr lang="en-US" sz="2000" dirty="0">
-                <a:latin typeface="Source Sans Pro Light" panose="020B0403030403020204" pitchFamily="34" charset="0"/>
-                <a:ea typeface="Source Sans Pro Light" panose="020B0403030403020204" pitchFamily="34" charset="0"/>
-              </a:rPr>
-              <a:t>This block is placed at the top of your Stan program.</a:t>
-            </a:r>
-          </a:p>
-          <a:p>
-            <a:endParaRPr lang="en-US" sz="2000" dirty="0">
-              <a:latin typeface="Source Sans Pro Light" panose="020B0403030403020204" pitchFamily="34" charset="0"/>
-              <a:ea typeface="Source Sans Pro Light" panose="020B0403030403020204" pitchFamily="34" charset="0"/>
-            </a:endParaRPr>
-          </a:p>
-          <a:p>
-            <a:r>
-              <a:rPr lang="en-US" sz="2000" dirty="0">
-                <a:latin typeface="Source Sans Pro Light" panose="020B0403030403020204" pitchFamily="34" charset="0"/>
-                <a:ea typeface="Source Sans Pro Light" panose="020B0403030403020204" pitchFamily="34" charset="0"/>
-              </a:rPr>
-              <a:t>In it you can code up any custom functions that will help you in your work.</a:t>
-            </a:r>
-          </a:p>
-          <a:p>
-            <a:endParaRPr lang="en-US" sz="2000" dirty="0">
-              <a:latin typeface="Source Sans Pro Light" panose="020B0403030403020204" pitchFamily="34" charset="0"/>
-              <a:ea typeface="Source Sans Pro Light" panose="020B0403030403020204" pitchFamily="34" charset="0"/>
-            </a:endParaRPr>
-          </a:p>
-          <a:p>
-            <a:endParaRPr lang="en-US" sz="2000" dirty="0">
-              <a:latin typeface="Consolas" panose="020B0609020204030204" pitchFamily="49" charset="0"/>
-              <a:ea typeface="Source Sans Pro Light" panose="020B0403030403020204" pitchFamily="34" charset="0"/>
             </a:endParaRPr>
           </a:p>
         </p:txBody>
@@ -11329,10 +11098,231 @@
           </a:p>
         </p:txBody>
       </p:sp>
+      <p:sp>
+        <p:nvSpPr>
+          <p:cNvPr id="7" name="Content Placeholder 6">
+            <a:extLst>
+              <a:ext uri="{FF2B5EF4-FFF2-40B4-BE49-F238E27FC236}">
+                <a16:creationId xmlns:a16="http://schemas.microsoft.com/office/drawing/2014/main" id="{831C9922-9DC3-4CEF-9A97-4C65415BF300}"/>
+              </a:ext>
+            </a:extLst>
+          </p:cNvPr>
+          <p:cNvSpPr>
+            <a:spLocks noGrp="1"/>
+          </p:cNvSpPr>
+          <p:nvPr>
+            <p:ph idx="1"/>
+          </p:nvPr>
+        </p:nvSpPr>
+        <p:spPr/>
+        <p:txBody>
+          <a:bodyPr>
+            <a:noAutofit/>
+          </a:bodyPr>
+          <a:lstStyle/>
+          <a:p>
+            <a:pPr marL="0" indent="0">
+              <a:buNone/>
+            </a:pPr>
+            <a:r>
+              <a:rPr lang="en-US" sz="1600" dirty="0">
+                <a:latin typeface="Consolas" panose="020B0609020204030204" pitchFamily="49" charset="0"/>
+                <a:ea typeface="Source Sans Pro Light" panose="020B0403030403020204" pitchFamily="34" charset="0"/>
+              </a:rPr>
+              <a:t>while (condition) {</a:t>
+            </a:r>
+          </a:p>
+          <a:p>
+            <a:pPr marL="0" indent="0">
+              <a:buNone/>
+            </a:pPr>
+            <a:r>
+              <a:rPr lang="en-US" sz="1600" dirty="0">
+                <a:latin typeface="Consolas" panose="020B0609020204030204" pitchFamily="49" charset="0"/>
+                <a:ea typeface="Source Sans Pro Light" panose="020B0403030403020204" pitchFamily="34" charset="0"/>
+              </a:rPr>
+              <a:t>  if (x[n] &gt;= 0) continue;</a:t>
+            </a:r>
+          </a:p>
+          <a:p>
+            <a:pPr marL="0" indent="0">
+              <a:buNone/>
+            </a:pPr>
+            <a:r>
+              <a:rPr lang="en-US" sz="1600" dirty="0">
+                <a:latin typeface="Consolas" panose="020B0609020204030204" pitchFamily="49" charset="0"/>
+                <a:ea typeface="Source Sans Pro Light" panose="020B0403030403020204" pitchFamily="34" charset="0"/>
+              </a:rPr>
+              <a:t>  </a:t>
+            </a:r>
+            <a:r>
+              <a:rPr lang="en-US" sz="1600" dirty="0">
+                <a:solidFill>
+                  <a:schemeClr val="bg1">
+                    <a:lumMod val="65000"/>
+                  </a:schemeClr>
+                </a:solidFill>
+                <a:latin typeface="Consolas" panose="020B0609020204030204" pitchFamily="49" charset="0"/>
+                <a:ea typeface="Source Sans Pro Light" panose="020B0403030403020204" pitchFamily="34" charset="0"/>
+              </a:rPr>
+              <a:t>// if above holds the line below will be skipped due to continue</a:t>
+            </a:r>
+            <a:endParaRPr lang="en-US" sz="1600" dirty="0">
+              <a:latin typeface="Consolas" panose="020B0609020204030204" pitchFamily="49" charset="0"/>
+              <a:ea typeface="Source Sans Pro Light" panose="020B0403030403020204" pitchFamily="34" charset="0"/>
+            </a:endParaRPr>
+          </a:p>
+          <a:p>
+            <a:pPr marL="0" indent="0">
+              <a:buNone/>
+            </a:pPr>
+            <a:r>
+              <a:rPr lang="en-US" sz="1600" dirty="0">
+                <a:latin typeface="Consolas" panose="020B0609020204030204" pitchFamily="49" charset="0"/>
+                <a:ea typeface="Source Sans Pro Light" panose="020B0403030403020204" pitchFamily="34" charset="0"/>
+              </a:rPr>
+              <a:t>  sum += x[n];</a:t>
+            </a:r>
+          </a:p>
+          <a:p>
+            <a:pPr marL="0" indent="0">
+              <a:buNone/>
+            </a:pPr>
+            <a:r>
+              <a:rPr lang="en-US" sz="1600" dirty="0">
+                <a:latin typeface="Consolas" panose="020B0609020204030204" pitchFamily="49" charset="0"/>
+                <a:ea typeface="Source Sans Pro Light" panose="020B0403030403020204" pitchFamily="34" charset="0"/>
+              </a:rPr>
+              <a:t>}</a:t>
+            </a:r>
+          </a:p>
+          <a:p>
+            <a:pPr marL="0" indent="0">
+              <a:buNone/>
+            </a:pPr>
+            <a:endParaRPr lang="en-US" sz="1600" dirty="0">
+              <a:latin typeface="Consolas" panose="020B0609020204030204" pitchFamily="49" charset="0"/>
+              <a:ea typeface="Source Sans Pro Light" panose="020B0403030403020204" pitchFamily="34" charset="0"/>
+            </a:endParaRPr>
+          </a:p>
+          <a:p>
+            <a:pPr marL="0" indent="0">
+              <a:buNone/>
+            </a:pPr>
+            <a:r>
+              <a:rPr lang="en-US" sz="1600" dirty="0">
+                <a:latin typeface="Consolas" panose="020B0609020204030204" pitchFamily="49" charset="0"/>
+                <a:ea typeface="Source Sans Pro Light" panose="020B0403030403020204" pitchFamily="34" charset="0"/>
+              </a:rPr>
+              <a:t>while (condition) {</a:t>
+            </a:r>
+          </a:p>
+          <a:p>
+            <a:pPr marL="0" indent="0">
+              <a:buNone/>
+            </a:pPr>
+            <a:r>
+              <a:rPr lang="en-US" sz="1600" dirty="0">
+                <a:latin typeface="Consolas" panose="020B0609020204030204" pitchFamily="49" charset="0"/>
+                <a:ea typeface="Source Sans Pro Light" panose="020B0403030403020204" pitchFamily="34" charset="0"/>
+              </a:rPr>
+              <a:t>  if (x[n] &gt;= 0) break;</a:t>
+            </a:r>
+          </a:p>
+          <a:p>
+            <a:pPr marL="0" indent="0">
+              <a:buNone/>
+            </a:pPr>
+            <a:r>
+              <a:rPr lang="en-US" sz="1600" dirty="0">
+                <a:latin typeface="Consolas" panose="020B0609020204030204" pitchFamily="49" charset="0"/>
+                <a:ea typeface="Source Sans Pro Light" panose="020B0403030403020204" pitchFamily="34" charset="0"/>
+              </a:rPr>
+              <a:t>  </a:t>
+            </a:r>
+            <a:r>
+              <a:rPr lang="en-US" sz="1600" dirty="0">
+                <a:solidFill>
+                  <a:schemeClr val="bg1">
+                    <a:lumMod val="65000"/>
+                  </a:schemeClr>
+                </a:solidFill>
+                <a:latin typeface="Consolas" panose="020B0609020204030204" pitchFamily="49" charset="0"/>
+                <a:ea typeface="Source Sans Pro Light" panose="020B0403030403020204" pitchFamily="34" charset="0"/>
+              </a:rPr>
+              <a:t>// if above is true, while loop will exit</a:t>
+            </a:r>
+            <a:endParaRPr lang="en-US" sz="1600" dirty="0">
+              <a:latin typeface="Consolas" panose="020B0609020204030204" pitchFamily="49" charset="0"/>
+              <a:ea typeface="Source Sans Pro Light" panose="020B0403030403020204" pitchFamily="34" charset="0"/>
+            </a:endParaRPr>
+          </a:p>
+          <a:p>
+            <a:pPr marL="0" indent="0">
+              <a:buNone/>
+            </a:pPr>
+            <a:r>
+              <a:rPr lang="en-US" sz="1600" dirty="0">
+                <a:latin typeface="Consolas" panose="020B0609020204030204" pitchFamily="49" charset="0"/>
+                <a:ea typeface="Source Sans Pro Light" panose="020B0403030403020204" pitchFamily="34" charset="0"/>
+              </a:rPr>
+              <a:t>  sum += x[n];</a:t>
+            </a:r>
+          </a:p>
+          <a:p>
+            <a:pPr marL="0" indent="0">
+              <a:buNone/>
+            </a:pPr>
+            <a:r>
+              <a:rPr lang="en-US" sz="1600" dirty="0">
+                <a:latin typeface="Consolas" panose="020B0609020204030204" pitchFamily="49" charset="0"/>
+                <a:ea typeface="Source Sans Pro Light" panose="020B0403030403020204" pitchFamily="34" charset="0"/>
+              </a:rPr>
+              <a:t>}</a:t>
+            </a:r>
+          </a:p>
+          <a:p>
+            <a:pPr marL="0" indent="0">
+              <a:buNone/>
+            </a:pPr>
+            <a:endParaRPr lang="en-US" sz="1600" dirty="0">
+              <a:latin typeface="Consolas" panose="020B0609020204030204" pitchFamily="49" charset="0"/>
+              <a:ea typeface="Source Sans Pro Light" panose="020B0403030403020204" pitchFamily="34" charset="0"/>
+            </a:endParaRPr>
+          </a:p>
+          <a:p>
+            <a:pPr marL="0" indent="0">
+              <a:buNone/>
+            </a:pPr>
+            <a:endParaRPr lang="en-US" sz="1600" dirty="0">
+              <a:latin typeface="Consolas" panose="020B0609020204030204" pitchFamily="49" charset="0"/>
+              <a:ea typeface="Source Sans Pro Light" panose="020B0403030403020204" pitchFamily="34" charset="0"/>
+            </a:endParaRPr>
+          </a:p>
+          <a:p>
+            <a:pPr marL="0" indent="0">
+              <a:buNone/>
+            </a:pPr>
+            <a:endParaRPr lang="en-US" sz="1600" dirty="0">
+              <a:latin typeface="Consolas" panose="020B0609020204030204" pitchFamily="49" charset="0"/>
+              <a:ea typeface="Source Sans Pro Light" panose="020B0403030403020204" pitchFamily="34" charset="0"/>
+            </a:endParaRPr>
+          </a:p>
+          <a:p>
+            <a:pPr marL="0" indent="0">
+              <a:buNone/>
+            </a:pPr>
+            <a:endParaRPr lang="en-US" sz="1600" dirty="0">
+              <a:latin typeface="Consolas" panose="020B0609020204030204" pitchFamily="49" charset="0"/>
+              <a:ea typeface="Source Sans Pro Light" panose="020B0403030403020204" pitchFamily="34" charset="0"/>
+            </a:endParaRPr>
+          </a:p>
+        </p:txBody>
+      </p:sp>
     </p:spTree>
     <p:extLst>
       <p:ext uri="{BB962C8B-B14F-4D97-AF65-F5344CB8AC3E}">
-        <p14:creationId xmlns:p14="http://schemas.microsoft.com/office/powerpoint/2010/main" val="15592896"/>
+        <p14:creationId xmlns:p14="http://schemas.microsoft.com/office/powerpoint/2010/main" val="2003124061"/>
       </p:ext>
     </p:extLst>
   </p:cSld>
@@ -11387,7 +11377,7 @@
                 <a:latin typeface="Source Sans Pro" panose="020B0503030403020204" pitchFamily="34" charset="0"/>
                 <a:ea typeface="Source Sans Pro" panose="020B0503030403020204" pitchFamily="34" charset="0"/>
               </a:rPr>
-              <a:t>The transformed data block</a:t>
+              <a:t>The functions block</a:t>
             </a:r>
             <a:endParaRPr lang="LID4096" sz="2800" b="1" dirty="0">
               <a:latin typeface="Source Sans Pro" panose="020B0503030403020204" pitchFamily="34" charset="0"/>
@@ -11419,9 +11409,7 @@
           </a:xfrm>
         </p:spPr>
         <p:txBody>
-          <a:bodyPr>
-            <a:normAutofit lnSpcReduction="10000"/>
-          </a:bodyPr>
+          <a:bodyPr/>
           <a:lstStyle/>
           <a:p>
             <a:pPr marL="0" indent="0">
@@ -11432,7 +11420,7 @@
                 <a:latin typeface="Consolas" panose="020B0609020204030204" pitchFamily="49" charset="0"/>
                 <a:ea typeface="Source Sans Pro Light" panose="020B0403030403020204" pitchFamily="34" charset="0"/>
               </a:rPr>
-              <a:t>transformed data {</a:t>
+              <a:t>functions {</a:t>
             </a:r>
           </a:p>
           <a:p>
@@ -11456,7 +11444,7 @@
                 <a:latin typeface="Consolas" panose="020B0609020204030204" pitchFamily="49" charset="0"/>
                 <a:ea typeface="Source Sans Pro Light" panose="020B0403030403020204" pitchFamily="34" charset="0"/>
               </a:rPr>
-              <a:t>// mathematical transformations of the data</a:t>
+              <a:t>// custom user-defined functions</a:t>
             </a:r>
           </a:p>
           <a:p>
@@ -11468,19 +11456,7 @@
                 <a:latin typeface="Consolas" panose="020B0609020204030204" pitchFamily="49" charset="0"/>
                 <a:ea typeface="Source Sans Pro Light" panose="020B0403030403020204" pitchFamily="34" charset="0"/>
               </a:rPr>
-              <a:t>  ... declarations ...</a:t>
-            </a:r>
-          </a:p>
-          <a:p>
-            <a:pPr marL="0" indent="0">
-              <a:buNone/>
-            </a:pPr>
-            <a:r>
-              <a:rPr lang="en-US" sz="2000" dirty="0">
-                <a:latin typeface="Consolas" panose="020B0609020204030204" pitchFamily="49" charset="0"/>
-                <a:ea typeface="Source Sans Pro Light" panose="020B0403030403020204" pitchFamily="34" charset="0"/>
-              </a:rPr>
-              <a:t>  ... statements ...</a:t>
+              <a:t>  ... function declarations and definitions ...</a:t>
             </a:r>
           </a:p>
           <a:p>
@@ -11510,31 +11486,29 @@
                 <a:latin typeface="Source Sans Pro Light" panose="020B0403030403020204" pitchFamily="34" charset="0"/>
                 <a:ea typeface="Source Sans Pro Light" panose="020B0403030403020204" pitchFamily="34" charset="0"/>
               </a:rPr>
-              <a:t>This block is used to perform any transformation on the input data from the </a:t>
-            </a:r>
-            <a:r>
-              <a:rPr lang="en-US" sz="2000" dirty="0">
-                <a:latin typeface="Consolas" panose="020B0609020204030204" pitchFamily="49" charset="0"/>
-                <a:ea typeface="Source Sans Pro Light" panose="020B0403030403020204" pitchFamily="34" charset="0"/>
-              </a:rPr>
-              <a:t>data</a:t>
-            </a:r>
+              <a:t>This block is placed at the top of your Stan program.</a:t>
+            </a:r>
+          </a:p>
+          <a:p>
+            <a:endParaRPr lang="en-US" sz="2000" dirty="0">
+              <a:latin typeface="Source Sans Pro Light" panose="020B0403030403020204" pitchFamily="34" charset="0"/>
+              <a:ea typeface="Source Sans Pro Light" panose="020B0403030403020204" pitchFamily="34" charset="0"/>
+            </a:endParaRPr>
+          </a:p>
+          <a:p>
             <a:r>
               <a:rPr lang="en-US" sz="2000" dirty="0">
                 <a:latin typeface="Source Sans Pro Light" panose="020B0403030403020204" pitchFamily="34" charset="0"/>
                 <a:ea typeface="Source Sans Pro Light" panose="020B0403030403020204" pitchFamily="34" charset="0"/>
               </a:rPr>
-              <a:t> block.</a:t>
-            </a:r>
-          </a:p>
-          <a:p>
-            <a:r>
-              <a:rPr lang="en-US" sz="2000" dirty="0">
-                <a:latin typeface="Source Sans Pro Light" panose="020B0403030403020204" pitchFamily="34" charset="0"/>
-                <a:ea typeface="Source Sans Pro Light" panose="020B0403030403020204" pitchFamily="34" charset="0"/>
-              </a:rPr>
-              <a:t>After transformations (e.g., normalization, standardization ...) are completed, Stan checks if transformed data meets the boundaries, we set on declared variables. If we violated our own constraints Stan errors out.</a:t>
-            </a:r>
+              <a:t>In it you can code up any custom functions that will help you in your work.</a:t>
+            </a:r>
+          </a:p>
+          <a:p>
+            <a:endParaRPr lang="en-US" sz="2000" dirty="0">
+              <a:latin typeface="Source Sans Pro Light" panose="020B0403030403020204" pitchFamily="34" charset="0"/>
+              <a:ea typeface="Source Sans Pro Light" panose="020B0403030403020204" pitchFamily="34" charset="0"/>
+            </a:endParaRPr>
           </a:p>
           <a:p>
             <a:endParaRPr lang="en-US" sz="2000" dirty="0">
@@ -11595,7 +11569,7 @@
     </p:spTree>
     <p:extLst>
       <p:ext uri="{BB962C8B-B14F-4D97-AF65-F5344CB8AC3E}">
-        <p14:creationId xmlns:p14="http://schemas.microsoft.com/office/powerpoint/2010/main" val="2352728793"/>
+        <p14:creationId xmlns:p14="http://schemas.microsoft.com/office/powerpoint/2010/main" val="15592896"/>
       </p:ext>
     </p:extLst>
   </p:cSld>
@@ -11650,7 +11624,7 @@
                 <a:latin typeface="Source Sans Pro" panose="020B0503030403020204" pitchFamily="34" charset="0"/>
                 <a:ea typeface="Source Sans Pro" panose="020B0503030403020204" pitchFamily="34" charset="0"/>
               </a:rPr>
-              <a:t>The transformed parameters block</a:t>
+              <a:t>The transformed data block</a:t>
             </a:r>
             <a:endParaRPr lang="LID4096" sz="2800" b="1" dirty="0">
               <a:latin typeface="Source Sans Pro" panose="020B0503030403020204" pitchFamily="34" charset="0"/>
@@ -11695,7 +11669,7 @@
                 <a:latin typeface="Consolas" panose="020B0609020204030204" pitchFamily="49" charset="0"/>
                 <a:ea typeface="Source Sans Pro Light" panose="020B0403030403020204" pitchFamily="34" charset="0"/>
               </a:rPr>
-              <a:t>transformed parameters {</a:t>
+              <a:t>transformed data {</a:t>
             </a:r>
           </a:p>
           <a:p>
@@ -11719,7 +11693,7 @@
                 <a:latin typeface="Consolas" panose="020B0609020204030204" pitchFamily="49" charset="0"/>
                 <a:ea typeface="Source Sans Pro Light" panose="020B0403030403020204" pitchFamily="34" charset="0"/>
               </a:rPr>
-              <a:t>// mathematical transformations of model’s parameters</a:t>
+              <a:t>// mathematical transformations of the data</a:t>
             </a:r>
           </a:p>
           <a:p>
@@ -11773,21 +11747,21 @@
                 <a:latin typeface="Source Sans Pro Light" panose="020B0403030403020204" pitchFamily="34" charset="0"/>
                 <a:ea typeface="Source Sans Pro Light" panose="020B0403030403020204" pitchFamily="34" charset="0"/>
               </a:rPr>
-              <a:t>This block servers a similar purpose as the </a:t>
-            </a:r>
-            <a:r>
-              <a:rPr lang="en-US" sz="2000" dirty="0">
-                <a:latin typeface="Consolas" panose="020B0609020204030204" pitchFamily="49" charset="0"/>
-                <a:ea typeface="Source Sans Pro Light" panose="020B0403030403020204" pitchFamily="34" charset="0"/>
-              </a:rPr>
-              <a:t>transformed data</a:t>
+              <a:t>This block is used to perform any transformation on the input data from the </a:t>
+            </a:r>
+            <a:r>
+              <a:rPr lang="en-US" sz="2000" dirty="0">
+                <a:latin typeface="Consolas" panose="020B0609020204030204" pitchFamily="49" charset="0"/>
+                <a:ea typeface="Source Sans Pro Light" panose="020B0403030403020204" pitchFamily="34" charset="0"/>
+              </a:rPr>
+              <a:t>data</a:t>
             </a:r>
             <a:r>
               <a:rPr lang="en-US" sz="2000" dirty="0">
                 <a:latin typeface="Source Sans Pro Light" panose="020B0403030403020204" pitchFamily="34" charset="0"/>
                 <a:ea typeface="Source Sans Pro Light" panose="020B0403030403020204" pitchFamily="34" charset="0"/>
               </a:rPr>
-              <a:t> block, except that this time we are transforming model’s parameters.</a:t>
+              <a:t> block.</a:t>
             </a:r>
           </a:p>
           <a:p>
@@ -11796,16 +11770,7 @@
                 <a:latin typeface="Source Sans Pro Light" panose="020B0403030403020204" pitchFamily="34" charset="0"/>
                 <a:ea typeface="Source Sans Pro Light" panose="020B0403030403020204" pitchFamily="34" charset="0"/>
               </a:rPr>
-              <a:t>Transformed parameters are part of model’s output.</a:t>
-            </a:r>
-          </a:p>
-          <a:p>
-            <a:r>
-              <a:rPr lang="en-US" sz="2000" dirty="0">
-                <a:latin typeface="Source Sans Pro Light" panose="020B0403030403020204" pitchFamily="34" charset="0"/>
-                <a:ea typeface="Source Sans Pro Light" panose="020B0403030403020204" pitchFamily="34" charset="0"/>
-              </a:rPr>
-              <a:t>After statements are executed, Stan check the constraints we provided. If the parameter does not meet the constraints its value will be rejected.</a:t>
+              <a:t>After transformations (e.g., normalization, standardization ...) are completed, Stan checks if transformed data meets the boundaries, we set on declared variables. If we violated our own constraints Stan errors out.</a:t>
             </a:r>
           </a:p>
           <a:p>
@@ -11867,7 +11832,7 @@
     </p:spTree>
     <p:extLst>
       <p:ext uri="{BB962C8B-B14F-4D97-AF65-F5344CB8AC3E}">
-        <p14:creationId xmlns:p14="http://schemas.microsoft.com/office/powerpoint/2010/main" val="1103223596"/>
+        <p14:creationId xmlns:p14="http://schemas.microsoft.com/office/powerpoint/2010/main" val="2352728793"/>
       </p:ext>
     </p:extLst>
   </p:cSld>
@@ -11922,7 +11887,7 @@
                 <a:latin typeface="Source Sans Pro" panose="020B0503030403020204" pitchFamily="34" charset="0"/>
                 <a:ea typeface="Source Sans Pro" panose="020B0503030403020204" pitchFamily="34" charset="0"/>
               </a:rPr>
-              <a:t>The generated quantities block</a:t>
+              <a:t>The transformed parameters block</a:t>
             </a:r>
             <a:endParaRPr lang="LID4096" sz="2800" b="1" dirty="0">
               <a:latin typeface="Source Sans Pro" panose="020B0503030403020204" pitchFamily="34" charset="0"/>
@@ -11955,7 +11920,7 @@
         </p:spPr>
         <p:txBody>
           <a:bodyPr>
-            <a:normAutofit fontScale="92500" lnSpcReduction="10000"/>
+            <a:normAutofit lnSpcReduction="10000"/>
           </a:bodyPr>
           <a:lstStyle/>
           <a:p>
@@ -11967,7 +11932,7 @@
                 <a:latin typeface="Consolas" panose="020B0609020204030204" pitchFamily="49" charset="0"/>
                 <a:ea typeface="Source Sans Pro Light" panose="020B0403030403020204" pitchFamily="34" charset="0"/>
               </a:rPr>
-              <a:t>generated quantities {</a:t>
+              <a:t>transformed parameters {</a:t>
             </a:r>
           </a:p>
           <a:p>
@@ -11991,7 +11956,7 @@
                 <a:latin typeface="Consolas" panose="020B0609020204030204" pitchFamily="49" charset="0"/>
                 <a:ea typeface="Source Sans Pro Light" panose="020B0403030403020204" pitchFamily="34" charset="0"/>
               </a:rPr>
-              <a:t>// additional generated outputs</a:t>
+              <a:t>// mathematical transformations of model’s parameters</a:t>
             </a:r>
           </a:p>
           <a:p>
@@ -12045,21 +12010,42 @@
                 <a:latin typeface="Source Sans Pro Light" panose="020B0403030403020204" pitchFamily="34" charset="0"/>
                 <a:ea typeface="Source Sans Pro Light" panose="020B0403030403020204" pitchFamily="34" charset="0"/>
               </a:rPr>
-              <a:t>This block is rather different then other blocks as nothing in it affects the sampled parameter values.</a:t>
-            </a:r>
-            <a:endParaRPr lang="en-US" sz="2000" dirty="0">
-              <a:latin typeface="Consolas" panose="020B0609020204030204" pitchFamily="49" charset="0"/>
-              <a:ea typeface="Source Sans Pro Light" panose="020B0403030403020204" pitchFamily="34" charset="0"/>
-            </a:endParaRPr>
-          </a:p>
-          <a:p>
+              <a:t>This block servers a similar purpose as the </a:t>
+            </a:r>
+            <a:r>
+              <a:rPr lang="en-US" sz="2000" dirty="0">
+                <a:latin typeface="Consolas" panose="020B0609020204030204" pitchFamily="49" charset="0"/>
+                <a:ea typeface="Source Sans Pro Light" panose="020B0403030403020204" pitchFamily="34" charset="0"/>
+              </a:rPr>
+              <a:t>transformed data</a:t>
+            </a:r>
             <a:r>
               <a:rPr lang="en-US" sz="2000" dirty="0">
                 <a:latin typeface="Source Sans Pro Light" panose="020B0403030403020204" pitchFamily="34" charset="0"/>
                 <a:ea typeface="Source Sans Pro Light" panose="020B0403030403020204" pitchFamily="34" charset="0"/>
               </a:rPr>
-              <a:t>This block is executed after a sample is generated, in it we can use model’s variables to generate custom quantities we are interested in (e.g., posterior event probabilities, comparisons between parameters, log likelihoods ...).</a:t>
-            </a:r>
+              <a:t> block, except that this time we are transforming model’s parameters.</a:t>
+            </a:r>
+          </a:p>
+          <a:p>
+            <a:r>
+              <a:rPr lang="en-US" sz="2000" dirty="0">
+                <a:latin typeface="Source Sans Pro Light" panose="020B0403030403020204" pitchFamily="34" charset="0"/>
+                <a:ea typeface="Source Sans Pro Light" panose="020B0403030403020204" pitchFamily="34" charset="0"/>
+              </a:rPr>
+              <a:t>Transformed parameters are part of model’s output.</a:t>
+            </a:r>
+          </a:p>
+          <a:p>
+            <a:r>
+              <a:rPr lang="en-US" sz="2000" dirty="0">
+                <a:latin typeface="Source Sans Pro Light" panose="020B0403030403020204" pitchFamily="34" charset="0"/>
+                <a:ea typeface="Source Sans Pro Light" panose="020B0403030403020204" pitchFamily="34" charset="0"/>
+              </a:rPr>
+              <a:t>After statements are executed, Stan check the constraints we provided. If the parameter does not meet the constraints its value will be rejected.</a:t>
+            </a:r>
+          </a:p>
+          <a:p>
             <a:endParaRPr lang="en-US" sz="2000" dirty="0">
               <a:latin typeface="Consolas" panose="020B0609020204030204" pitchFamily="49" charset="0"/>
               <a:ea typeface="Source Sans Pro Light" panose="020B0403030403020204" pitchFamily="34" charset="0"/>
@@ -12118,7 +12104,7 @@
     </p:spTree>
     <p:extLst>
       <p:ext uri="{BB962C8B-B14F-4D97-AF65-F5344CB8AC3E}">
-        <p14:creationId xmlns:p14="http://schemas.microsoft.com/office/powerpoint/2010/main" val="3700523165"/>
+        <p14:creationId xmlns:p14="http://schemas.microsoft.com/office/powerpoint/2010/main" val="1103223596"/>
       </p:ext>
     </p:extLst>
   </p:cSld>
@@ -12379,43 +12365,6 @@
           <a:chExt cx="0" cy="0"/>
         </a:xfrm>
       </p:grpSpPr>
-      <p:pic>
-        <p:nvPicPr>
-          <p:cNvPr id="4" name="Picture 3" descr="Logo, company name&#10;&#10;Description automatically generated">
-            <a:extLst>
-              <a:ext uri="{FF2B5EF4-FFF2-40B4-BE49-F238E27FC236}">
-                <a16:creationId xmlns:a16="http://schemas.microsoft.com/office/drawing/2014/main" id="{B843C928-BA92-4E3B-A771-AAED350D87B3}"/>
-              </a:ext>
-            </a:extLst>
-          </p:cNvPr>
-          <p:cNvPicPr>
-            <a:picLocks noChangeAspect="1"/>
-          </p:cNvPicPr>
-          <p:nvPr/>
-        </p:nvPicPr>
-        <p:blipFill>
-          <a:blip r:embed="rId3">
-            <a:alphaModFix amt="5000"/>
-            <a:extLst>
-              <a:ext uri="{28A0092B-C50C-407E-A947-70E740481C1C}">
-                <a14:useLocalDpi xmlns:a14="http://schemas.microsoft.com/office/drawing/2010/main" val="0"/>
-              </a:ext>
-            </a:extLst>
-          </a:blip>
-          <a:stretch>
-            <a:fillRect/>
-          </a:stretch>
-        </p:blipFill>
-        <p:spPr>
-          <a:xfrm>
-            <a:off x="2030642" y="309365"/>
-            <a:ext cx="5082715" cy="5096270"/>
-          </a:xfrm>
-          <a:prstGeom prst="rect">
-            <a:avLst/>
-          </a:prstGeom>
-        </p:spPr>
-      </p:pic>
       <p:sp>
         <p:nvSpPr>
           <p:cNvPr id="2" name="Title 1">
@@ -12444,7 +12393,7 @@
                 <a:latin typeface="Source Sans Pro" panose="020B0503030403020204" pitchFamily="34" charset="0"/>
                 <a:ea typeface="Source Sans Pro" panose="020B0503030403020204" pitchFamily="34" charset="0"/>
               </a:rPr>
-              <a:t>Log posterior probability</a:t>
+              <a:t>The generated quantities block</a:t>
             </a:r>
             <a:endParaRPr lang="LID4096" sz="2800" b="1" dirty="0">
               <a:latin typeface="Source Sans Pro" panose="020B0503030403020204" pitchFamily="34" charset="0"/>
@@ -12481,219 +12430,111 @@
           </a:bodyPr>
           <a:lstStyle/>
           <a:p>
-            <a:r>
-              <a:rPr lang="en-US" sz="2000" dirty="0">
-                <a:latin typeface="Source Sans Pro Light" panose="020B0403030403020204" pitchFamily="34" charset="0"/>
-                <a:ea typeface="Source Sans Pro Light" panose="020B0403030403020204" pitchFamily="34" charset="0"/>
-              </a:rPr>
-              <a:t>In the Bayesian setting a probabilistic program is a description of how to compute the posterior distribution. The essence of computation in Stan is dealing with the logarithm of the posterior probability density.</a:t>
-            </a:r>
-          </a:p>
-          <a:p>
-            <a:endParaRPr lang="en-US" sz="2000" dirty="0">
-              <a:latin typeface="Source Sans Pro Light" panose="020B0403030403020204" pitchFamily="34" charset="0"/>
-              <a:ea typeface="Source Sans Pro Light" panose="020B0403030403020204" pitchFamily="34" charset="0"/>
-            </a:endParaRPr>
-          </a:p>
-          <a:p>
-            <a:r>
-              <a:rPr lang="en-US" sz="2000" dirty="0">
-                <a:latin typeface="Source Sans Pro Light" panose="020B0403030403020204" pitchFamily="34" charset="0"/>
-                <a:ea typeface="Source Sans Pro Light" panose="020B0403030403020204" pitchFamily="34" charset="0"/>
-              </a:rPr>
-              <a:t>In practice </a:t>
-            </a:r>
-            <a:r>
-              <a:rPr lang="en-US" sz="2000" dirty="0">
-                <a:latin typeface="Consolas" panose="020B0609020204030204" pitchFamily="49" charset="0"/>
-                <a:ea typeface="Source Sans Pro Light" panose="020B0403030403020204" pitchFamily="34" charset="0"/>
-              </a:rPr>
-              <a:t>y[</a:t>
-            </a:r>
-            <a:r>
-              <a:rPr lang="en-US" sz="2000" dirty="0" err="1">
-                <a:latin typeface="Consolas" panose="020B0609020204030204" pitchFamily="49" charset="0"/>
-                <a:ea typeface="Source Sans Pro Light" panose="020B0403030403020204" pitchFamily="34" charset="0"/>
-              </a:rPr>
-              <a:t>i</a:t>
-            </a:r>
-            <a:r>
-              <a:rPr lang="en-US" sz="2000" dirty="0">
-                <a:latin typeface="Consolas" panose="020B0609020204030204" pitchFamily="49" charset="0"/>
-                <a:ea typeface="Source Sans Pro Light" panose="020B0403030403020204" pitchFamily="34" charset="0"/>
-              </a:rPr>
-              <a:t>] ~ normal(mu, sigma);</a:t>
-            </a:r>
-            <a:r>
-              <a:rPr lang="en-US" sz="2000" dirty="0">
-                <a:latin typeface="Source Sans Pro Light" panose="020B0403030403020204" pitchFamily="34" charset="0"/>
-                <a:ea typeface="Source Sans Pro Light" panose="020B0403030403020204" pitchFamily="34" charset="0"/>
-              </a:rPr>
-              <a:t> multiplies the current posterior probability by the density of the </a:t>
-            </a:r>
-            <a:r>
-              <a:rPr lang="en-US" sz="2000" dirty="0">
-                <a:latin typeface="Consolas" panose="020B0609020204030204" pitchFamily="49" charset="0"/>
-                <a:ea typeface="Source Sans Pro Light" panose="020B0403030403020204" pitchFamily="34" charset="0"/>
-              </a:rPr>
-              <a:t>normal</a:t>
-            </a:r>
-            <a:r>
-              <a:rPr lang="en-US" sz="2000" dirty="0">
-                <a:latin typeface="Source Sans Pro Light" panose="020B0403030403020204" pitchFamily="34" charset="0"/>
-                <a:ea typeface="Source Sans Pro Light" panose="020B0403030403020204" pitchFamily="34" charset="0"/>
-              </a:rPr>
-              <a:t> distribution at </a:t>
-            </a:r>
-            <a:r>
-              <a:rPr lang="en-US" sz="2000" dirty="0">
-                <a:latin typeface="Consolas" panose="020B0609020204030204" pitchFamily="49" charset="0"/>
-                <a:ea typeface="Source Sans Pro Light" panose="020B0403030403020204" pitchFamily="34" charset="0"/>
-              </a:rPr>
-              <a:t>y[</a:t>
-            </a:r>
-            <a:r>
-              <a:rPr lang="en-US" sz="2000" dirty="0" err="1">
-                <a:latin typeface="Consolas" panose="020B0609020204030204" pitchFamily="49" charset="0"/>
-                <a:ea typeface="Source Sans Pro Light" panose="020B0403030403020204" pitchFamily="34" charset="0"/>
-              </a:rPr>
-              <a:t>i</a:t>
-            </a:r>
-            <a:r>
-              <a:rPr lang="en-US" sz="2000" dirty="0">
-                <a:latin typeface="Consolas" panose="020B0609020204030204" pitchFamily="49" charset="0"/>
-                <a:ea typeface="Source Sans Pro Light" panose="020B0403030403020204" pitchFamily="34" charset="0"/>
-              </a:rPr>
-              <a:t>]</a:t>
-            </a:r>
-            <a:r>
-              <a:rPr lang="en-US" sz="2000" dirty="0">
-                <a:latin typeface="Source Sans Pro Light" panose="020B0403030403020204" pitchFamily="34" charset="0"/>
-                <a:ea typeface="Source Sans Pro Light" panose="020B0403030403020204" pitchFamily="34" charset="0"/>
-              </a:rPr>
-              <a:t>.</a:t>
-            </a:r>
-          </a:p>
-          <a:p>
-            <a:endParaRPr lang="en-US" sz="2000" dirty="0">
-              <a:latin typeface="Source Sans Pro Light" panose="020B0403030403020204" pitchFamily="34" charset="0"/>
-              <a:ea typeface="Source Sans Pro Light" panose="020B0403030403020204" pitchFamily="34" charset="0"/>
-            </a:endParaRPr>
-          </a:p>
-          <a:p>
-            <a:r>
-              <a:rPr lang="en-US" sz="2000" dirty="0">
-                <a:latin typeface="Source Sans Pro Light" panose="020B0403030403020204" pitchFamily="34" charset="0"/>
-                <a:ea typeface="Source Sans Pro Light" panose="020B0403030403020204" pitchFamily="34" charset="0"/>
-              </a:rPr>
-              <a:t>This is the same as an increment of current log-probability by the log-density of the normal distribution at </a:t>
-            </a:r>
-            <a:r>
-              <a:rPr lang="en-US" sz="2000" dirty="0">
-                <a:latin typeface="Consolas" panose="020B0609020204030204" pitchFamily="49" charset="0"/>
-                <a:ea typeface="Source Sans Pro Light" panose="020B0403030403020204" pitchFamily="34" charset="0"/>
-              </a:rPr>
-              <a:t>y[</a:t>
-            </a:r>
-            <a:r>
-              <a:rPr lang="en-US" sz="2000" dirty="0" err="1">
-                <a:latin typeface="Consolas" panose="020B0609020204030204" pitchFamily="49" charset="0"/>
-                <a:ea typeface="Source Sans Pro Light" panose="020B0403030403020204" pitchFamily="34" charset="0"/>
-              </a:rPr>
-              <a:t>i</a:t>
-            </a:r>
-            <a:r>
-              <a:rPr lang="en-US" sz="2000" dirty="0">
-                <a:latin typeface="Consolas" panose="020B0609020204030204" pitchFamily="49" charset="0"/>
-                <a:ea typeface="Source Sans Pro Light" panose="020B0403030403020204" pitchFamily="34" charset="0"/>
-              </a:rPr>
-              <a:t>]</a:t>
-            </a:r>
-            <a:r>
-              <a:rPr lang="en-US" sz="2000" dirty="0">
-                <a:latin typeface="Source Sans Pro Light" panose="020B0403030403020204" pitchFamily="34" charset="0"/>
-                <a:ea typeface="Source Sans Pro Light" panose="020B0403030403020204" pitchFamily="34" charset="0"/>
-              </a:rPr>
-              <a:t>.</a:t>
-            </a:r>
-          </a:p>
-          <a:p>
-            <a:endParaRPr lang="en-US" sz="2000" dirty="0">
-              <a:latin typeface="Source Sans Pro Light" panose="020B0403030403020204" pitchFamily="34" charset="0"/>
-              <a:ea typeface="Source Sans Pro Light" panose="020B0403030403020204" pitchFamily="34" charset="0"/>
-            </a:endParaRPr>
-          </a:p>
-          <a:p>
-            <a:r>
-              <a:rPr lang="en-US" sz="2000" dirty="0">
-                <a:latin typeface="Source Sans Pro Light" panose="020B0403030403020204" pitchFamily="34" charset="0"/>
-                <a:ea typeface="Source Sans Pro Light" panose="020B0403030403020204" pitchFamily="34" charset="0"/>
-              </a:rPr>
-              <a:t>Indeed, we can replace </a:t>
-            </a:r>
-            <a:r>
-              <a:rPr lang="en-US" sz="2000" dirty="0">
-                <a:latin typeface="Consolas" panose="020B0609020204030204" pitchFamily="49" charset="0"/>
-                <a:ea typeface="Source Sans Pro Light" panose="020B0403030403020204" pitchFamily="34" charset="0"/>
-              </a:rPr>
-              <a:t>y[</a:t>
-            </a:r>
-            <a:r>
-              <a:rPr lang="en-US" sz="2000" dirty="0" err="1">
-                <a:latin typeface="Consolas" panose="020B0609020204030204" pitchFamily="49" charset="0"/>
-                <a:ea typeface="Source Sans Pro Light" panose="020B0403030403020204" pitchFamily="34" charset="0"/>
-              </a:rPr>
-              <a:t>i</a:t>
-            </a:r>
-            <a:r>
-              <a:rPr lang="en-US" sz="2000" dirty="0">
-                <a:latin typeface="Consolas" panose="020B0609020204030204" pitchFamily="49" charset="0"/>
-                <a:ea typeface="Source Sans Pro Light" panose="020B0403030403020204" pitchFamily="34" charset="0"/>
-              </a:rPr>
-              <a:t>] ~ normal(mu, sigma);</a:t>
-            </a:r>
-            <a:r>
-              <a:rPr lang="en-US" sz="2000" dirty="0">
-                <a:latin typeface="Source Sans Pro Light" panose="020B0403030403020204" pitchFamily="34" charset="0"/>
-                <a:ea typeface="Source Sans Pro Light" panose="020B0403030403020204" pitchFamily="34" charset="0"/>
-              </a:rPr>
-              <a:t> with </a:t>
-            </a:r>
-            <a:r>
-              <a:rPr lang="en-US" sz="2000" dirty="0">
-                <a:latin typeface="Consolas" panose="020B0609020204030204" pitchFamily="49" charset="0"/>
-                <a:ea typeface="Source Sans Pro Light" panose="020B0403030403020204" pitchFamily="34" charset="0"/>
-              </a:rPr>
-              <a:t>target += </a:t>
-            </a:r>
-            <a:r>
-              <a:rPr lang="en-US" sz="2000" dirty="0" err="1">
-                <a:latin typeface="Consolas" panose="020B0609020204030204" pitchFamily="49" charset="0"/>
-                <a:ea typeface="Source Sans Pro Light" panose="020B0403030403020204" pitchFamily="34" charset="0"/>
-              </a:rPr>
-              <a:t>normal_lpdf</a:t>
-            </a:r>
-            <a:r>
-              <a:rPr lang="en-US" sz="2000" dirty="0">
-                <a:latin typeface="Consolas" panose="020B0609020204030204" pitchFamily="49" charset="0"/>
-                <a:ea typeface="Source Sans Pro Light" panose="020B0403030403020204" pitchFamily="34" charset="0"/>
-              </a:rPr>
-              <a:t>(y | mu, sigma)</a:t>
-            </a:r>
-            <a:r>
-              <a:rPr lang="en-US" sz="2000" dirty="0">
-                <a:latin typeface="Source Sans Pro Light" panose="020B0403030403020204" pitchFamily="34" charset="0"/>
-                <a:ea typeface="Source Sans Pro Light" panose="020B0403030403020204" pitchFamily="34" charset="0"/>
-              </a:rPr>
-              <a:t>.</a:t>
-            </a:r>
+            <a:pPr marL="0" indent="0">
+              <a:buNone/>
+            </a:pPr>
+            <a:r>
+              <a:rPr lang="en-US" sz="2000" dirty="0">
+                <a:latin typeface="Consolas" panose="020B0609020204030204" pitchFamily="49" charset="0"/>
+                <a:ea typeface="Source Sans Pro Light" panose="020B0403030403020204" pitchFamily="34" charset="0"/>
+              </a:rPr>
+              <a:t>generated quantities {</a:t>
+            </a:r>
+          </a:p>
+          <a:p>
+            <a:pPr marL="0" indent="0">
+              <a:buNone/>
+            </a:pPr>
+            <a:r>
+              <a:rPr lang="en-US" sz="2000" dirty="0">
+                <a:latin typeface="Consolas" panose="020B0609020204030204" pitchFamily="49" charset="0"/>
+                <a:ea typeface="Source Sans Pro Light" panose="020B0403030403020204" pitchFamily="34" charset="0"/>
+              </a:rPr>
+              <a:t>  </a:t>
+            </a:r>
+            <a:r>
+              <a:rPr lang="en-US" sz="2000" dirty="0">
+                <a:solidFill>
+                  <a:schemeClr val="bg1">
+                    <a:lumMod val="65000"/>
+                  </a:schemeClr>
+                </a:solidFill>
+                <a:latin typeface="Consolas" panose="020B0609020204030204" pitchFamily="49" charset="0"/>
+                <a:ea typeface="Source Sans Pro Light" panose="020B0403030403020204" pitchFamily="34" charset="0"/>
+              </a:rPr>
+              <a:t>// additional generated outputs</a:t>
+            </a:r>
+          </a:p>
+          <a:p>
+            <a:pPr marL="0" indent="0">
+              <a:buNone/>
+            </a:pPr>
+            <a:r>
+              <a:rPr lang="en-US" sz="2000" dirty="0">
+                <a:latin typeface="Consolas" panose="020B0609020204030204" pitchFamily="49" charset="0"/>
+                <a:ea typeface="Source Sans Pro Light" panose="020B0403030403020204" pitchFamily="34" charset="0"/>
+              </a:rPr>
+              <a:t>  ... declarations ...</a:t>
+            </a:r>
+          </a:p>
+          <a:p>
+            <a:pPr marL="0" indent="0">
+              <a:buNone/>
+            </a:pPr>
+            <a:r>
+              <a:rPr lang="en-US" sz="2000" dirty="0">
+                <a:latin typeface="Consolas" panose="020B0609020204030204" pitchFamily="49" charset="0"/>
+                <a:ea typeface="Source Sans Pro Light" panose="020B0403030403020204" pitchFamily="34" charset="0"/>
+              </a:rPr>
+              <a:t>  ... statements ...</a:t>
+            </a:r>
+          </a:p>
+          <a:p>
+            <a:pPr marL="0" indent="0">
+              <a:buNone/>
+            </a:pPr>
+            <a:r>
+              <a:rPr lang="en-US" sz="2000" dirty="0">
+                <a:latin typeface="Consolas" panose="020B0609020204030204" pitchFamily="49" charset="0"/>
+                <a:ea typeface="Source Sans Pro Light" panose="020B0403030403020204" pitchFamily="34" charset="0"/>
+              </a:rPr>
+              <a:t>}</a:t>
+            </a:r>
+          </a:p>
+          <a:p>
+            <a:pPr marL="0" indent="0">
+              <a:buNone/>
+            </a:pPr>
             <a:endParaRPr lang="en-US" sz="2000" dirty="0">
               <a:latin typeface="Consolas" panose="020B0609020204030204" pitchFamily="49" charset="0"/>
               <a:ea typeface="Source Sans Pro Light" panose="020B0403030403020204" pitchFamily="34" charset="0"/>
             </a:endParaRPr>
           </a:p>
           <a:p>
-            <a:endParaRPr lang="en-US" dirty="0"/>
+            <a:r>
+              <a:rPr lang="en-US" sz="2000" dirty="0">
+                <a:latin typeface="Source Sans Pro Light" panose="020B0403030403020204" pitchFamily="34" charset="0"/>
+                <a:ea typeface="Source Sans Pro Light" panose="020B0403030403020204" pitchFamily="34" charset="0"/>
+              </a:rPr>
+              <a:t>This block is rather different then other blocks as nothing in it affects the sampled parameter values.</a:t>
+            </a:r>
+            <a:endParaRPr lang="en-US" sz="2000" dirty="0">
+              <a:latin typeface="Consolas" panose="020B0609020204030204" pitchFamily="49" charset="0"/>
+              <a:ea typeface="Source Sans Pro Light" panose="020B0403030403020204" pitchFamily="34" charset="0"/>
+            </a:endParaRPr>
+          </a:p>
+          <a:p>
+            <a:r>
+              <a:rPr lang="en-US" sz="2000" dirty="0">
+                <a:latin typeface="Source Sans Pro Light" panose="020B0403030403020204" pitchFamily="34" charset="0"/>
+                <a:ea typeface="Source Sans Pro Light" panose="020B0403030403020204" pitchFamily="34" charset="0"/>
+              </a:rPr>
+              <a:t>This block is executed after a sample is generated, in it we can use model’s variables to generate custom quantities we are interested in (e.g., posterior event probabilities, comparisons between parameters, log likelihoods ...).</a:t>
+            </a:r>
+            <a:endParaRPr lang="en-US" sz="2000" dirty="0">
+              <a:latin typeface="Consolas" panose="020B0609020204030204" pitchFamily="49" charset="0"/>
+              <a:ea typeface="Source Sans Pro Light" panose="020B0403030403020204" pitchFamily="34" charset="0"/>
+            </a:endParaRPr>
           </a:p>
         </p:txBody>
       </p:sp>
@@ -12748,7 +12589,7 @@
     </p:spTree>
     <p:extLst>
       <p:ext uri="{BB962C8B-B14F-4D97-AF65-F5344CB8AC3E}">
-        <p14:creationId xmlns:p14="http://schemas.microsoft.com/office/powerpoint/2010/main" val="2683307699"/>
+        <p14:creationId xmlns:p14="http://schemas.microsoft.com/office/powerpoint/2010/main" val="3700523165"/>
       </p:ext>
     </p:extLst>
   </p:cSld>
@@ -12814,6 +12655,287 @@
       </p:pic>
       <p:sp>
         <p:nvSpPr>
+          <p:cNvPr id="2" name="Title 1">
+            <a:extLst>
+              <a:ext uri="{FF2B5EF4-FFF2-40B4-BE49-F238E27FC236}">
+                <a16:creationId xmlns:a16="http://schemas.microsoft.com/office/drawing/2014/main" id="{5488FAB6-27FF-4F6E-B6A3-2E4E1E84283E}"/>
+              </a:ext>
+            </a:extLst>
+          </p:cNvPr>
+          <p:cNvSpPr>
+            <a:spLocks noGrp="1"/>
+          </p:cNvSpPr>
+          <p:nvPr>
+            <p:ph type="title"/>
+          </p:nvPr>
+        </p:nvSpPr>
+        <p:spPr/>
+        <p:txBody>
+          <a:bodyPr>
+            <a:normAutofit/>
+          </a:bodyPr>
+          <a:lstStyle/>
+          <a:p>
+            <a:r>
+              <a:rPr lang="en-US" sz="2800" b="1" dirty="0">
+                <a:latin typeface="Source Sans Pro" panose="020B0503030403020204" pitchFamily="34" charset="0"/>
+                <a:ea typeface="Source Sans Pro" panose="020B0503030403020204" pitchFamily="34" charset="0"/>
+              </a:rPr>
+              <a:t>Log posterior probability</a:t>
+            </a:r>
+            <a:endParaRPr lang="LID4096" sz="2800" b="1" dirty="0">
+              <a:latin typeface="Source Sans Pro" panose="020B0503030403020204" pitchFamily="34" charset="0"/>
+              <a:ea typeface="Source Sans Pro" panose="020B0503030403020204" pitchFamily="34" charset="0"/>
+            </a:endParaRPr>
+          </a:p>
+        </p:txBody>
+      </p:sp>
+      <p:sp>
+        <p:nvSpPr>
+          <p:cNvPr id="3" name="Content Placeholder 2">
+            <a:extLst>
+              <a:ext uri="{FF2B5EF4-FFF2-40B4-BE49-F238E27FC236}">
+                <a16:creationId xmlns:a16="http://schemas.microsoft.com/office/drawing/2014/main" id="{02774E1B-7E41-4FBF-B60A-597EA771BF83}"/>
+              </a:ext>
+            </a:extLst>
+          </p:cNvPr>
+          <p:cNvSpPr>
+            <a:spLocks noGrp="1"/>
+          </p:cNvSpPr>
+          <p:nvPr>
+            <p:ph idx="1"/>
+          </p:nvPr>
+        </p:nvSpPr>
+        <p:spPr>
+          <a:xfrm>
+            <a:off x="628649" y="1521354"/>
+            <a:ext cx="7886699" cy="3626115"/>
+          </a:xfrm>
+        </p:spPr>
+        <p:txBody>
+          <a:bodyPr>
+            <a:normAutofit fontScale="92500" lnSpcReduction="10000"/>
+          </a:bodyPr>
+          <a:lstStyle/>
+          <a:p>
+            <a:r>
+              <a:rPr lang="en-US" sz="2000" dirty="0">
+                <a:latin typeface="Source Sans Pro Light" panose="020B0403030403020204" pitchFamily="34" charset="0"/>
+                <a:ea typeface="Source Sans Pro Light" panose="020B0403030403020204" pitchFamily="34" charset="0"/>
+              </a:rPr>
+              <a:t>In the Bayesian setting a probabilistic program is a description of how to compute the posterior distribution. The essence of computation in Stan is dealing with the logarithm of the posterior probability density.</a:t>
+            </a:r>
+          </a:p>
+          <a:p>
+            <a:endParaRPr lang="en-US" sz="2000" dirty="0">
+              <a:latin typeface="Source Sans Pro Light" panose="020B0403030403020204" pitchFamily="34" charset="0"/>
+              <a:ea typeface="Source Sans Pro Light" panose="020B0403030403020204" pitchFamily="34" charset="0"/>
+            </a:endParaRPr>
+          </a:p>
+          <a:p>
+            <a:r>
+              <a:rPr lang="en-US" sz="2000" dirty="0">
+                <a:latin typeface="Source Sans Pro Light" panose="020B0403030403020204" pitchFamily="34" charset="0"/>
+                <a:ea typeface="Source Sans Pro Light" panose="020B0403030403020204" pitchFamily="34" charset="0"/>
+              </a:rPr>
+              <a:t>In practice </a:t>
+            </a:r>
+            <a:r>
+              <a:rPr lang="en-US" sz="2000" dirty="0">
+                <a:latin typeface="Consolas" panose="020B0609020204030204" pitchFamily="49" charset="0"/>
+                <a:ea typeface="Source Sans Pro Light" panose="020B0403030403020204" pitchFamily="34" charset="0"/>
+              </a:rPr>
+              <a:t>y[</a:t>
+            </a:r>
+            <a:r>
+              <a:rPr lang="en-US" sz="2000" dirty="0" err="1">
+                <a:latin typeface="Consolas" panose="020B0609020204030204" pitchFamily="49" charset="0"/>
+                <a:ea typeface="Source Sans Pro Light" panose="020B0403030403020204" pitchFamily="34" charset="0"/>
+              </a:rPr>
+              <a:t>i</a:t>
+            </a:r>
+            <a:r>
+              <a:rPr lang="en-US" sz="2000" dirty="0">
+                <a:latin typeface="Consolas" panose="020B0609020204030204" pitchFamily="49" charset="0"/>
+                <a:ea typeface="Source Sans Pro Light" panose="020B0403030403020204" pitchFamily="34" charset="0"/>
+              </a:rPr>
+              <a:t>] ~ normal(mu, sigma);</a:t>
+            </a:r>
+            <a:r>
+              <a:rPr lang="en-US" sz="2000" dirty="0">
+                <a:latin typeface="Source Sans Pro Light" panose="020B0403030403020204" pitchFamily="34" charset="0"/>
+                <a:ea typeface="Source Sans Pro Light" panose="020B0403030403020204" pitchFamily="34" charset="0"/>
+              </a:rPr>
+              <a:t> multiplies the current posterior probability by the density of the </a:t>
+            </a:r>
+            <a:r>
+              <a:rPr lang="en-US" sz="2000" dirty="0">
+                <a:latin typeface="Consolas" panose="020B0609020204030204" pitchFamily="49" charset="0"/>
+                <a:ea typeface="Source Sans Pro Light" panose="020B0403030403020204" pitchFamily="34" charset="0"/>
+              </a:rPr>
+              <a:t>normal</a:t>
+            </a:r>
+            <a:r>
+              <a:rPr lang="en-US" sz="2000" dirty="0">
+                <a:latin typeface="Source Sans Pro Light" panose="020B0403030403020204" pitchFamily="34" charset="0"/>
+                <a:ea typeface="Source Sans Pro Light" panose="020B0403030403020204" pitchFamily="34" charset="0"/>
+              </a:rPr>
+              <a:t> distribution at </a:t>
+            </a:r>
+            <a:r>
+              <a:rPr lang="en-US" sz="2000" dirty="0">
+                <a:latin typeface="Consolas" panose="020B0609020204030204" pitchFamily="49" charset="0"/>
+                <a:ea typeface="Source Sans Pro Light" panose="020B0403030403020204" pitchFamily="34" charset="0"/>
+              </a:rPr>
+              <a:t>y[</a:t>
+            </a:r>
+            <a:r>
+              <a:rPr lang="en-US" sz="2000" dirty="0" err="1">
+                <a:latin typeface="Consolas" panose="020B0609020204030204" pitchFamily="49" charset="0"/>
+                <a:ea typeface="Source Sans Pro Light" panose="020B0403030403020204" pitchFamily="34" charset="0"/>
+              </a:rPr>
+              <a:t>i</a:t>
+            </a:r>
+            <a:r>
+              <a:rPr lang="en-US" sz="2000" dirty="0">
+                <a:latin typeface="Consolas" panose="020B0609020204030204" pitchFamily="49" charset="0"/>
+                <a:ea typeface="Source Sans Pro Light" panose="020B0403030403020204" pitchFamily="34" charset="0"/>
+              </a:rPr>
+              <a:t>]</a:t>
+            </a:r>
+            <a:r>
+              <a:rPr lang="en-US" sz="2000" dirty="0">
+                <a:latin typeface="Source Sans Pro Light" panose="020B0403030403020204" pitchFamily="34" charset="0"/>
+                <a:ea typeface="Source Sans Pro Light" panose="020B0403030403020204" pitchFamily="34" charset="0"/>
+              </a:rPr>
+              <a:t>.</a:t>
+            </a:r>
+          </a:p>
+          <a:p>
+            <a:endParaRPr lang="en-US" sz="2000" dirty="0">
+              <a:latin typeface="Source Sans Pro Light" panose="020B0403030403020204" pitchFamily="34" charset="0"/>
+              <a:ea typeface="Source Sans Pro Light" panose="020B0403030403020204" pitchFamily="34" charset="0"/>
+            </a:endParaRPr>
+          </a:p>
+          <a:p>
+            <a:r>
+              <a:rPr lang="en-US" sz="2000" dirty="0">
+                <a:latin typeface="Source Sans Pro Light" panose="020B0403030403020204" pitchFamily="34" charset="0"/>
+                <a:ea typeface="Source Sans Pro Light" panose="020B0403030403020204" pitchFamily="34" charset="0"/>
+              </a:rPr>
+              <a:t>This is the same as an increment of current log-probability by the log-density of the normal distribution at </a:t>
+            </a:r>
+            <a:r>
+              <a:rPr lang="en-US" sz="2000" dirty="0">
+                <a:latin typeface="Consolas" panose="020B0609020204030204" pitchFamily="49" charset="0"/>
+                <a:ea typeface="Source Sans Pro Light" panose="020B0403030403020204" pitchFamily="34" charset="0"/>
+              </a:rPr>
+              <a:t>y[</a:t>
+            </a:r>
+            <a:r>
+              <a:rPr lang="en-US" sz="2000" dirty="0" err="1">
+                <a:latin typeface="Consolas" panose="020B0609020204030204" pitchFamily="49" charset="0"/>
+                <a:ea typeface="Source Sans Pro Light" panose="020B0403030403020204" pitchFamily="34" charset="0"/>
+              </a:rPr>
+              <a:t>i</a:t>
+            </a:r>
+            <a:r>
+              <a:rPr lang="en-US" sz="2000" dirty="0">
+                <a:latin typeface="Consolas" panose="020B0609020204030204" pitchFamily="49" charset="0"/>
+                <a:ea typeface="Source Sans Pro Light" panose="020B0403030403020204" pitchFamily="34" charset="0"/>
+              </a:rPr>
+              <a:t>]</a:t>
+            </a:r>
+            <a:r>
+              <a:rPr lang="en-US" sz="2000" dirty="0">
+                <a:latin typeface="Source Sans Pro Light" panose="020B0403030403020204" pitchFamily="34" charset="0"/>
+                <a:ea typeface="Source Sans Pro Light" panose="020B0403030403020204" pitchFamily="34" charset="0"/>
+              </a:rPr>
+              <a:t>.</a:t>
+            </a:r>
+          </a:p>
+          <a:p>
+            <a:endParaRPr lang="en-US" sz="2000" dirty="0">
+              <a:latin typeface="Source Sans Pro Light" panose="020B0403030403020204" pitchFamily="34" charset="0"/>
+              <a:ea typeface="Source Sans Pro Light" panose="020B0403030403020204" pitchFamily="34" charset="0"/>
+            </a:endParaRPr>
+          </a:p>
+          <a:p>
+            <a:r>
+              <a:rPr lang="en-US" sz="2000" dirty="0">
+                <a:latin typeface="Source Sans Pro Light" panose="020B0403030403020204" pitchFamily="34" charset="0"/>
+                <a:ea typeface="Source Sans Pro Light" panose="020B0403030403020204" pitchFamily="34" charset="0"/>
+              </a:rPr>
+              <a:t>Indeed, we can replace </a:t>
+            </a:r>
+            <a:r>
+              <a:rPr lang="en-US" sz="2000" dirty="0">
+                <a:latin typeface="Consolas" panose="020B0609020204030204" pitchFamily="49" charset="0"/>
+                <a:ea typeface="Source Sans Pro Light" panose="020B0403030403020204" pitchFamily="34" charset="0"/>
+              </a:rPr>
+              <a:t>y[</a:t>
+            </a:r>
+            <a:r>
+              <a:rPr lang="en-US" sz="2000" dirty="0" err="1">
+                <a:latin typeface="Consolas" panose="020B0609020204030204" pitchFamily="49" charset="0"/>
+                <a:ea typeface="Source Sans Pro Light" panose="020B0403030403020204" pitchFamily="34" charset="0"/>
+              </a:rPr>
+              <a:t>i</a:t>
+            </a:r>
+            <a:r>
+              <a:rPr lang="en-US" sz="2000" dirty="0">
+                <a:latin typeface="Consolas" panose="020B0609020204030204" pitchFamily="49" charset="0"/>
+                <a:ea typeface="Source Sans Pro Light" panose="020B0403030403020204" pitchFamily="34" charset="0"/>
+              </a:rPr>
+              <a:t>] ~ normal(mu, sigma);</a:t>
+            </a:r>
+            <a:r>
+              <a:rPr lang="en-US" sz="2000" dirty="0">
+                <a:latin typeface="Source Sans Pro Light" panose="020B0403030403020204" pitchFamily="34" charset="0"/>
+                <a:ea typeface="Source Sans Pro Light" panose="020B0403030403020204" pitchFamily="34" charset="0"/>
+              </a:rPr>
+              <a:t> with </a:t>
+            </a:r>
+            <a:r>
+              <a:rPr lang="en-US" sz="2000" dirty="0">
+                <a:latin typeface="Consolas" panose="020B0609020204030204" pitchFamily="49" charset="0"/>
+                <a:ea typeface="Source Sans Pro Light" panose="020B0403030403020204" pitchFamily="34" charset="0"/>
+              </a:rPr>
+              <a:t>target += </a:t>
+            </a:r>
+            <a:r>
+              <a:rPr lang="en-US" sz="2000" dirty="0" err="1">
+                <a:latin typeface="Consolas" panose="020B0609020204030204" pitchFamily="49" charset="0"/>
+                <a:ea typeface="Source Sans Pro Light" panose="020B0403030403020204" pitchFamily="34" charset="0"/>
+              </a:rPr>
+              <a:t>normal_lpdf</a:t>
+            </a:r>
+            <a:r>
+              <a:rPr lang="en-US" sz="2000" dirty="0">
+                <a:latin typeface="Consolas" panose="020B0609020204030204" pitchFamily="49" charset="0"/>
+                <a:ea typeface="Source Sans Pro Light" panose="020B0403030403020204" pitchFamily="34" charset="0"/>
+              </a:rPr>
+              <a:t>(y | mu, sigma)</a:t>
+            </a:r>
+            <a:r>
+              <a:rPr lang="en-US" sz="2000" dirty="0">
+                <a:latin typeface="Source Sans Pro Light" panose="020B0403030403020204" pitchFamily="34" charset="0"/>
+                <a:ea typeface="Source Sans Pro Light" panose="020B0403030403020204" pitchFamily="34" charset="0"/>
+              </a:rPr>
+              <a:t>.</a:t>
+            </a:r>
+            <a:endParaRPr lang="en-US" sz="2000" dirty="0">
+              <a:latin typeface="Consolas" panose="020B0609020204030204" pitchFamily="49" charset="0"/>
+              <a:ea typeface="Source Sans Pro Light" panose="020B0403030403020204" pitchFamily="34" charset="0"/>
+            </a:endParaRPr>
+          </a:p>
+          <a:p>
+            <a:endParaRPr lang="en-US" dirty="0"/>
+          </a:p>
+        </p:txBody>
+      </p:sp>
+      <p:sp>
+        <p:nvSpPr>
           <p:cNvPr id="5" name="Slide Number Placeholder 4">
             <a:extLst>
               <a:ext uri="{FF2B5EF4-FFF2-40B4-BE49-F238E27FC236}">
@@ -12860,71 +12982,10 @@
           </a:p>
         </p:txBody>
       </p:sp>
-      <p:sp>
-        <p:nvSpPr>
-          <p:cNvPr id="10" name="Title 1">
-            <a:extLst>
-              <a:ext uri="{FF2B5EF4-FFF2-40B4-BE49-F238E27FC236}">
-                <a16:creationId xmlns:a16="http://schemas.microsoft.com/office/drawing/2014/main" id="{3B37C8E1-518D-4B8F-8EA7-56BAD539FFF7}"/>
-              </a:ext>
-            </a:extLst>
-          </p:cNvPr>
-          <p:cNvSpPr txBox="1">
-            <a:spLocks/>
-          </p:cNvSpPr>
-          <p:nvPr/>
-        </p:nvSpPr>
-        <p:spPr>
-          <a:xfrm>
-            <a:off x="2765400" y="2307070"/>
-            <a:ext cx="3613197" cy="1100859"/>
-          </a:xfrm>
-          <a:prstGeom prst="rect">
-            <a:avLst/>
-          </a:prstGeom>
-        </p:spPr>
-        <p:txBody>
-          <a:bodyPr vert="horz" lIns="91440" tIns="45720" rIns="91440" bIns="45720" rtlCol="0" anchor="ctr">
-            <a:normAutofit fontScale="97500"/>
-          </a:bodyPr>
-          <a:lstStyle>
-            <a:lvl1pPr algn="l" defTabSz="685800" rtl="0" eaLnBrk="1" latinLnBrk="0" hangingPunct="1">
-              <a:lnSpc>
-                <a:spcPct val="90000"/>
-              </a:lnSpc>
-              <a:spcBef>
-                <a:spcPct val="0"/>
-              </a:spcBef>
-              <a:buNone/>
-              <a:defRPr sz="3300" kern="1200">
-                <a:solidFill>
-                  <a:schemeClr val="tx1"/>
-                </a:solidFill>
-                <a:latin typeface="+mj-lt"/>
-                <a:ea typeface="+mj-ea"/>
-                <a:cs typeface="+mj-cs"/>
-              </a:defRPr>
-            </a:lvl1pPr>
-          </a:lstStyle>
-          <a:p>
-            <a:r>
-              <a:rPr lang="en-US" sz="3200" b="1" dirty="0">
-                <a:latin typeface="Source Sans Pro" panose="020B0503030403020204" pitchFamily="34" charset="0"/>
-                <a:ea typeface="Source Sans Pro" panose="020B0503030403020204" pitchFamily="34" charset="0"/>
-              </a:rPr>
-              <a:t>Hands on examples</a:t>
-            </a:r>
-            <a:endParaRPr lang="LID4096" sz="5400" b="1" dirty="0">
-              <a:latin typeface="Source Sans Pro" panose="020B0503030403020204" pitchFamily="34" charset="0"/>
-              <a:ea typeface="Source Sans Pro" panose="020B0503030403020204" pitchFamily="34" charset="0"/>
-            </a:endParaRPr>
-          </a:p>
-        </p:txBody>
-      </p:sp>
     </p:spTree>
     <p:extLst>
       <p:ext uri="{BB962C8B-B14F-4D97-AF65-F5344CB8AC3E}">
-        <p14:creationId xmlns:p14="http://schemas.microsoft.com/office/powerpoint/2010/main" val="1894891606"/>
+        <p14:creationId xmlns:p14="http://schemas.microsoft.com/office/powerpoint/2010/main" val="2683307699"/>
       </p:ext>
     </p:extLst>
   </p:cSld>
@@ -12951,43 +13012,43 @@
           <a:chExt cx="0" cy="0"/>
         </a:xfrm>
       </p:grpSpPr>
-      <p:sp>
-        <p:nvSpPr>
-          <p:cNvPr id="2" name="Title 1">
+      <p:pic>
+        <p:nvPicPr>
+          <p:cNvPr id="4" name="Picture 3" descr="Logo, company name&#10;&#10;Description automatically generated">
             <a:extLst>
               <a:ext uri="{FF2B5EF4-FFF2-40B4-BE49-F238E27FC236}">
-                <a16:creationId xmlns:a16="http://schemas.microsoft.com/office/drawing/2014/main" id="{5488FAB6-27FF-4F6E-B6A3-2E4E1E84283E}"/>
+                <a16:creationId xmlns:a16="http://schemas.microsoft.com/office/drawing/2014/main" id="{B843C928-BA92-4E3B-A771-AAED350D87B3}"/>
               </a:ext>
             </a:extLst>
           </p:cNvPr>
-          <p:cNvSpPr>
-            <a:spLocks noGrp="1"/>
-          </p:cNvSpPr>
-          <p:nvPr>
-            <p:ph type="title"/>
-          </p:nvPr>
-        </p:nvSpPr>
-        <p:spPr/>
-        <p:txBody>
-          <a:bodyPr>
-            <a:normAutofit/>
-          </a:bodyPr>
-          <a:lstStyle/>
-          <a:p>
-            <a:r>
-              <a:rPr lang="en-US" sz="2800" b="1" dirty="0">
-                <a:latin typeface="Source Sans Pro" panose="020B0503030403020204" pitchFamily="34" charset="0"/>
-                <a:ea typeface="Source Sans Pro" panose="020B0503030403020204" pitchFamily="34" charset="0"/>
-              </a:rPr>
-              <a:t>Presenting models</a:t>
-            </a:r>
-            <a:endParaRPr lang="LID4096" sz="2800" b="1" dirty="0">
-              <a:latin typeface="Source Sans Pro" panose="020B0503030403020204" pitchFamily="34" charset="0"/>
-              <a:ea typeface="Source Sans Pro" panose="020B0503030403020204" pitchFamily="34" charset="0"/>
-            </a:endParaRPr>
-          </a:p>
-        </p:txBody>
-      </p:sp>
+          <p:cNvPicPr>
+            <a:picLocks noChangeAspect="1"/>
+          </p:cNvPicPr>
+          <p:nvPr/>
+        </p:nvPicPr>
+        <p:blipFill>
+          <a:blip r:embed="rId3">
+            <a:alphaModFix amt="5000"/>
+            <a:extLst>
+              <a:ext uri="{28A0092B-C50C-407E-A947-70E740481C1C}">
+                <a14:useLocalDpi xmlns:a14="http://schemas.microsoft.com/office/drawing/2010/main" val="0"/>
+              </a:ext>
+            </a:extLst>
+          </a:blip>
+          <a:stretch>
+            <a:fillRect/>
+          </a:stretch>
+        </p:blipFill>
+        <p:spPr>
+          <a:xfrm>
+            <a:off x="2030642" y="309365"/>
+            <a:ext cx="5082715" cy="5096270"/>
+          </a:xfrm>
+          <a:prstGeom prst="rect">
+            <a:avLst/>
+          </a:prstGeom>
+        </p:spPr>
+      </p:pic>
       <p:sp>
         <p:nvSpPr>
           <p:cNvPr id="5" name="Slide Number Placeholder 4">
@@ -13025,6 +13086,182 @@
               </a:rPr>
               <a:pPr algn="ctr"/>
               <a:t>32</a:t>
+            </a:fld>
+            <a:endParaRPr lang="LID4096" sz="1600" b="1" dirty="0">
+              <a:solidFill>
+                <a:srgbClr val="EF1209"/>
+              </a:solidFill>
+              <a:latin typeface="Source Sans Pro" panose="020B0503030403020204" pitchFamily="34" charset="0"/>
+              <a:ea typeface="Source Sans Pro" panose="020B0503030403020204" pitchFamily="34" charset="0"/>
+            </a:endParaRPr>
+          </a:p>
+        </p:txBody>
+      </p:sp>
+      <p:sp>
+        <p:nvSpPr>
+          <p:cNvPr id="10" name="Title 1">
+            <a:extLst>
+              <a:ext uri="{FF2B5EF4-FFF2-40B4-BE49-F238E27FC236}">
+                <a16:creationId xmlns:a16="http://schemas.microsoft.com/office/drawing/2014/main" id="{3B37C8E1-518D-4B8F-8EA7-56BAD539FFF7}"/>
+              </a:ext>
+            </a:extLst>
+          </p:cNvPr>
+          <p:cNvSpPr txBox="1">
+            <a:spLocks/>
+          </p:cNvSpPr>
+          <p:nvPr/>
+        </p:nvSpPr>
+        <p:spPr>
+          <a:xfrm>
+            <a:off x="2765400" y="2307070"/>
+            <a:ext cx="3613197" cy="1100859"/>
+          </a:xfrm>
+          <a:prstGeom prst="rect">
+            <a:avLst/>
+          </a:prstGeom>
+        </p:spPr>
+        <p:txBody>
+          <a:bodyPr vert="horz" lIns="91440" tIns="45720" rIns="91440" bIns="45720" rtlCol="0" anchor="ctr">
+            <a:normAutofit fontScale="97500"/>
+          </a:bodyPr>
+          <a:lstStyle>
+            <a:lvl1pPr algn="l" defTabSz="685800" rtl="0" eaLnBrk="1" latinLnBrk="0" hangingPunct="1">
+              <a:lnSpc>
+                <a:spcPct val="90000"/>
+              </a:lnSpc>
+              <a:spcBef>
+                <a:spcPct val="0"/>
+              </a:spcBef>
+              <a:buNone/>
+              <a:defRPr sz="3300" kern="1200">
+                <a:solidFill>
+                  <a:schemeClr val="tx1"/>
+                </a:solidFill>
+                <a:latin typeface="+mj-lt"/>
+                <a:ea typeface="+mj-ea"/>
+                <a:cs typeface="+mj-cs"/>
+              </a:defRPr>
+            </a:lvl1pPr>
+          </a:lstStyle>
+          <a:p>
+            <a:r>
+              <a:rPr lang="en-US" sz="3200" b="1" dirty="0">
+                <a:latin typeface="Source Sans Pro" panose="020B0503030403020204" pitchFamily="34" charset="0"/>
+                <a:ea typeface="Source Sans Pro" panose="020B0503030403020204" pitchFamily="34" charset="0"/>
+              </a:rPr>
+              <a:t>Hands on examples</a:t>
+            </a:r>
+            <a:endParaRPr lang="LID4096" sz="5400" b="1" dirty="0">
+              <a:latin typeface="Source Sans Pro" panose="020B0503030403020204" pitchFamily="34" charset="0"/>
+              <a:ea typeface="Source Sans Pro" panose="020B0503030403020204" pitchFamily="34" charset="0"/>
+            </a:endParaRPr>
+          </a:p>
+        </p:txBody>
+      </p:sp>
+    </p:spTree>
+    <p:extLst>
+      <p:ext uri="{BB962C8B-B14F-4D97-AF65-F5344CB8AC3E}">
+        <p14:creationId xmlns:p14="http://schemas.microsoft.com/office/powerpoint/2010/main" val="1946297934"/>
+      </p:ext>
+    </p:extLst>
+  </p:cSld>
+  <p:clrMapOvr>
+    <a:masterClrMapping/>
+  </p:clrMapOvr>
+</p:sld>
+</file>
+
+<file path=ppt/slides/slide33.xml><?xml version="1.0" encoding="utf-8"?>
+<p:sld xmlns:a="http://schemas.openxmlformats.org/drawingml/2006/main" xmlns:r="http://schemas.openxmlformats.org/officeDocument/2006/relationships" xmlns:p="http://schemas.openxmlformats.org/presentationml/2006/main">
+  <p:cSld>
+    <p:spTree>
+      <p:nvGrpSpPr>
+        <p:cNvPr id="1" name=""/>
+        <p:cNvGrpSpPr/>
+        <p:nvPr/>
+      </p:nvGrpSpPr>
+      <p:grpSpPr>
+        <a:xfrm>
+          <a:off x="0" y="0"/>
+          <a:ext cx="0" cy="0"/>
+          <a:chOff x="0" y="0"/>
+          <a:chExt cx="0" cy="0"/>
+        </a:xfrm>
+      </p:grpSpPr>
+      <p:sp>
+        <p:nvSpPr>
+          <p:cNvPr id="2" name="Title 1">
+            <a:extLst>
+              <a:ext uri="{FF2B5EF4-FFF2-40B4-BE49-F238E27FC236}">
+                <a16:creationId xmlns:a16="http://schemas.microsoft.com/office/drawing/2014/main" id="{5488FAB6-27FF-4F6E-B6A3-2E4E1E84283E}"/>
+              </a:ext>
+            </a:extLst>
+          </p:cNvPr>
+          <p:cNvSpPr>
+            <a:spLocks noGrp="1"/>
+          </p:cNvSpPr>
+          <p:nvPr>
+            <p:ph type="title"/>
+          </p:nvPr>
+        </p:nvSpPr>
+        <p:spPr/>
+        <p:txBody>
+          <a:bodyPr>
+            <a:normAutofit/>
+          </a:bodyPr>
+          <a:lstStyle/>
+          <a:p>
+            <a:r>
+              <a:rPr lang="en-US" sz="2800" b="1" dirty="0">
+                <a:latin typeface="Source Sans Pro" panose="020B0503030403020204" pitchFamily="34" charset="0"/>
+                <a:ea typeface="Source Sans Pro" panose="020B0503030403020204" pitchFamily="34" charset="0"/>
+              </a:rPr>
+              <a:t>Presenting models</a:t>
+            </a:r>
+            <a:endParaRPr lang="LID4096" sz="2800" b="1" dirty="0">
+              <a:latin typeface="Source Sans Pro" panose="020B0503030403020204" pitchFamily="34" charset="0"/>
+              <a:ea typeface="Source Sans Pro" panose="020B0503030403020204" pitchFamily="34" charset="0"/>
+            </a:endParaRPr>
+          </a:p>
+        </p:txBody>
+      </p:sp>
+      <p:sp>
+        <p:nvSpPr>
+          <p:cNvPr id="5" name="Slide Number Placeholder 4">
+            <a:extLst>
+              <a:ext uri="{FF2B5EF4-FFF2-40B4-BE49-F238E27FC236}">
+                <a16:creationId xmlns:a16="http://schemas.microsoft.com/office/drawing/2014/main" id="{32359CFB-E8AA-4FDD-A4C4-214EF48D5737}"/>
+              </a:ext>
+            </a:extLst>
+          </p:cNvPr>
+          <p:cNvSpPr>
+            <a:spLocks noGrp="1"/>
+          </p:cNvSpPr>
+          <p:nvPr>
+            <p:ph type="sldNum" sz="quarter" idx="12"/>
+          </p:nvPr>
+        </p:nvSpPr>
+        <p:spPr>
+          <a:xfrm>
+            <a:off x="8611149" y="5216685"/>
+            <a:ext cx="532852" cy="498315"/>
+          </a:xfrm>
+        </p:spPr>
+        <p:txBody>
+          <a:bodyPr/>
+          <a:lstStyle/>
+          <a:p>
+            <a:pPr algn="ctr"/>
+            <a:fld id="{96EFF5A7-69E0-4703-97D0-8078648202E5}" type="slidenum">
+              <a:rPr lang="LID4096" sz="1600" b="1">
+                <a:solidFill>
+                  <a:srgbClr val="EF1209"/>
+                </a:solidFill>
+                <a:latin typeface="Source Sans Pro" panose="020B0503030403020204" pitchFamily="34" charset="0"/>
+                <a:ea typeface="Source Sans Pro" panose="020B0503030403020204" pitchFamily="34" charset="0"/>
+              </a:rPr>
+              <a:pPr algn="ctr"/>
+              <a:t>33</a:t>
             </a:fld>
             <a:endParaRPr lang="LID4096" sz="1600" b="1" dirty="0">
               <a:solidFill>
@@ -13079,7 +13316,7 @@
 </p:sld>
 </file>
 
-<file path=ppt/slides/slide33.xml><?xml version="1.0" encoding="utf-8"?>
+<file path=ppt/slides/slide34.xml><?xml version="1.0" encoding="utf-8"?>
 <p:sld xmlns:a="http://schemas.openxmlformats.org/drawingml/2006/main" xmlns:r="http://schemas.openxmlformats.org/officeDocument/2006/relationships" xmlns:p="http://schemas.openxmlformats.org/presentationml/2006/main">
   <p:cSld>
     <p:spTree>
@@ -13132,7 +13369,7 @@
                 <a:ea typeface="Source Sans Pro" panose="020B0503030403020204" pitchFamily="34" charset="0"/>
               </a:rPr>
               <a:pPr algn="ctr"/>
-              <a:t>33</a:t>
+              <a:t>34</a:t>
             </a:fld>
             <a:endParaRPr lang="LID4096" sz="1600" b="1" dirty="0">
               <a:solidFill>
@@ -13193,7 +13430,7 @@
 </p:sld>
 </file>
 
-<file path=ppt/slides/slide34.xml><?xml version="1.0" encoding="utf-8"?>
+<file path=ppt/slides/slide35.xml><?xml version="1.0" encoding="utf-8"?>
 <p:sld xmlns:a="http://schemas.openxmlformats.org/drawingml/2006/main" xmlns:r="http://schemas.openxmlformats.org/officeDocument/2006/relationships" xmlns:p="http://schemas.openxmlformats.org/presentationml/2006/main">
   <p:cSld>
     <p:spTree>

</xml_diff>

<commit_message>
Fixed some typos in the pptx.
</commit_message>
<xml_diff>
--- a/Session_02b_Probabilistic_programming/Probabilistic_programming.pptx
+++ b/Session_02b_Probabilistic_programming/Probabilistic_programming.pptx
@@ -6067,7 +6067,7 @@
                 <a:latin typeface="Source Sans Pro Light" panose="020B0403030403020204" pitchFamily="34" charset="0"/>
                 <a:ea typeface="Source Sans Pro Light" panose="020B0403030403020204" pitchFamily="34" charset="0"/>
               </a:rPr>
-              <a:t>It is probably the most popular probabilistic programming language as thousands of users rely on it for statistical modelling in many domains. It has an excellent support forum and great documentation. </a:t>
+              <a:t>It is likely the most popular probabilistic programming language as thousands of users rely on it for statistical modelling in many domains. It has an excellent support forum and great documentation. </a:t>
             </a:r>
           </a:p>
           <a:p>
@@ -8086,7 +8086,7 @@
                 <a:latin typeface="Source Sans Pro Light" panose="020B0403030403020204" pitchFamily="34" charset="0"/>
                 <a:ea typeface="Source Sans Pro Light" panose="020B0403030403020204" pitchFamily="34" charset="0"/>
               </a:rPr>
-              <a:t> is a vector of successes (1) and failures (0) and </a:t>
+              <a:t> is a vector of successes (1) and failures (0), and </a:t>
             </a:r>
             <a:r>
               <a:rPr lang="en-US" sz="2000" dirty="0">
@@ -8144,21 +8144,35 @@
                 <a:latin typeface="Source Sans Pro Light" panose="020B0403030403020204" pitchFamily="34" charset="0"/>
                 <a:ea typeface="Source Sans Pro Light" panose="020B0403030403020204" pitchFamily="34" charset="0"/>
               </a:rPr>
-              <a:t> is a vector of real numbers between 0 and 1 and </a:t>
-            </a:r>
-            <a:r>
-              <a:rPr lang="en-US" sz="2000" dirty="0">
+              <a:t> is a vector of real numbers between 0 </a:t>
+            </a:r>
+            <a:r>
+              <a:rPr lang="en-US" sz="2000">
+                <a:latin typeface="Source Sans Pro Light" panose="020B0403030403020204" pitchFamily="34" charset="0"/>
+                <a:ea typeface="Source Sans Pro Light" panose="020B0403030403020204" pitchFamily="34" charset="0"/>
+              </a:rPr>
+              <a:t>and 1, </a:t>
+            </a:r>
+            <a:r>
+              <a:rPr lang="en-US" sz="2000">
                 <a:latin typeface="Consolas" panose="020B0609020204030204" pitchFamily="49" charset="0"/>
                 <a:ea typeface="Source Sans Pro Light" panose="020B0403030403020204" pitchFamily="34" charset="0"/>
               </a:rPr>
               <a:t>alpha</a:t>
             </a:r>
             <a:r>
-              <a:rPr lang="en-US" sz="2000" dirty="0">
+              <a:rPr lang="en-US" sz="2000">
                 <a:latin typeface="Source Sans Pro Light" panose="020B0403030403020204" pitchFamily="34" charset="0"/>
                 <a:ea typeface="Source Sans Pro Light" panose="020B0403030403020204" pitchFamily="34" charset="0"/>
               </a:rPr>
-              <a:t> and </a:t>
+              <a:t> </a:t>
+            </a:r>
+            <a:r>
+              <a:rPr lang="en-US" sz="2000" dirty="0">
+                <a:latin typeface="Source Sans Pro Light" panose="020B0403030403020204" pitchFamily="34" charset="0"/>
+                <a:ea typeface="Source Sans Pro Light" panose="020B0403030403020204" pitchFamily="34" charset="0"/>
+              </a:rPr>
+              <a:t>and </a:t>
             </a:r>
             <a:r>
               <a:rPr lang="en-US" sz="2000" dirty="0">

</xml_diff>

<commit_message>
Fixed an indentation in one of the code examples in slides.
</commit_message>
<xml_diff>
--- a/Session_02b_Probabilistic_programming/Probabilistic_programming.pptx
+++ b/Session_02b_Probabilistic_programming/Probabilistic_programming.pptx
@@ -1757,7 +1757,7 @@
           <a:p>
             <a:fld id="{43E8DC33-9320-4328-B019-E0163181A3C7}" type="datetimeFigureOut">
               <a:rPr lang="LID4096" smtClean="0"/>
-              <a:t>10/12/22</a:t>
+              <a:t>10/12/2022</a:t>
             </a:fld>
             <a:endParaRPr lang="LID4096"/>
           </a:p>
@@ -2838,7 +2838,7 @@
           <a:p>
             <a:fld id="{DF77F8B7-67C5-4A34-9D89-4D3855478B38}" type="datetime1">
               <a:rPr lang="LID4096" smtClean="0"/>
-              <a:t>10/12/22</a:t>
+              <a:t>10/12/2022</a:t>
             </a:fld>
             <a:endParaRPr lang="LID4096"/>
           </a:p>
@@ -3008,7 +3008,7 @@
           <a:p>
             <a:fld id="{2E01C644-7963-4809-9FF7-F9DF3305E547}" type="datetime1">
               <a:rPr lang="LID4096" smtClean="0"/>
-              <a:t>10/12/22</a:t>
+              <a:t>10/12/2022</a:t>
             </a:fld>
             <a:endParaRPr lang="LID4096"/>
           </a:p>
@@ -3188,7 +3188,7 @@
           <a:p>
             <a:fld id="{B04ECBB3-0644-4928-A7BE-41D4F8638333}" type="datetime1">
               <a:rPr lang="LID4096" smtClean="0"/>
-              <a:t>10/12/22</a:t>
+              <a:t>10/12/2022</a:t>
             </a:fld>
             <a:endParaRPr lang="LID4096"/>
           </a:p>
@@ -3358,7 +3358,7 @@
           <a:p>
             <a:fld id="{1E35827A-731F-4B00-B107-0A188EC60DAC}" type="datetime1">
               <a:rPr lang="LID4096" smtClean="0"/>
-              <a:t>10/12/22</a:t>
+              <a:t>10/12/2022</a:t>
             </a:fld>
             <a:endParaRPr lang="LID4096"/>
           </a:p>
@@ -3604,7 +3604,7 @@
           <a:p>
             <a:fld id="{D8E46D72-F593-4B40-B106-3EC660BC654E}" type="datetime1">
               <a:rPr lang="LID4096" smtClean="0"/>
-              <a:t>10/12/22</a:t>
+              <a:t>10/12/2022</a:t>
             </a:fld>
             <a:endParaRPr lang="LID4096"/>
           </a:p>
@@ -3836,7 +3836,7 @@
           <a:p>
             <a:fld id="{5D9F6076-8E4C-42D8-AF17-F97426B5A340}" type="datetime1">
               <a:rPr lang="LID4096" smtClean="0"/>
-              <a:t>10/12/22</a:t>
+              <a:t>10/12/2022</a:t>
             </a:fld>
             <a:endParaRPr lang="LID4096"/>
           </a:p>
@@ -4203,7 +4203,7 @@
           <a:p>
             <a:fld id="{CD567D47-60FF-4C64-862B-023FFBAD268A}" type="datetime1">
               <a:rPr lang="LID4096" smtClean="0"/>
-              <a:t>10/12/22</a:t>
+              <a:t>10/12/2022</a:t>
             </a:fld>
             <a:endParaRPr lang="LID4096"/>
           </a:p>
@@ -4321,7 +4321,7 @@
           <a:p>
             <a:fld id="{EFEF1EEE-FEBE-4D06-A0A4-D3C86B39934D}" type="datetime1">
               <a:rPr lang="LID4096" smtClean="0"/>
-              <a:t>10/12/22</a:t>
+              <a:t>10/12/2022</a:t>
             </a:fld>
             <a:endParaRPr lang="LID4096"/>
           </a:p>
@@ -4416,7 +4416,7 @@
           <a:p>
             <a:fld id="{EACC84AE-54D1-4B7D-8A6B-EF7CB9635BE3}" type="datetime1">
               <a:rPr lang="LID4096" smtClean="0"/>
-              <a:t>10/12/22</a:t>
+              <a:t>10/12/2022</a:t>
             </a:fld>
             <a:endParaRPr lang="LID4096"/>
           </a:p>
@@ -4693,7 +4693,7 @@
           <a:p>
             <a:fld id="{B227948E-2D54-4984-8A4B-70C1CA7F957B}" type="datetime1">
               <a:rPr lang="LID4096" smtClean="0"/>
-              <a:t>10/12/22</a:t>
+              <a:t>10/12/2022</a:t>
             </a:fld>
             <a:endParaRPr lang="LID4096"/>
           </a:p>
@@ -4950,7 +4950,7 @@
           <a:p>
             <a:fld id="{378B6861-8171-4936-A2D2-42381F04264D}" type="datetime1">
               <a:rPr lang="LID4096" smtClean="0"/>
-              <a:t>10/12/22</a:t>
+              <a:t>10/12/2022</a:t>
             </a:fld>
             <a:endParaRPr lang="LID4096"/>
           </a:p>
@@ -5163,7 +5163,7 @@
           <a:p>
             <a:fld id="{6D1357CB-971F-4825-B9C7-A50F10DC2193}" type="datetime1">
               <a:rPr lang="LID4096" smtClean="0"/>
-              <a:t>10/12/22</a:t>
+              <a:t>10/12/2022</a:t>
             </a:fld>
             <a:endParaRPr lang="LID4096"/>
           </a:p>
@@ -5846,75 +5846,42 @@
           </a:graphicData>
         </a:graphic>
       </p:graphicFrame>
-      <p:graphicFrame>
-        <p:nvGraphicFramePr>
-          <p:cNvPr id="11" name="Object 10">
+      <p:pic>
+        <p:nvPicPr>
+          <p:cNvPr id="7" name="Picture 6" descr="Graphical user interface, text, application&#10;&#10;Description automatically generated">
             <a:extLst>
               <a:ext uri="{FF2B5EF4-FFF2-40B4-BE49-F238E27FC236}">
-                <a16:creationId xmlns:a16="http://schemas.microsoft.com/office/drawing/2014/main" id="{21074D88-A35F-4F1C-B612-AF696DB167E6}"/>
+                <a16:creationId xmlns:a16="http://schemas.microsoft.com/office/drawing/2014/main" id="{9E930723-A7D5-8B9D-5F71-293E567912C2}"/>
               </a:ext>
             </a:extLst>
           </p:cNvPr>
-          <p:cNvGraphicFramePr>
-            <a:graphicFrameLocks noChangeAspect="1"/>
-          </p:cNvGraphicFramePr>
-          <p:nvPr>
-            <p:extLst>
-              <p:ext uri="{D42A27DB-BD31-4B8C-83A1-F6EECF244321}">
-                <p14:modId xmlns:p14="http://schemas.microsoft.com/office/powerpoint/2010/main" val="1334835587"/>
-              </p:ext>
-            </p:extLst>
-          </p:nvPr>
-        </p:nvGraphicFramePr>
-        <p:xfrm>
-          <a:off x="5003800" y="1644970"/>
-          <a:ext cx="3511550" cy="3175000"/>
-        </p:xfrm>
-        <a:graphic>
-          <a:graphicData uri="http://schemas.openxmlformats.org/presentationml/2006/ole">
-            <mc:AlternateContent xmlns:mc="http://schemas.openxmlformats.org/markup-compatibility/2006">
-              <mc:Choice xmlns:v="urn:schemas-microsoft-com:vml" Requires="v">
-                <p:oleObj r:id="rId4" imgW="6984000" imgH="6323760" progId="">
-                  <p:embed/>
-                </p:oleObj>
-              </mc:Choice>
-              <mc:Fallback>
-                <p:oleObj r:id="rId4" imgW="6984000" imgH="6323760" progId="">
-                  <p:embed/>
-                  <p:pic>
-                    <p:nvPicPr>
-                      <p:cNvPr id="11" name="Object 10">
-                        <a:extLst>
-                          <a:ext uri="{FF2B5EF4-FFF2-40B4-BE49-F238E27FC236}">
-                            <a16:creationId xmlns:a16="http://schemas.microsoft.com/office/drawing/2014/main" id="{21074D88-A35F-4F1C-B612-AF696DB167E6}"/>
-                          </a:ext>
-                        </a:extLst>
-                      </p:cNvPr>
-                      <p:cNvPicPr/>
-                      <p:nvPr/>
-                    </p:nvPicPr>
-                    <p:blipFill>
-                      <a:blip r:embed="rId5"/>
-                      <a:stretch>
-                        <a:fillRect/>
-                      </a:stretch>
-                    </p:blipFill>
-                    <p:spPr>
-                      <a:xfrm>
-                        <a:off x="5003800" y="1644970"/>
-                        <a:ext cx="3511550" cy="3175000"/>
-                      </a:xfrm>
-                      <a:prstGeom prst="rect">
-                        <a:avLst/>
-                      </a:prstGeom>
-                    </p:spPr>
-                  </p:pic>
-                </p:oleObj>
-              </mc:Fallback>
-            </mc:AlternateContent>
-          </a:graphicData>
-        </a:graphic>
-      </p:graphicFrame>
+          <p:cNvPicPr>
+            <a:picLocks noChangeAspect="1"/>
+          </p:cNvPicPr>
+          <p:nvPr/>
+        </p:nvPicPr>
+        <p:blipFill>
+          <a:blip r:embed="rId4">
+            <a:extLst>
+              <a:ext uri="{28A0092B-C50C-407E-A947-70E740481C1C}">
+                <a14:useLocalDpi xmlns:a14="http://schemas.microsoft.com/office/drawing/2010/main" val="0"/>
+              </a:ext>
+            </a:extLst>
+          </a:blip>
+          <a:stretch>
+            <a:fillRect/>
+          </a:stretch>
+        </p:blipFill>
+        <p:spPr>
+          <a:xfrm>
+            <a:off x="5004574" y="1647248"/>
+            <a:ext cx="3510776" cy="3172722"/>
+          </a:xfrm>
+          <a:prstGeom prst="rect">
+            <a:avLst/>
+          </a:prstGeom>
+        </p:spPr>
+      </p:pic>
     </p:spTree>
     <p:extLst>
       <p:ext uri="{BB962C8B-B14F-4D97-AF65-F5344CB8AC3E}">

</xml_diff>